<commit_message>
Edit missing _, grammar, cleanup, etc
</commit_message>
<xml_diff>
--- a/tutorial-04-charm_basics.pptx
+++ b/tutorial-04-charm_basics.pptx
@@ -236,7 +236,7 @@
           <a:p>
             <a:fld id="{775CE290-E0F5-444C-B849-A8F17CD4104C}" type="datetimeFigureOut">
               <a:rPr lang="en-US" smtClean="0"/>
-              <a:t>9/8/14</a:t>
+              <a:t>9/9/14</a:t>
             </a:fld>
             <a:endParaRPr lang="en-US"/>
           </a:p>
@@ -402,7 +402,7 @@
           <a:p>
             <a:fld id="{AD53A24C-4135-094C-957B-35852E7EDFA4}" type="datetimeFigureOut">
               <a:rPr lang="en-US" smtClean="0"/>
-              <a:t>9/8/14</a:t>
+              <a:t>9/9/14</a:t>
             </a:fld>
             <a:endParaRPr lang="en-US"/>
           </a:p>
@@ -863,7 +863,7 @@
           <a:p>
             <a:fld id="{B594EA25-E4F4-3746-A0BA-A11E27330E0F}" type="datetime2">
               <a:rPr lang="en-US" smtClean="0"/>
-              <a:t>Monday, September 8, 14</a:t>
+              <a:t>Tuesday, September 9, 14</a:t>
             </a:fld>
             <a:endParaRPr lang="en-US"/>
           </a:p>
@@ -1166,7 +1166,7 @@
                 <a:latin typeface="Times New Roman"/>
                 <a:cs typeface="Times New Roman"/>
               </a:rPr>
-              <a:t>September 8, 2014</a:t>
+              <a:t>September 9, 2014</a:t>
             </a:fld>
             <a:endParaRPr lang="en-US" dirty="0">
               <a:latin typeface="Times New Roman"/>
@@ -1453,7 +1453,7 @@
           <a:p>
             <a:fld id="{EA699BF9-66CB-F244-8E74-7B1BE1C77046}" type="datetime2">
               <a:rPr lang="en-US" smtClean="0"/>
-              <a:t>Monday, September 8, 14</a:t>
+              <a:t>Tuesday, September 9, 14</a:t>
             </a:fld>
             <a:endParaRPr lang="en-US"/>
           </a:p>
@@ -1764,7 +1764,7 @@
           <a:p>
             <a:fld id="{D300BE84-9843-8B4F-B3C8-647B06AC46C9}" type="datetime2">
               <a:rPr lang="en-US" smtClean="0"/>
-              <a:t>Monday, September 8, 14</a:t>
+              <a:t>Tuesday, September 9, 14</a:t>
             </a:fld>
             <a:endParaRPr lang="en-US"/>
           </a:p>
@@ -1935,7 +1935,7 @@
           <a:p>
             <a:fld id="{C460AE39-2092-A945-8296-F25085B9A0F1}" type="datetime2">
               <a:rPr lang="en-US" smtClean="0"/>
-              <a:t>Monday, September 8, 14</a:t>
+              <a:t>Tuesday, September 9, 14</a:t>
             </a:fld>
             <a:endParaRPr lang="en-US"/>
           </a:p>
@@ -2116,7 +2116,7 @@
           <a:p>
             <a:fld id="{63BC7E9D-3218-5E49-A867-E087AB2F4618}" type="datetime2">
               <a:rPr lang="en-US" smtClean="0"/>
-              <a:t>Monday, September 8, 14</a:t>
+              <a:t>Tuesday, September 9, 14</a:t>
             </a:fld>
             <a:endParaRPr lang="en-US"/>
           </a:p>
@@ -2287,7 +2287,7 @@
           <a:p>
             <a:fld id="{34621E95-60A9-FF44-9869-513D9D7A859F}" type="datetime2">
               <a:rPr lang="en-US" smtClean="0"/>
-              <a:t>Monday, September 8, 14</a:t>
+              <a:t>Tuesday, September 9, 14</a:t>
             </a:fld>
             <a:endParaRPr lang="en-US"/>
           </a:p>
@@ -2406,7 +2406,7 @@
           <a:p>
             <a:fld id="{BD5AFB16-13FE-DF4A-8CB7-09756A57B2EA}" type="datetime2">
               <a:rPr lang="en-US" smtClean="0"/>
-              <a:t>Monday, September 8, 14</a:t>
+              <a:t>Tuesday, September 9, 14</a:t>
             </a:fld>
             <a:endParaRPr lang="en-US" dirty="0"/>
           </a:p>
@@ -2893,7 +2893,7 @@
           <a:p>
             <a:fld id="{1BDEC705-8EA9-6C46-8E3B-2CAC7E2C0F7D}" type="datetime2">
               <a:rPr lang="en-US" smtClean="0"/>
-              <a:t>Monday, September 8, 14</a:t>
+              <a:t>Tuesday, September 9, 14</a:t>
             </a:fld>
             <a:endParaRPr lang="en-US"/>
           </a:p>
@@ -3224,7 +3224,7 @@
           <a:p>
             <a:fld id="{BF613BD3-C5FD-9543-B738-679BF38D8C83}" type="datetime2">
               <a:rPr lang="en-US" smtClean="0"/>
-              <a:t>Monday, September 8, 14</a:t>
+              <a:t>Tuesday, September 9, 14</a:t>
             </a:fld>
             <a:endParaRPr lang="en-US" dirty="0"/>
           </a:p>
@@ -3703,7 +3703,7 @@
           <a:p>
             <a:fld id="{4B5E4F0C-9A9C-5448-99FD-D30288B385C9}" type="datetime2">
               <a:rPr lang="en-US" smtClean="0"/>
-              <a:t>Monday, September 8, 14</a:t>
+              <a:t>Tuesday, September 9, 14</a:t>
             </a:fld>
             <a:endParaRPr lang="en-US"/>
           </a:p>
@@ -3999,7 +3999,7 @@
           <a:p>
             <a:fld id="{30545249-FD76-6844-B252-CAB05FC2DAA8}" type="datetime2">
               <a:rPr lang="en-US" smtClean="0"/>
-              <a:t>Monday, September 8, 14</a:t>
+              <a:t>Tuesday, September 9, 14</a:t>
             </a:fld>
             <a:endParaRPr lang="en-US" dirty="0"/>
           </a:p>
@@ -4243,7 +4243,7 @@
           <a:p>
             <a:fld id="{CC859171-EEDD-0B48-A5C0-E7218AE20EA7}" type="datetime2">
               <a:rPr lang="en-US" smtClean="0"/>
-              <a:t>Monday, September 8, 14</a:t>
+              <a:t>Tuesday, September 9, 14</a:t>
             </a:fld>
             <a:endParaRPr lang="en-US"/>
           </a:p>
@@ -4339,7 +4339,7 @@
           <a:p>
             <a:fld id="{C32F9216-0342-7440-9504-BD6C1382BF27}" type="datetime2">
               <a:rPr lang="en-US" smtClean="0"/>
-              <a:t>Monday, September 8, 14</a:t>
+              <a:t>Tuesday, September 9, 14</a:t>
             </a:fld>
             <a:endParaRPr lang="en-US"/>
           </a:p>
@@ -4610,7 +4610,7 @@
           <a:p>
             <a:fld id="{D36DC8F2-AD63-E841-8C23-5DC3A41041BE}" type="datetime2">
               <a:rPr lang="en-US" smtClean="0"/>
-              <a:t>Monday, September 8, 14</a:t>
+              <a:t>Tuesday, September 9, 14</a:t>
             </a:fld>
             <a:endParaRPr lang="en-US" dirty="0"/>
           </a:p>
@@ -5329,7 +5329,7 @@
           <a:p>
             <a:fld id="{69D995C0-827B-264B-AC36-EDB36FEEB8B8}" type="datetime2">
               <a:rPr lang="en-US" smtClean="0"/>
-              <a:t>Monday, September 8, 14</a:t>
+              <a:t>Tuesday, September 9, 14</a:t>
             </a:fld>
             <a:endParaRPr lang="en-US"/>
           </a:p>
@@ -5749,7 +5749,7 @@
           <a:p>
             <a:fld id="{A57EBE08-69FE-AE47-994E-57F0205EB69A}" type="datetime2">
               <a:rPr lang="en-US" smtClean="0"/>
-              <a:t>Monday, September 8, 14</a:t>
+              <a:t>Tuesday, September 9, 14</a:t>
             </a:fld>
             <a:endParaRPr lang="en-US"/>
           </a:p>
@@ -5964,12 +5964,24 @@
               <a:t> </a:t>
             </a:r>
             <a:r>
-              <a:rPr lang="en-US" dirty="0" err="1"/>
+              <a:rPr lang="en-US" dirty="0" err="1" smtClean="0"/>
               <a:t>CBase</a:t>
             </a:r>
             <a:r>
-              <a:rPr lang="en-US" dirty="0"/>
-              <a:t> Main { </a:t>
+              <a:rPr lang="en-US" dirty="0" err="1" smtClean="0"/>
+              <a:t>_</a:t>
+            </a:r>
+            <a:r>
+              <a:rPr lang="en-US" dirty="0" err="1" smtClean="0"/>
+              <a:t>Main</a:t>
+            </a:r>
+            <a:r>
+              <a:rPr lang="en-US" dirty="0" smtClean="0"/>
+              <a:t> </a:t>
+            </a:r>
+            <a:r>
+              <a:rPr lang="en-US" dirty="0"/>
+              <a:t>{ </a:t>
             </a:r>
             <a:endParaRPr lang="en-US" dirty="0" smtClean="0"/>
           </a:p>
@@ -6061,7 +6073,15 @@
             </a:r>
             <a:r>
               <a:rPr lang="en-US" dirty="0" smtClean="0"/>
-              <a:t> &lt;&lt; “ Hello” &lt;&lt; m-&gt;</a:t>
+              <a:t> &lt;&lt; </a:t>
+            </a:r>
+            <a:r>
+              <a:rPr lang="en-US" dirty="0" smtClean="0"/>
+              <a:t>“Hello</a:t>
+            </a:r>
+            <a:r>
+              <a:rPr lang="en-US" dirty="0" smtClean="0"/>
+              <a:t>” &lt;&lt; m-&gt;</a:t>
             </a:r>
             <a:r>
               <a:rPr lang="en-US" dirty="0" err="1" smtClean="0"/>
@@ -6371,7 +6391,7 @@
           <a:p>
             <a:fld id="{AC498192-FB6A-8E44-9727-3F11A17B21C5}" type="datetime2">
               <a:rPr lang="en-US" smtClean="0"/>
-              <a:t>Monday, September 8, 14</a:t>
+              <a:t>Tuesday, September 9, 14</a:t>
             </a:fld>
             <a:endParaRPr lang="en-US"/>
           </a:p>
@@ -6729,7 +6749,7 @@
           <a:p>
             <a:fld id="{42189252-12D6-8D42-8554-44BFD68AD137}" type="datetime2">
               <a:rPr lang="en-US" smtClean="0"/>
-              <a:t>Monday, September 8, 14</a:t>
+              <a:t>Tuesday, September 9, 14</a:t>
             </a:fld>
             <a:endParaRPr lang="en-US" dirty="0"/>
           </a:p>
@@ -6903,8 +6923,8 @@
         </p:nvSpPr>
         <p:spPr>
           <a:xfrm>
-            <a:off x="457200" y="2039236"/>
-            <a:ext cx="8229600" cy="867670"/>
+            <a:off x="457200" y="2039235"/>
+            <a:ext cx="8229600" cy="1188459"/>
           </a:xfrm>
           <a:solidFill>
             <a:srgbClr val="CCD1D9"/>
@@ -6917,7 +6937,7 @@
         </p:spPr>
         <p:txBody>
           <a:bodyPr>
-            <a:normAutofit fontScale="92500"/>
+            <a:normAutofit lnSpcReduction="10000"/>
           </a:bodyPr>
           <a:lstStyle/>
           <a:p>
@@ -6925,31 +6945,35 @@
               <a:buNone/>
             </a:pPr>
             <a:r>
-              <a:rPr lang="en-US" dirty="0" err="1"/>
+              <a:rPr lang="en-US" dirty="0" err="1" smtClean="0"/>
               <a:t>CProxy</a:t>
             </a:r>
             <a:r>
-              <a:rPr lang="en-US" dirty="0"/>
+              <a:rPr lang="en-US" dirty="0" err="1" smtClean="0"/>
+              <a:t>_</a:t>
+            </a:r>
+            <a:r>
+              <a:rPr lang="en-US" dirty="0" err="1" smtClean="0"/>
+              <a:t>MyChare</a:t>
+            </a:r>
+            <a:r>
+              <a:rPr lang="en-US" dirty="0" smtClean="0"/>
               <a:t> </a:t>
             </a:r>
             <a:r>
-              <a:rPr lang="en-US" dirty="0" err="1"/>
-              <a:t>MyChare</a:t>
-            </a:r>
-            <a:r>
-              <a:rPr lang="en-US" dirty="0"/>
-              <a:t> proxy = </a:t>
-            </a:r>
-            <a:r>
-              <a:rPr lang="en-US" dirty="0" err="1"/>
+              <a:rPr lang="en-US" dirty="0"/>
+              <a:t>proxy = </a:t>
+            </a:r>
+            <a:r>
+              <a:rPr lang="en-US" dirty="0" err="1" smtClean="0"/>
               <a:t>CProxy</a:t>
             </a:r>
             <a:r>
-              <a:rPr lang="en-US" dirty="0"/>
-              <a:t> </a:t>
-            </a:r>
-            <a:r>
-              <a:rPr lang="en-US" dirty="0" err="1"/>
+              <a:rPr lang="en-US" dirty="0" err="1" smtClean="0"/>
+              <a:t>_</a:t>
+            </a:r>
+            <a:r>
+              <a:rPr lang="en-US" dirty="0" err="1" smtClean="0"/>
               <a:t>MyChare</a:t>
             </a:r>
             <a:r>
@@ -6962,10 +6986,14 @@
             </a:r>
             <a:r>
               <a:rPr lang="en-US" dirty="0"/>
-              <a:t>(); </a:t>
-            </a:r>
-            <a:r>
-              <a:rPr lang="en-US" dirty="0" err="1"/>
+              <a:t>()</a:t>
+            </a:r>
+            <a:r>
+              <a:rPr lang="en-US" dirty="0" smtClean="0"/>
+              <a:t>; </a:t>
+            </a:r>
+            <a:r>
+              <a:rPr lang="en-US" dirty="0" err="1" smtClean="0"/>
               <a:t>proxy.foo</a:t>
             </a:r>
             <a:r>
@@ -7000,7 +7028,7 @@
         </p:nvSpPr>
         <p:spPr>
           <a:xfrm>
-            <a:off x="457200" y="2906906"/>
+            <a:off x="457200" y="3227695"/>
             <a:ext cx="8229600" cy="489583"/>
           </a:xfrm>
         </p:spPr>
@@ -7035,7 +7063,7 @@
         </p:nvSpPr>
         <p:spPr>
           <a:xfrm>
-            <a:off x="457200" y="3396489"/>
+            <a:off x="457200" y="3717278"/>
             <a:ext cx="8229600" cy="2783767"/>
           </a:xfrm>
           <a:solidFill>
@@ -7181,7 +7209,7 @@
           <a:p>
             <a:fld id="{4D5A0571-F813-ED4B-A840-104584464B5D}" type="datetime2">
               <a:rPr lang="en-US" smtClean="0"/>
-              <a:t>Monday, September 8, 14</a:t>
+              <a:t>Tuesday, September 9, 14</a:t>
             </a:fld>
             <a:endParaRPr lang="en-US" dirty="0"/>
           </a:p>
@@ -7495,7 +7523,15 @@
             </a:r>
             <a:r>
               <a:rPr lang="en-US" dirty="0"/>
-              <a:t>&lt;&lt; ”bar executes with ” &lt;&lt; </a:t>
+              <a:t>&lt;&lt; </a:t>
+            </a:r>
+            <a:r>
+              <a:rPr lang="en-US" dirty="0" smtClean="0"/>
+              <a:t>“bar </a:t>
+            </a:r>
+            <a:r>
+              <a:rPr lang="en-US" dirty="0"/>
+              <a:t>executes with ” &lt;&lt; </a:t>
             </a:r>
             <a:r>
               <a:rPr lang="en-US" dirty="0" err="1"/>
@@ -7535,7 +7571,7 @@
         </p:nvSpPr>
         <p:spPr>
           <a:xfrm>
-            <a:off x="457200" y="3961828"/>
+            <a:off x="457200" y="4016448"/>
             <a:ext cx="8229600" cy="1693241"/>
           </a:xfrm>
           <a:prstGeom prst="rect">
@@ -8207,7 +8243,7 @@
           <a:p>
             <a:fld id="{05610B8E-8FA5-5249-B52C-2D0045AE7F6A}" type="datetime2">
               <a:rPr lang="en-US" smtClean="0"/>
-              <a:t>Monday, September 8, 14</a:t>
+              <a:t>Tuesday, September 9, 14</a:t>
             </a:fld>
             <a:endParaRPr lang="en-US" dirty="0"/>
           </a:p>
@@ -8570,7 +8606,7 @@
           <a:p>
             <a:fld id="{FC337630-96F4-C348-92D0-8BA579BE92D4}" type="datetime2">
               <a:rPr lang="en-US" smtClean="0"/>
-              <a:t>Monday, September 8, 14</a:t>
+              <a:t>Tuesday, September 9, 14</a:t>
             </a:fld>
             <a:endParaRPr lang="en-US"/>
           </a:p>
@@ -8756,15 +8792,15 @@
             </a:r>
             <a:r>
               <a:rPr lang="en-US" dirty="0" err="1" smtClean="0"/>
-              <a:t>CBase</a:t>
-            </a:r>
-            <a:r>
-              <a:rPr lang="en-US" dirty="0" smtClean="0"/>
-              <a:t>_ </a:t>
-            </a:r>
-            <a:r>
-              <a:rPr lang="en-US" dirty="0"/>
-              <a:t>Main { </a:t>
+              <a:t>CBase_Main</a:t>
+            </a:r>
+            <a:r>
+              <a:rPr lang="en-US" dirty="0" smtClean="0"/>
+              <a:t> </a:t>
+            </a:r>
+            <a:r>
+              <a:rPr lang="en-US" dirty="0"/>
+              <a:t>{ </a:t>
             </a:r>
             <a:endParaRPr lang="en-US" dirty="0" smtClean="0"/>
           </a:p>
@@ -8827,12 +8863,16 @@
               <a:t>CProxy</a:t>
             </a:r>
             <a:r>
+              <a:rPr lang="en-US" dirty="0" err="1" smtClean="0"/>
+              <a:t>_</a:t>
+            </a:r>
+            <a:r>
+              <a:rPr lang="en-US" dirty="0" err="1" smtClean="0"/>
+              <a:t>Simple</a:t>
+            </a:r>
+            <a:r>
               <a:rPr lang="en-US" dirty="0" smtClean="0"/>
               <a:t> </a:t>
-            </a:r>
-            <a:r>
-              <a:rPr lang="en-US" dirty="0"/>
-              <a:t>Simple </a:t>
             </a:r>
             <a:r>
               <a:rPr lang="en-US" dirty="0" err="1"/>
@@ -8843,12 +8883,20 @@
               <a:t> = </a:t>
             </a:r>
             <a:r>
-              <a:rPr lang="en-US" dirty="0" err="1"/>
+              <a:rPr lang="en-US" dirty="0" err="1" smtClean="0"/>
               <a:t>CProxy</a:t>
             </a:r>
             <a:r>
-              <a:rPr lang="en-US" dirty="0"/>
-              <a:t> Simple::</a:t>
+              <a:rPr lang="en-US" dirty="0" err="1" smtClean="0"/>
+              <a:t>_</a:t>
+            </a:r>
+            <a:r>
+              <a:rPr lang="en-US" dirty="0" err="1" smtClean="0"/>
+              <a:t>Simple</a:t>
+            </a:r>
+            <a:r>
+              <a:rPr lang="en-US" dirty="0"/>
+              <a:t>::</a:t>
             </a:r>
             <a:r>
               <a:rPr lang="en-US" dirty="0" err="1"/>
@@ -8898,7 +8946,11 @@
             </a:r>
             <a:r>
               <a:rPr lang="en-US" dirty="0" smtClean="0"/>
-              <a:t>&lt; 10; </a:t>
+              <a:t> &lt; </a:t>
+            </a:r>
+            <a:r>
+              <a:rPr lang="en-US" dirty="0" smtClean="0"/>
+              <a:t>10; </a:t>
             </a:r>
             <a:r>
               <a:rPr lang="en-US" dirty="0" err="1" smtClean="0"/>
@@ -9102,7 +9154,15 @@
             </a:r>
             <a:r>
               <a:rPr lang="en-US" dirty="0"/>
-              <a:t>&lt;&lt; ”Hello from a simple </a:t>
+              <a:t>&lt;&lt; </a:t>
+            </a:r>
+            <a:r>
+              <a:rPr lang="en-US" dirty="0" smtClean="0"/>
+              <a:t>“Hello </a:t>
+            </a:r>
+            <a:r>
+              <a:rPr lang="en-US" dirty="0"/>
+              <a:t>from a simple </a:t>
             </a:r>
             <a:r>
               <a:rPr lang="en-US" dirty="0" err="1"/>
@@ -9284,7 +9344,7 @@
           <a:p>
             <a:fld id="{4F04D661-CDDA-EB4B-8920-0BA3B6EDE579}" type="datetime2">
               <a:rPr lang="en-US" smtClean="0"/>
-              <a:t>Monday, September 8, 14</a:t>
+              <a:t>Tuesday, September 9, 14</a:t>
             </a:fld>
             <a:endParaRPr lang="en-US" dirty="0"/>
           </a:p>
@@ -9410,7 +9470,7 @@
         </p:spPr>
         <p:txBody>
           <a:bodyPr>
-            <a:normAutofit fontScale="92500"/>
+            <a:normAutofit fontScale="92500" lnSpcReduction="10000"/>
           </a:bodyPr>
           <a:lstStyle/>
           <a:p>
@@ -9447,16 +9507,19 @@
               </a:rPr>
               <a:t>pup_stl.h</a:t>
             </a:r>
-            <a:r>
-              <a:rPr lang="en-US" dirty="0" smtClean="0">
-                <a:latin typeface="Consolas"/>
-                <a:cs typeface="Consolas"/>
-              </a:rPr>
-              <a:t> </a:t>
-            </a:r>
-            <a:r>
-              <a:rPr lang="en-US" dirty="0"/>
-              <a:t>Arrays of basic data types can also be passed like this:</a:t>
+            <a:endParaRPr lang="en-US" dirty="0">
+              <a:latin typeface="Consolas"/>
+              <a:cs typeface="Consolas"/>
+            </a:endParaRPr>
+          </a:p>
+          <a:p>
+            <a:r>
+              <a:rPr lang="en-US" dirty="0" smtClean="0"/>
+              <a:t>Arrays </a:t>
+            </a:r>
+            <a:r>
+              <a:rPr lang="en-US" dirty="0"/>
+              <a:t>of basic data types can also be passed like this:</a:t>
             </a:r>
           </a:p>
           <a:p>
@@ -9691,7 +9754,7 @@
           <a:p>
             <a:fld id="{04A73616-8CBF-A340-ADE3-98C2EE1DC9BE}" type="datetime2">
               <a:rPr lang="en-US" smtClean="0"/>
-              <a:t>Monday, September 8, 14</a:t>
+              <a:t>Tuesday, September 9, 14</a:t>
             </a:fld>
             <a:endParaRPr lang="en-US" dirty="0"/>
           </a:p>
@@ -9929,7 +9992,7 @@
           <a:p>
             <a:fld id="{A6675D53-EC17-3240-AF13-D8433FB11D57}" type="datetime2">
               <a:rPr lang="en-US" smtClean="0"/>
-              <a:t>Monday, September 8, 14</a:t>
+              <a:t>Tuesday, September 9, 14</a:t>
             </a:fld>
             <a:endParaRPr lang="en-US"/>
           </a:p>
@@ -10138,7 +10201,7 @@
           <a:p>
             <a:fld id="{A8BCDAA8-6772-8F4F-9D43-34A061D97D69}" type="datetime2">
               <a:rPr lang="en-US" smtClean="0"/>
-              <a:t>Monday, September 8, 14</a:t>
+              <a:t>Tuesday, September 9, 14</a:t>
             </a:fld>
             <a:endParaRPr lang="en-US"/>
           </a:p>
@@ -10553,7 +10616,7 @@
           <a:p>
             <a:fld id="{94EAAAA5-D767-4C40-91CB-82448A62D926}" type="datetime2">
               <a:rPr lang="en-US" smtClean="0"/>
-              <a:t>Monday, September 8, 14</a:t>
+              <a:t>Tuesday, September 9, 14</a:t>
             </a:fld>
             <a:endParaRPr lang="en-US" dirty="0"/>
           </a:p>
@@ -10913,7 +10976,7 @@
           <a:p>
             <a:fld id="{46A26A7E-4EBE-6B4C-8020-5D4DC21EA2AC}" type="datetime2">
               <a:rPr lang="en-US" smtClean="0"/>
-              <a:t>Monday, September 8, 14</a:t>
+              <a:t>Tuesday, September 9, 14</a:t>
             </a:fld>
             <a:endParaRPr lang="en-US"/>
           </a:p>
@@ -11067,11 +11130,11 @@
               <a:t>include </a:t>
             </a:r>
             <a:r>
-              <a:rPr lang="en-US" dirty="0"/>
-              <a:t>”</a:t>
-            </a:r>
-            <a:r>
-              <a:rPr lang="en-US" dirty="0" err="1"/>
+              <a:rPr lang="en-US" dirty="0" smtClean="0"/>
+              <a:t>“</a:t>
+            </a:r>
+            <a:r>
+              <a:rPr lang="en-US" dirty="0" err="1" smtClean="0"/>
               <a:t>arr.decl.h</a:t>
             </a:r>
             <a:r>
@@ -11102,12 +11165,24 @@
               <a:t>Main : </a:t>
             </a:r>
             <a:r>
-              <a:rPr lang="en-US" dirty="0" err="1"/>
+              <a:rPr lang="en-US" dirty="0" err="1" smtClean="0"/>
               <a:t>CBase</a:t>
             </a:r>
             <a:r>
-              <a:rPr lang="en-US" dirty="0"/>
-              <a:t> Main { </a:t>
+              <a:rPr lang="en-US" dirty="0" err="1" smtClean="0"/>
+              <a:t>_</a:t>
+            </a:r>
+            <a:r>
+              <a:rPr lang="en-US" dirty="0" err="1" smtClean="0"/>
+              <a:t>Main</a:t>
+            </a:r>
+            <a:r>
+              <a:rPr lang="en-US" dirty="0" smtClean="0"/>
+              <a:t> </a:t>
+            </a:r>
+            <a:r>
+              <a:rPr lang="en-US" dirty="0"/>
+              <a:t>{ </a:t>
             </a:r>
             <a:endParaRPr lang="en-US" dirty="0" smtClean="0"/>
           </a:p>
@@ -11243,7 +11318,111 @@
             </a:r>
             <a:r>
               <a:rPr lang="en-US" dirty="0" smtClean="0"/>
-              <a:t>, </a:t>
+              <a:t>)</a:t>
+            </a:r>
+            <a:r>
+              <a:rPr lang="en-US" dirty="0" smtClean="0"/>
+              <a:t>;</a:t>
+            </a:r>
+          </a:p>
+          <a:p>
+            <a:pPr marL="0" indent="0">
+              <a:buNone/>
+            </a:pPr>
+            <a:r>
+              <a:rPr lang="en-US" dirty="0"/>
+              <a:t> </a:t>
+            </a:r>
+            <a:r>
+              <a:rPr lang="en-US" dirty="0" smtClean="0"/>
+              <a:t>     p[0].</a:t>
+            </a:r>
+            <a:r>
+              <a:rPr lang="en-US" dirty="0" err="1" smtClean="0"/>
+              <a:t>printHello</a:t>
+            </a:r>
+            <a:r>
+              <a:rPr lang="en-US" dirty="0" smtClean="0"/>
+              <a:t>();</a:t>
+            </a:r>
+          </a:p>
+          <a:p>
+            <a:pPr marL="0" indent="0">
+              <a:buNone/>
+            </a:pPr>
+            <a:r>
+              <a:rPr lang="en-US" dirty="0"/>
+              <a:t> </a:t>
+            </a:r>
+            <a:r>
+              <a:rPr lang="en-US" dirty="0" smtClean="0"/>
+              <a:t>  </a:t>
+            </a:r>
+            <a:r>
+              <a:rPr lang="en-US" dirty="0" smtClean="0"/>
+              <a:t>}</a:t>
+            </a:r>
+            <a:endParaRPr lang="en-US" dirty="0" smtClean="0"/>
+          </a:p>
+          <a:p>
+            <a:pPr marL="0" indent="0">
+              <a:buNone/>
+            </a:pPr>
+            <a:r>
+              <a:rPr lang="en-US" dirty="0" smtClean="0"/>
+              <a:t>};</a:t>
+            </a:r>
+          </a:p>
+          <a:p>
+            <a:pPr marL="0" indent="0">
+              <a:buNone/>
+            </a:pPr>
+            <a:endParaRPr lang="en-US" dirty="0"/>
+          </a:p>
+          <a:p>
+            <a:pPr marL="0" indent="0">
+              <a:buNone/>
+            </a:pPr>
+            <a:r>
+              <a:rPr lang="en-US" b="1" dirty="0" err="1" smtClean="0"/>
+              <a:t>struct</a:t>
+            </a:r>
+            <a:r>
+              <a:rPr lang="en-US" dirty="0" smtClean="0"/>
+              <a:t> hello : </a:t>
+            </a:r>
+            <a:r>
+              <a:rPr lang="en-US" dirty="0" err="1" smtClean="0"/>
+              <a:t>CBase_hello</a:t>
+            </a:r>
+            <a:r>
+              <a:rPr lang="en-US" dirty="0" smtClean="0"/>
+              <a:t> {</a:t>
+            </a:r>
+          </a:p>
+          <a:p>
+            <a:pPr marL="0" indent="0">
+              <a:buNone/>
+            </a:pPr>
+            <a:r>
+              <a:rPr lang="en-US" b="1" dirty="0"/>
+              <a:t> </a:t>
+            </a:r>
+            <a:r>
+              <a:rPr lang="en-US" b="1" dirty="0" smtClean="0"/>
+              <a:t>  </a:t>
+            </a:r>
+            <a:r>
+              <a:rPr lang="en-US" dirty="0" smtClean="0"/>
+              <a:t>hello(</a:t>
+            </a:r>
+            <a:r>
+              <a:rPr lang="en-US" b="1" dirty="0" err="1" smtClean="0"/>
+              <a:t>int</a:t>
+            </a:r>
+            <a:r>
+              <a:rPr lang="en-US" dirty="0" smtClean="0"/>
+              <a:t> n) : </a:t>
             </a:r>
             <a:r>
               <a:rPr lang="en-US" dirty="0" err="1" smtClean="0"/>
@@ -11251,7 +11430,7 @@
             </a:r>
             <a:r>
               <a:rPr lang="en-US" dirty="0" smtClean="0"/>
-              <a:t>);</a:t>
+              <a:t>(n) { }</a:t>
             </a:r>
           </a:p>
           <a:p>
@@ -11264,7 +11443,36 @@
             </a:r>
             <a:r>
               <a:rPr lang="en-US" dirty="0" smtClean="0"/>
-              <a:t>     p[0].</a:t>
+              <a:t>  hello(</a:t>
+            </a:r>
+            <a:r>
+              <a:rPr lang="en-US" dirty="0" err="1" smtClean="0"/>
+              <a:t>CkMigrateMessage</a:t>
+            </a:r>
+            <a:r>
+              <a:rPr lang="en-US" dirty="0" smtClean="0"/>
+              <a:t>*) { }</a:t>
+            </a:r>
+          </a:p>
+          <a:p>
+            <a:pPr marL="0" indent="0">
+              <a:buNone/>
+            </a:pPr>
+            <a:r>
+              <a:rPr lang="en-US" dirty="0"/>
+              <a:t> </a:t>
+            </a:r>
+            <a:r>
+              <a:rPr lang="en-US" dirty="0" smtClean="0"/>
+              <a:t>  </a:t>
+            </a:r>
+            <a:r>
+              <a:rPr lang="en-US" b="1" dirty="0" smtClean="0"/>
+              <a:t>void</a:t>
+            </a:r>
+            <a:r>
+              <a:rPr lang="en-US" dirty="0" smtClean="0"/>
+              <a:t> </a:t>
             </a:r>
             <a:r>
               <a:rPr lang="en-US" dirty="0" err="1" smtClean="0"/>
@@ -11272,6 +11480,88 @@
             </a:r>
             <a:r>
               <a:rPr lang="en-US" dirty="0" smtClean="0"/>
+              <a:t>() {</a:t>
+            </a:r>
+          </a:p>
+          <a:p>
+            <a:pPr marL="0" indent="0">
+              <a:buNone/>
+            </a:pPr>
+            <a:r>
+              <a:rPr lang="en-US" dirty="0"/>
+              <a:t> </a:t>
+            </a:r>
+            <a:r>
+              <a:rPr lang="en-US" dirty="0" smtClean="0"/>
+              <a:t>     </a:t>
+            </a:r>
+            <a:r>
+              <a:rPr lang="en-US" dirty="0" err="1" smtClean="0"/>
+              <a:t>CkPrintf</a:t>
+            </a:r>
+            <a:r>
+              <a:rPr lang="en-US" dirty="0" smtClean="0"/>
+              <a:t>(“PE[%d]: hello from p[%d]\n”, </a:t>
+            </a:r>
+            <a:r>
+              <a:rPr lang="en-US" dirty="0" err="1" smtClean="0"/>
+              <a:t>CkMyPe</a:t>
+            </a:r>
+            <a:r>
+              <a:rPr lang="en-US" dirty="0" smtClean="0"/>
+              <a:t>(), </a:t>
+            </a:r>
+            <a:r>
+              <a:rPr lang="en-US" dirty="0" err="1" smtClean="0"/>
+              <a:t>thisIndex</a:t>
+            </a:r>
+            <a:r>
+              <a:rPr lang="en-US" dirty="0" smtClean="0"/>
+              <a:t>);</a:t>
+            </a:r>
+          </a:p>
+          <a:p>
+            <a:pPr marL="0" indent="0">
+              <a:buNone/>
+            </a:pPr>
+            <a:r>
+              <a:rPr lang="en-US" dirty="0"/>
+              <a:t> </a:t>
+            </a:r>
+            <a:r>
+              <a:rPr lang="en-US" dirty="0" smtClean="0"/>
+              <a:t>     </a:t>
+            </a:r>
+            <a:r>
+              <a:rPr lang="en-US" b="1" dirty="0" smtClean="0"/>
+              <a:t>if </a:t>
+            </a:r>
+            <a:r>
+              <a:rPr lang="en-US" dirty="0" smtClean="0"/>
+              <a:t>(</a:t>
+            </a:r>
+            <a:r>
+              <a:rPr lang="en-US" dirty="0" err="1" smtClean="0"/>
+              <a:t>thisIndex</a:t>
+            </a:r>
+            <a:r>
+              <a:rPr lang="en-US" dirty="0" smtClean="0"/>
+              <a:t> == </a:t>
+            </a:r>
+            <a:r>
+              <a:rPr lang="en-US" dirty="0" err="1" smtClean="0"/>
+              <a:t>arraySize</a:t>
+            </a:r>
+            <a:r>
+              <a:rPr lang="en-US" dirty="0" smtClean="0"/>
+              <a:t> – 1) </a:t>
+            </a:r>
+            <a:r>
+              <a:rPr lang="en-US" dirty="0" err="1" smtClean="0"/>
+              <a:t>CkExit</a:t>
+            </a:r>
+            <a:r>
+              <a:rPr lang="en-US" dirty="0" smtClean="0"/>
               <a:t>();</a:t>
             </a:r>
           </a:p>
@@ -11285,6 +11575,51 @@
             </a:r>
             <a:r>
               <a:rPr lang="en-US" dirty="0" smtClean="0"/>
+              <a:t>     </a:t>
+            </a:r>
+            <a:r>
+              <a:rPr lang="en-US" b="1" dirty="0" smtClean="0"/>
+              <a:t>else</a:t>
+            </a:r>
+            <a:r>
+              <a:rPr lang="en-US" dirty="0" smtClean="0"/>
+              <a:t> </a:t>
+            </a:r>
+            <a:r>
+              <a:rPr lang="en-US" dirty="0" err="1" smtClean="0"/>
+              <a:t>thisProxy</a:t>
+            </a:r>
+            <a:r>
+              <a:rPr lang="en-US" dirty="0" smtClean="0"/>
+              <a:t>[</a:t>
+            </a:r>
+            <a:r>
+              <a:rPr lang="en-US" dirty="0" err="1" smtClean="0"/>
+              <a:t>thisIndex</a:t>
+            </a:r>
+            <a:r>
+              <a:rPr lang="en-US" dirty="0" smtClean="0"/>
+              <a:t> + 1].</a:t>
+            </a:r>
+            <a:r>
+              <a:rPr lang="en-US" dirty="0" err="1" smtClean="0"/>
+              <a:t>printHello</a:t>
+            </a:r>
+            <a:r>
+              <a:rPr lang="en-US" dirty="0" smtClean="0"/>
+              <a:t>();</a:t>
+            </a:r>
+          </a:p>
+          <a:p>
+            <a:pPr marL="0" indent="0">
+              <a:buNone/>
+            </a:pPr>
+            <a:r>
+              <a:rPr lang="en-US" dirty="0"/>
+              <a:t> </a:t>
+            </a:r>
+            <a:r>
+              <a:rPr lang="en-US" dirty="0" smtClean="0"/>
               <a:t>  };</a:t>
             </a:r>
           </a:p>
@@ -11293,52 +11628,33 @@
               <a:buNone/>
             </a:pPr>
             <a:r>
-              <a:rPr lang="en-US" dirty="0" smtClean="0"/>
-              <a:t>};</a:t>
-            </a:r>
-          </a:p>
-          <a:p>
-            <a:pPr marL="0" indent="0">
-              <a:buNone/>
-            </a:pPr>
-            <a:endParaRPr lang="en-US" dirty="0"/>
-          </a:p>
-          <a:p>
-            <a:pPr marL="0" indent="0">
-              <a:buNone/>
-            </a:pPr>
-            <a:r>
-              <a:rPr lang="en-US" b="1" dirty="0" err="1" smtClean="0"/>
-              <a:t>struct</a:t>
-            </a:r>
-            <a:r>
-              <a:rPr lang="en-US" dirty="0" smtClean="0"/>
-              <a:t> hello : </a:t>
-            </a:r>
-            <a:r>
-              <a:rPr lang="en-US" dirty="0" err="1" smtClean="0"/>
-              <a:t>CBase_hello</a:t>
-            </a:r>
-            <a:r>
-              <a:rPr lang="en-US" dirty="0" smtClean="0"/>
-              <a:t> {</a:t>
-            </a:r>
-          </a:p>
-          <a:p>
-            <a:pPr marL="0" indent="0">
-              <a:buNone/>
-            </a:pPr>
-            <a:r>
-              <a:rPr lang="en-US" b="1" dirty="0"/>
+              <a:rPr lang="en-US" dirty="0"/>
               <a:t> </a:t>
             </a:r>
             <a:r>
+              <a:rPr lang="en-US" dirty="0" smtClean="0"/>
+              <a:t>  </a:t>
+            </a:r>
+            <a:r>
               <a:rPr lang="en-US" b="1" dirty="0" smtClean="0"/>
+              <a:t>private</a:t>
+            </a:r>
+            <a:r>
+              <a:rPr lang="en-US" dirty="0" smtClean="0"/>
+              <a:t>:</a:t>
+            </a:r>
+          </a:p>
+          <a:p>
+            <a:pPr marL="0" indent="0">
+              <a:buNone/>
+            </a:pPr>
+            <a:r>
+              <a:rPr lang="en-US" dirty="0"/>
+              <a:t> </a:t>
+            </a:r>
+            <a:r>
+              <a:rPr lang="en-US" dirty="0" smtClean="0"/>
               <a:t>  </a:t>
-            </a:r>
-            <a:r>
-              <a:rPr lang="en-US" dirty="0" smtClean="0"/>
-              <a:t>hello(</a:t>
             </a:r>
             <a:r>
               <a:rPr lang="en-US" b="1" dirty="0" err="1" smtClean="0"/>
@@ -11346,7 +11662,7 @@
             </a:r>
             <a:r>
               <a:rPr lang="en-US" dirty="0" smtClean="0"/>
-              <a:t> n) : </a:t>
+              <a:t> </a:t>
             </a:r>
             <a:r>
               <a:rPr lang="en-US" dirty="0" err="1" smtClean="0"/>
@@ -11354,246 +11670,6 @@
             </a:r>
             <a:r>
               <a:rPr lang="en-US" dirty="0" smtClean="0"/>
-              <a:t>(n) { }</a:t>
-            </a:r>
-          </a:p>
-          <a:p>
-            <a:pPr marL="0" indent="0">
-              <a:buNone/>
-            </a:pPr>
-            <a:r>
-              <a:rPr lang="en-US" dirty="0"/>
-              <a:t> </a:t>
-            </a:r>
-            <a:r>
-              <a:rPr lang="en-US" dirty="0" smtClean="0"/>
-              <a:t>  hello(</a:t>
-            </a:r>
-            <a:r>
-              <a:rPr lang="en-US" dirty="0" err="1" smtClean="0"/>
-              <a:t>CkMigrateMessage</a:t>
-            </a:r>
-            <a:r>
-              <a:rPr lang="en-US" dirty="0" smtClean="0"/>
-              <a:t>*) { }</a:t>
-            </a:r>
-          </a:p>
-          <a:p>
-            <a:pPr marL="0" indent="0">
-              <a:buNone/>
-            </a:pPr>
-            <a:r>
-              <a:rPr lang="en-US" dirty="0"/>
-              <a:t> </a:t>
-            </a:r>
-            <a:r>
-              <a:rPr lang="en-US" dirty="0" smtClean="0"/>
-              <a:t>  </a:t>
-            </a:r>
-            <a:r>
-              <a:rPr lang="en-US" b="1" dirty="0" smtClean="0"/>
-              <a:t>void</a:t>
-            </a:r>
-            <a:r>
-              <a:rPr lang="en-US" dirty="0" smtClean="0"/>
-              <a:t> </a:t>
-            </a:r>
-            <a:r>
-              <a:rPr lang="en-US" dirty="0" err="1" smtClean="0"/>
-              <a:t>printHello</a:t>
-            </a:r>
-            <a:r>
-              <a:rPr lang="en-US" dirty="0" smtClean="0"/>
-              <a:t>() {</a:t>
-            </a:r>
-          </a:p>
-          <a:p>
-            <a:pPr marL="0" indent="0">
-              <a:buNone/>
-            </a:pPr>
-            <a:r>
-              <a:rPr lang="en-US" dirty="0"/>
-              <a:t> </a:t>
-            </a:r>
-            <a:r>
-              <a:rPr lang="en-US" dirty="0" smtClean="0"/>
-              <a:t>     </a:t>
-            </a:r>
-            <a:r>
-              <a:rPr lang="en-US" dirty="0" err="1" smtClean="0"/>
-              <a:t>CkPrintf</a:t>
-            </a:r>
-            <a:r>
-              <a:rPr lang="en-US" dirty="0" smtClean="0"/>
-              <a:t>(“PE[%d]: hello from p[%d]\n”, </a:t>
-            </a:r>
-            <a:r>
-              <a:rPr lang="en-US" dirty="0" err="1" smtClean="0"/>
-              <a:t>CkMyPe</a:t>
-            </a:r>
-            <a:r>
-              <a:rPr lang="en-US" dirty="0" smtClean="0"/>
-              <a:t>(), </a:t>
-            </a:r>
-            <a:r>
-              <a:rPr lang="en-US" dirty="0" err="1" smtClean="0"/>
-              <a:t>thisIndex</a:t>
-            </a:r>
-            <a:r>
-              <a:rPr lang="en-US" dirty="0" smtClean="0"/>
-              <a:t>);</a:t>
-            </a:r>
-          </a:p>
-          <a:p>
-            <a:pPr marL="0" indent="0">
-              <a:buNone/>
-            </a:pPr>
-            <a:r>
-              <a:rPr lang="en-US" dirty="0"/>
-              <a:t> </a:t>
-            </a:r>
-            <a:r>
-              <a:rPr lang="en-US" dirty="0" smtClean="0"/>
-              <a:t>     </a:t>
-            </a:r>
-            <a:r>
-              <a:rPr lang="en-US" b="1" dirty="0" smtClean="0"/>
-              <a:t>if </a:t>
-            </a:r>
-            <a:r>
-              <a:rPr lang="en-US" dirty="0" smtClean="0"/>
-              <a:t>(</a:t>
-            </a:r>
-            <a:r>
-              <a:rPr lang="en-US" dirty="0" err="1" smtClean="0"/>
-              <a:t>thisIndex</a:t>
-            </a:r>
-            <a:r>
-              <a:rPr lang="en-US" dirty="0" smtClean="0"/>
-              <a:t> == </a:t>
-            </a:r>
-            <a:r>
-              <a:rPr lang="en-US" dirty="0" err="1" smtClean="0"/>
-              <a:t>arraySize</a:t>
-            </a:r>
-            <a:r>
-              <a:rPr lang="en-US" dirty="0" smtClean="0"/>
-              <a:t> – 1) </a:t>
-            </a:r>
-            <a:r>
-              <a:rPr lang="en-US" dirty="0" err="1" smtClean="0"/>
-              <a:t>CkExit</a:t>
-            </a:r>
-            <a:r>
-              <a:rPr lang="en-US" dirty="0" smtClean="0"/>
-              <a:t>();</a:t>
-            </a:r>
-          </a:p>
-          <a:p>
-            <a:pPr marL="0" indent="0">
-              <a:buNone/>
-            </a:pPr>
-            <a:r>
-              <a:rPr lang="en-US" dirty="0"/>
-              <a:t> </a:t>
-            </a:r>
-            <a:r>
-              <a:rPr lang="en-US" dirty="0" smtClean="0"/>
-              <a:t>     </a:t>
-            </a:r>
-            <a:r>
-              <a:rPr lang="en-US" b="1" dirty="0" smtClean="0"/>
-              <a:t>else</a:t>
-            </a:r>
-            <a:r>
-              <a:rPr lang="en-US" dirty="0" smtClean="0"/>
-              <a:t> </a:t>
-            </a:r>
-            <a:r>
-              <a:rPr lang="en-US" dirty="0" err="1" smtClean="0"/>
-              <a:t>thisProxy</a:t>
-            </a:r>
-            <a:r>
-              <a:rPr lang="en-US" dirty="0" smtClean="0"/>
-              <a:t>[</a:t>
-            </a:r>
-            <a:r>
-              <a:rPr lang="en-US" dirty="0" err="1" smtClean="0"/>
-              <a:t>thisIndex</a:t>
-            </a:r>
-            <a:r>
-              <a:rPr lang="en-US" dirty="0" smtClean="0"/>
-              <a:t> + 1].</a:t>
-            </a:r>
-            <a:r>
-              <a:rPr lang="en-US" dirty="0" err="1" smtClean="0"/>
-              <a:t>printHello</a:t>
-            </a:r>
-            <a:r>
-              <a:rPr lang="en-US" dirty="0" smtClean="0"/>
-              <a:t>();</a:t>
-            </a:r>
-          </a:p>
-          <a:p>
-            <a:pPr marL="0" indent="0">
-              <a:buNone/>
-            </a:pPr>
-            <a:r>
-              <a:rPr lang="en-US" dirty="0"/>
-              <a:t> </a:t>
-            </a:r>
-            <a:r>
-              <a:rPr lang="en-US" dirty="0" smtClean="0"/>
-              <a:t>  };</a:t>
-            </a:r>
-          </a:p>
-          <a:p>
-            <a:pPr marL="0" indent="0">
-              <a:buNone/>
-            </a:pPr>
-            <a:r>
-              <a:rPr lang="en-US" dirty="0"/>
-              <a:t> </a:t>
-            </a:r>
-            <a:r>
-              <a:rPr lang="en-US" dirty="0" smtClean="0"/>
-              <a:t>  </a:t>
-            </a:r>
-            <a:r>
-              <a:rPr lang="en-US" b="1" dirty="0" smtClean="0"/>
-              <a:t>private</a:t>
-            </a:r>
-            <a:r>
-              <a:rPr lang="en-US" dirty="0" smtClean="0"/>
-              <a:t>:</a:t>
-            </a:r>
-          </a:p>
-          <a:p>
-            <a:pPr marL="0" indent="0">
-              <a:buNone/>
-            </a:pPr>
-            <a:r>
-              <a:rPr lang="en-US" dirty="0"/>
-              <a:t> </a:t>
-            </a:r>
-            <a:r>
-              <a:rPr lang="en-US" dirty="0" smtClean="0"/>
-              <a:t>  </a:t>
-            </a:r>
-            <a:r>
-              <a:rPr lang="en-US" b="1" dirty="0" err="1" smtClean="0"/>
-              <a:t>int</a:t>
-            </a:r>
-            <a:r>
-              <a:rPr lang="en-US" dirty="0" smtClean="0"/>
-              <a:t> </a:t>
-            </a:r>
-            <a:r>
-              <a:rPr lang="en-US" dirty="0" err="1" smtClean="0"/>
-              <a:t>arraySize</a:t>
-            </a:r>
-            <a:r>
-              <a:rPr lang="en-US" dirty="0" smtClean="0"/>
               <a:t>;</a:t>
             </a:r>
           </a:p>
@@ -11653,7 +11729,7 @@
           <a:p>
             <a:fld id="{B0DE7F91-8F6E-3346-8308-FA806A593B23}" type="datetime2">
               <a:rPr lang="en-US" smtClean="0"/>
-              <a:t>Monday, September 8, 14</a:t>
+              <a:t>Tuesday, September 9, 14</a:t>
             </a:fld>
             <a:endParaRPr lang="en-US"/>
           </a:p>
@@ -11796,7 +11872,18 @@
             </a:r>
             <a:r>
               <a:rPr lang="en-US" dirty="0"/>
-              <a:t> projections to link line to enable tracing</a:t>
+              <a:t> </a:t>
+            </a:r>
+            <a:r>
+              <a:rPr lang="en-US" dirty="0">
+                <a:latin typeface="Consolas"/>
+                <a:cs typeface="Consolas"/>
+              </a:rPr>
+              <a:t>projections</a:t>
+            </a:r>
+            <a:r>
+              <a:rPr lang="en-US" dirty="0"/>
+              <a:t> to link line to enable tracing</a:t>
             </a:r>
           </a:p>
           <a:p>
@@ -11849,24 +11936,41 @@
         </p:nvSpPr>
         <p:spPr>
           <a:xfrm>
-            <a:off x="457200" y="5474535"/>
-            <a:ext cx="8229600" cy="862141"/>
+            <a:off x="457199" y="5474535"/>
+            <a:ext cx="8539163" cy="862141"/>
           </a:xfrm>
         </p:spPr>
         <p:txBody>
-          <a:bodyPr/>
-          <a:lstStyle/>
-          <a:p>
-            <a:r>
-              <a:rPr lang="en-US" dirty="0" err="1">
+          <a:bodyPr>
+            <a:normAutofit/>
+          </a:bodyPr>
+          <a:lstStyle/>
+          <a:p>
+            <a:r>
+              <a:rPr lang="en-US" sz="2200" dirty="0" err="1">
                 <a:latin typeface="Consolas"/>
                 <a:cs typeface="Consolas"/>
               </a:rPr>
               <a:t>arrayHello</a:t>
             </a:r>
             <a:r>
-              <a:rPr lang="en-US" dirty="0"/>
-              <a:t> on BG/Q 16 Nodes, mode c16, 1024 elements (4 per process)</a:t>
+              <a:rPr lang="en-US" sz="2200" dirty="0"/>
+              <a:t> on BG/Q 16 Nodes, mode c16, 1024 elements </a:t>
+            </a:r>
+            <a:r>
+              <a:rPr lang="en-US" sz="2200" dirty="0"/>
+              <a:t/>
+            </a:r>
+            <a:br>
+              <a:rPr lang="en-US" sz="2200" dirty="0"/>
+            </a:br>
+            <a:r>
+              <a:rPr lang="en-US" sz="2200" dirty="0" smtClean="0"/>
+              <a:t>(</a:t>
+            </a:r>
+            <a:r>
+              <a:rPr lang="en-US" sz="2200" dirty="0"/>
+              <a:t>4 per process)</a:t>
             </a:r>
           </a:p>
         </p:txBody>
@@ -11888,7 +11992,7 @@
           <a:p>
             <a:fld id="{DF9B12D0-D6C3-584A-99EB-13FA193C843F}" type="datetime2">
               <a:rPr lang="en-US" smtClean="0"/>
-              <a:t>Monday, September 8, 14</a:t>
+              <a:t>Tuesday, September 9, 14</a:t>
             </a:fld>
             <a:endParaRPr lang="en-US" dirty="0"/>
           </a:p>
@@ -12027,6 +12131,9 @@
           <a:bodyPr/>
           <a:lstStyle/>
           <a:p>
+            <a:pPr marL="0" indent="0">
+              <a:buNone/>
+            </a:pPr>
             <a:r>
               <a:rPr lang="en-US" dirty="0" smtClean="0"/>
               <a:t>.ci file:</a:t>
@@ -12216,6 +12323,9 @@
           <a:bodyPr/>
           <a:lstStyle/>
           <a:p>
+            <a:pPr marL="0" indent="0">
+              <a:buNone/>
+            </a:pPr>
             <a:r>
               <a:rPr lang="en-US" dirty="0" smtClean="0"/>
               <a:t>.C file:</a:t>
@@ -12274,16 +12384,20 @@
               <a:t> </a:t>
             </a:r>
             <a:r>
-              <a:rPr lang="en-US" dirty="0" err="1"/>
+              <a:rPr lang="en-US" dirty="0" err="1" smtClean="0"/>
               <a:t>CBase</a:t>
             </a:r>
             <a:r>
-              <a:rPr lang="en-US" dirty="0"/>
+              <a:rPr lang="en-US" dirty="0" err="1" smtClean="0"/>
+              <a:t>_</a:t>
+            </a:r>
+            <a:r>
+              <a:rPr lang="en-US" dirty="0" err="1" smtClean="0"/>
+              <a:t>foo</a:t>
+            </a:r>
+            <a:r>
+              <a:rPr lang="en-US" dirty="0" smtClean="0"/>
               <a:t> </a:t>
-            </a:r>
-            <a:r>
-              <a:rPr lang="en-US" dirty="0" smtClean="0"/>
-              <a:t>foo </a:t>
             </a:r>
             <a:r>
               <a:rPr lang="en-US" dirty="0"/>
@@ -12380,16 +12494,20 @@
               <a:t> </a:t>
             </a:r>
             <a:r>
-              <a:rPr lang="en-US" dirty="0" err="1"/>
+              <a:rPr lang="en-US" dirty="0" err="1" smtClean="0"/>
               <a:t>CBase</a:t>
             </a:r>
             <a:r>
-              <a:rPr lang="en-US" dirty="0"/>
+              <a:rPr lang="en-US" dirty="0" err="1" smtClean="0"/>
+              <a:t>_</a:t>
+            </a:r>
+            <a:r>
+              <a:rPr lang="en-US" dirty="0" err="1" smtClean="0"/>
+              <a:t>bar</a:t>
+            </a:r>
+            <a:r>
+              <a:rPr lang="en-US" dirty="0" smtClean="0"/>
               <a:t> </a:t>
-            </a:r>
-            <a:r>
-              <a:rPr lang="en-US" dirty="0" smtClean="0"/>
-              <a:t>bar </a:t>
             </a:r>
             <a:r>
               <a:rPr lang="en-US" dirty="0"/>
@@ -12459,7 +12577,7 @@
           <a:p>
             <a:fld id="{B67F7A0B-A97C-6941-B30D-536C43882AD6}" type="datetime2">
               <a:rPr lang="en-US" smtClean="0"/>
-              <a:t>Monday, September 8, 14</a:t>
+              <a:t>Tuesday, September 9, 14</a:t>
             </a:fld>
             <a:endParaRPr lang="en-US" dirty="0"/>
           </a:p>
@@ -12679,12 +12797,16 @@
               <a:t>CProxy</a:t>
             </a:r>
             <a:r>
-              <a:rPr lang="en-US" dirty="0" smtClean="0"/>
-              <a:t> </a:t>
-            </a:r>
-            <a:r>
-              <a:rPr lang="en-US" dirty="0"/>
-              <a:t>foo::</a:t>
+              <a:rPr lang="en-US" dirty="0" err="1" smtClean="0"/>
+              <a:t>_</a:t>
+            </a:r>
+            <a:r>
+              <a:rPr lang="en-US" dirty="0" err="1" smtClean="0"/>
+              <a:t>foo</a:t>
+            </a:r>
+            <a:r>
+              <a:rPr lang="en-US" dirty="0"/>
+              <a:t>::</a:t>
             </a:r>
             <a:r>
               <a:rPr lang="en-US" dirty="0" err="1"/>
@@ -12709,12 +12831,16 @@
               <a:t>CProxy</a:t>
             </a:r>
             <a:r>
-              <a:rPr lang="en-US" dirty="0" smtClean="0"/>
-              <a:t> </a:t>
-            </a:r>
-            <a:r>
-              <a:rPr lang="en-US" dirty="0"/>
-              <a:t>bar::</a:t>
+              <a:rPr lang="en-US" dirty="0" err="1" smtClean="0"/>
+              <a:t>_</a:t>
+            </a:r>
+            <a:r>
+              <a:rPr lang="en-US" dirty="0" err="1" smtClean="0"/>
+              <a:t>bar</a:t>
+            </a:r>
+            <a:r>
+              <a:rPr lang="en-US" dirty="0"/>
+              <a:t>::</a:t>
             </a:r>
             <a:r>
               <a:rPr lang="en-US" dirty="0" err="1"/>
@@ -12748,7 +12874,7 @@
         </p:nvSpPr>
         <p:spPr>
           <a:xfrm>
-            <a:off x="457200" y="3484632"/>
+            <a:off x="457200" y="3646047"/>
             <a:ext cx="8229600" cy="409742"/>
           </a:xfrm>
         </p:spPr>
@@ -12778,7 +12904,7 @@
         </p:nvSpPr>
         <p:spPr>
           <a:xfrm>
-            <a:off x="457200" y="4096612"/>
+            <a:off x="457200" y="4096611"/>
             <a:ext cx="8229600" cy="351889"/>
           </a:xfrm>
           <a:solidFill>
@@ -12800,12 +12926,20 @@
               <a:buNone/>
             </a:pPr>
             <a:r>
-              <a:rPr lang="en-US" dirty="0" err="1"/>
+              <a:rPr lang="en-US" dirty="0" err="1" smtClean="0"/>
               <a:t>CProxy</a:t>
             </a:r>
             <a:r>
-              <a:rPr lang="en-US" dirty="0"/>
-              <a:t> foo </a:t>
+              <a:rPr lang="en-US" dirty="0" err="1" smtClean="0"/>
+              <a:t>_</a:t>
+            </a:r>
+            <a:r>
+              <a:rPr lang="en-US" dirty="0" err="1" smtClean="0"/>
+              <a:t>foo</a:t>
+            </a:r>
+            <a:r>
+              <a:rPr lang="en-US" dirty="0" smtClean="0"/>
+              <a:t> </a:t>
             </a:r>
             <a:r>
               <a:rPr lang="en-US" dirty="0" err="1"/>
@@ -12816,12 +12950,20 @@
               <a:t> = </a:t>
             </a:r>
             <a:r>
-              <a:rPr lang="en-US" dirty="0" err="1"/>
+              <a:rPr lang="en-US" dirty="0" err="1" smtClean="0"/>
               <a:t>CProxy</a:t>
             </a:r>
             <a:r>
-              <a:rPr lang="en-US" dirty="0"/>
-              <a:t> foo::</a:t>
+              <a:rPr lang="en-US" dirty="0" err="1" smtClean="0"/>
+              <a:t>_</a:t>
+            </a:r>
+            <a:r>
+              <a:rPr lang="en-US" dirty="0" err="1" smtClean="0"/>
+              <a:t>foo</a:t>
+            </a:r>
+            <a:r>
+              <a:rPr lang="en-US" dirty="0"/>
+              <a:t>::</a:t>
             </a:r>
             <a:r>
               <a:rPr lang="en-US" dirty="0" err="1"/>
@@ -12849,7 +12991,7 @@
         </p:nvSpPr>
         <p:spPr>
           <a:xfrm>
-            <a:off x="457200" y="4631795"/>
+            <a:off x="457200" y="4618140"/>
             <a:ext cx="8229600" cy="673773"/>
           </a:xfrm>
           <a:prstGeom prst="rect">
@@ -13046,7 +13188,7 @@
         </p:nvSpPr>
         <p:spPr>
           <a:xfrm>
-            <a:off x="457200" y="5534170"/>
+            <a:off x="457200" y="5411279"/>
             <a:ext cx="8229600" cy="351889"/>
           </a:xfrm>
           <a:prstGeom prst="rect">
@@ -13273,7 +13415,7 @@
           <a:p>
             <a:fld id="{E90B5A3E-A983-9844-9A00-7072B7AE2A15}" type="datetime2">
               <a:rPr lang="en-US" smtClean="0"/>
-              <a:t>Monday, September 8, 14</a:t>
+              <a:t>Tuesday, September 9, 14</a:t>
             </a:fld>
             <a:endParaRPr lang="en-US" dirty="0"/>
           </a:p>
@@ -13460,7 +13602,7 @@
                 <a:latin typeface="Lucida Console"/>
                 <a:cs typeface="Lucida Console"/>
               </a:rPr>
-              <a:t>thisIndex</a:t>
+              <a:t>thisIndex.x</a:t>
             </a:r>
             <a:r>
               <a:rPr lang="en-US" i="1" dirty="0" smtClean="0"/>
@@ -13479,13 +13621,19 @@
             </a:r>
             <a:r>
               <a:rPr lang="en-US" dirty="0"/>
-              <a:t> returns the indices of the</a:t>
-            </a:r>
-          </a:p>
-          <a:p>
-            <a:r>
-              <a:rPr lang="en-US" dirty="0"/>
-              <a:t>current </a:t>
+              <a:t> </a:t>
+            </a:r>
+            <a:r>
+              <a:rPr lang="en-US" dirty="0" smtClean="0"/>
+              <a:t>return </a:t>
+            </a:r>
+            <a:r>
+              <a:rPr lang="en-US" dirty="0"/>
+              <a:t>the indices of </a:t>
+            </a:r>
+            <a:r>
+              <a:rPr lang="en-US" dirty="0" smtClean="0"/>
+              <a:t>the current </a:t>
             </a:r>
             <a:r>
               <a:rPr lang="en-US" dirty="0" err="1"/>
@@ -13688,12 +13836,24 @@
               <a:t> </a:t>
             </a:r>
             <a:r>
-              <a:rPr lang="en-US" dirty="0" err="1"/>
+              <a:rPr lang="en-US" dirty="0" err="1" smtClean="0"/>
               <a:t>CBase</a:t>
             </a:r>
             <a:r>
-              <a:rPr lang="en-US" dirty="0"/>
-              <a:t> foo { </a:t>
+              <a:rPr lang="en-US" dirty="0" err="1" smtClean="0"/>
+              <a:t>_</a:t>
+            </a:r>
+            <a:r>
+              <a:rPr lang="en-US" dirty="0" err="1" smtClean="0"/>
+              <a:t>foo</a:t>
+            </a:r>
+            <a:r>
+              <a:rPr lang="en-US" dirty="0" smtClean="0"/>
+              <a:t> </a:t>
+            </a:r>
+            <a:r>
+              <a:rPr lang="en-US" dirty="0"/>
+              <a:t>{ </a:t>
             </a:r>
             <a:endParaRPr lang="en-US" dirty="0" smtClean="0"/>
           </a:p>
@@ -13731,8 +13891,12 @@
               <a:t>CkPrintf</a:t>
             </a:r>
             <a:r>
-              <a:rPr lang="en-US" dirty="0"/>
-              <a:t>(”array index = %d”, </a:t>
+              <a:rPr lang="en-US" dirty="0" smtClean="0"/>
+              <a:t>(“array </a:t>
+            </a:r>
+            <a:r>
+              <a:rPr lang="en-US" dirty="0"/>
+              <a:t>index = %d”, </a:t>
             </a:r>
             <a:r>
               <a:rPr lang="en-US" dirty="0" err="1"/>
@@ -13781,7 +13945,7 @@
           <a:p>
             <a:fld id="{939514C7-2A23-9748-992F-12DCDAF6236F}" type="datetime2">
               <a:rPr lang="en-US" smtClean="0"/>
-              <a:t>Monday, September 8, 14</a:t>
+              <a:t>Tuesday, September 9, 14</a:t>
             </a:fld>
             <a:endParaRPr lang="en-US" dirty="0"/>
           </a:p>
@@ -14135,7 +14299,7 @@
           <a:p>
             <a:fld id="{34621E95-60A9-FF44-9869-513D9D7A859F}" type="datetime2">
               <a:rPr lang="en-US" smtClean="0"/>
-              <a:t>Monday, September 8, 14</a:t>
+              <a:t>Tuesday, September 9, 14</a:t>
             </a:fld>
             <a:endParaRPr lang="en-US"/>
           </a:p>
@@ -14289,11 +14453,11 @@
               <a:t>include </a:t>
             </a:r>
             <a:r>
-              <a:rPr lang="en-US" dirty="0"/>
-              <a:t>”</a:t>
-            </a:r>
-            <a:r>
-              <a:rPr lang="en-US" dirty="0" err="1"/>
+              <a:rPr lang="en-US" dirty="0" smtClean="0"/>
+              <a:t>“</a:t>
+            </a:r>
+            <a:r>
+              <a:rPr lang="en-US" dirty="0" err="1" smtClean="0"/>
               <a:t>arr.decl.h</a:t>
             </a:r>
             <a:r>
@@ -14324,12 +14488,24 @@
               <a:t>Main : </a:t>
             </a:r>
             <a:r>
-              <a:rPr lang="en-US" dirty="0" err="1"/>
+              <a:rPr lang="en-US" dirty="0" err="1" smtClean="0"/>
               <a:t>CBase</a:t>
             </a:r>
             <a:r>
-              <a:rPr lang="en-US" dirty="0"/>
-              <a:t> Main { </a:t>
+              <a:rPr lang="en-US" dirty="0" err="1" smtClean="0"/>
+              <a:t>_</a:t>
+            </a:r>
+            <a:r>
+              <a:rPr lang="en-US" dirty="0" err="1" smtClean="0"/>
+              <a:t>Main</a:t>
+            </a:r>
+            <a:r>
+              <a:rPr lang="en-US" dirty="0" smtClean="0"/>
+              <a:t> </a:t>
+            </a:r>
+            <a:r>
+              <a:rPr lang="en-US" dirty="0"/>
+              <a:t>{ </a:t>
             </a:r>
             <a:endParaRPr lang="en-US" dirty="0" smtClean="0"/>
           </a:p>
@@ -14457,7 +14633,106 @@
             </a:r>
             <a:r>
               <a:rPr lang="en-US" dirty="0" smtClean="0"/>
-              <a:t>, </a:t>
+              <a:t>)</a:t>
+            </a:r>
+            <a:r>
+              <a:rPr lang="en-US" dirty="0" smtClean="0"/>
+              <a:t>;</a:t>
+            </a:r>
+          </a:p>
+          <a:p>
+            <a:pPr marL="0" indent="0">
+              <a:buNone/>
+            </a:pPr>
+            <a:r>
+              <a:rPr lang="en-US" dirty="0"/>
+              <a:t> </a:t>
+            </a:r>
+            <a:r>
+              <a:rPr lang="en-US" dirty="0" smtClean="0"/>
+              <a:t>     p[0].</a:t>
+            </a:r>
+            <a:r>
+              <a:rPr lang="en-US" dirty="0" err="1" smtClean="0"/>
+              <a:t>printHello</a:t>
+            </a:r>
+            <a:r>
+              <a:rPr lang="en-US" dirty="0" smtClean="0"/>
+              <a:t>();</a:t>
+            </a:r>
+          </a:p>
+          <a:p>
+            <a:pPr marL="0" indent="0">
+              <a:buNone/>
+            </a:pPr>
+            <a:r>
+              <a:rPr lang="en-US" dirty="0"/>
+              <a:t> </a:t>
+            </a:r>
+            <a:r>
+              <a:rPr lang="en-US" dirty="0" smtClean="0"/>
+              <a:t>  }</a:t>
+            </a:r>
+          </a:p>
+          <a:p>
+            <a:pPr marL="0" indent="0">
+              <a:buNone/>
+            </a:pPr>
+            <a:r>
+              <a:rPr lang="en-US" dirty="0" smtClean="0"/>
+              <a:t>};</a:t>
+            </a:r>
+          </a:p>
+          <a:p>
+            <a:pPr marL="0" indent="0">
+              <a:buNone/>
+            </a:pPr>
+            <a:endParaRPr lang="en-US" dirty="0"/>
+          </a:p>
+          <a:p>
+            <a:pPr marL="0" indent="0">
+              <a:buNone/>
+            </a:pPr>
+            <a:r>
+              <a:rPr lang="en-US" b="1" dirty="0" err="1" smtClean="0"/>
+              <a:t>struct</a:t>
+            </a:r>
+            <a:r>
+              <a:rPr lang="en-US" dirty="0" smtClean="0"/>
+              <a:t> hello : </a:t>
+            </a:r>
+            <a:r>
+              <a:rPr lang="en-US" dirty="0" err="1" smtClean="0"/>
+              <a:t>CBase_hello</a:t>
+            </a:r>
+            <a:r>
+              <a:rPr lang="en-US" dirty="0" smtClean="0"/>
+              <a:t> {</a:t>
+            </a:r>
+          </a:p>
+          <a:p>
+            <a:pPr marL="0" indent="0">
+              <a:buNone/>
+            </a:pPr>
+            <a:r>
+              <a:rPr lang="en-US" b="1" dirty="0"/>
+              <a:t> </a:t>
+            </a:r>
+            <a:r>
+              <a:rPr lang="en-US" b="1" dirty="0" smtClean="0"/>
+              <a:t>  </a:t>
+            </a:r>
+            <a:r>
+              <a:rPr lang="en-US" dirty="0" smtClean="0"/>
+              <a:t>hello(</a:t>
+            </a:r>
+            <a:r>
+              <a:rPr lang="en-US" b="1" dirty="0" err="1" smtClean="0"/>
+              <a:t>int</a:t>
+            </a:r>
+            <a:r>
+              <a:rPr lang="en-US" dirty="0" smtClean="0"/>
+              <a:t> n) : </a:t>
             </a:r>
             <a:r>
               <a:rPr lang="en-US" dirty="0" err="1" smtClean="0"/>
@@ -14465,7 +14740,7 @@
             </a:r>
             <a:r>
               <a:rPr lang="en-US" dirty="0" smtClean="0"/>
-              <a:t>);</a:t>
+              <a:t>(n) { }</a:t>
             </a:r>
           </a:p>
           <a:p>
@@ -14478,7 +14753,36 @@
             </a:r>
             <a:r>
               <a:rPr lang="en-US" dirty="0" smtClean="0"/>
-              <a:t>     p[0].</a:t>
+              <a:t>  hello(</a:t>
+            </a:r>
+            <a:r>
+              <a:rPr lang="en-US" dirty="0" err="1" smtClean="0"/>
+              <a:t>CkMigrateMessage</a:t>
+            </a:r>
+            <a:r>
+              <a:rPr lang="en-US" dirty="0" smtClean="0"/>
+              <a:t>*) { }</a:t>
+            </a:r>
+          </a:p>
+          <a:p>
+            <a:pPr marL="0" indent="0">
+              <a:buNone/>
+            </a:pPr>
+            <a:r>
+              <a:rPr lang="en-US" dirty="0"/>
+              <a:t> </a:t>
+            </a:r>
+            <a:r>
+              <a:rPr lang="en-US" dirty="0" smtClean="0"/>
+              <a:t>  </a:t>
+            </a:r>
+            <a:r>
+              <a:rPr lang="en-US" b="1" dirty="0" smtClean="0"/>
+              <a:t>void</a:t>
+            </a:r>
+            <a:r>
+              <a:rPr lang="en-US" dirty="0" smtClean="0"/>
+              <a:t> </a:t>
             </a:r>
             <a:r>
               <a:rPr lang="en-US" dirty="0" err="1" smtClean="0"/>
@@ -14486,6 +14790,88 @@
             </a:r>
             <a:r>
               <a:rPr lang="en-US" dirty="0" smtClean="0"/>
+              <a:t>() {</a:t>
+            </a:r>
+          </a:p>
+          <a:p>
+            <a:pPr marL="0" indent="0">
+              <a:buNone/>
+            </a:pPr>
+            <a:r>
+              <a:rPr lang="en-US" dirty="0"/>
+              <a:t> </a:t>
+            </a:r>
+            <a:r>
+              <a:rPr lang="en-US" dirty="0" smtClean="0"/>
+              <a:t>     </a:t>
+            </a:r>
+            <a:r>
+              <a:rPr lang="en-US" dirty="0" err="1" smtClean="0"/>
+              <a:t>CkPrintf</a:t>
+            </a:r>
+            <a:r>
+              <a:rPr lang="en-US" dirty="0" smtClean="0"/>
+              <a:t>(“PE[%d]: hello from p[%d]\n”, </a:t>
+            </a:r>
+            <a:r>
+              <a:rPr lang="en-US" dirty="0" err="1" smtClean="0"/>
+              <a:t>CkMyPe</a:t>
+            </a:r>
+            <a:r>
+              <a:rPr lang="en-US" dirty="0" smtClean="0"/>
+              <a:t>(), </a:t>
+            </a:r>
+            <a:r>
+              <a:rPr lang="en-US" dirty="0" err="1" smtClean="0"/>
+              <a:t>thisIndex</a:t>
+            </a:r>
+            <a:r>
+              <a:rPr lang="en-US" dirty="0" smtClean="0"/>
+              <a:t>);</a:t>
+            </a:r>
+          </a:p>
+          <a:p>
+            <a:pPr marL="0" indent="0">
+              <a:buNone/>
+            </a:pPr>
+            <a:r>
+              <a:rPr lang="en-US" dirty="0"/>
+              <a:t> </a:t>
+            </a:r>
+            <a:r>
+              <a:rPr lang="en-US" dirty="0" smtClean="0"/>
+              <a:t>     </a:t>
+            </a:r>
+            <a:r>
+              <a:rPr lang="en-US" b="1" dirty="0" smtClean="0"/>
+              <a:t>if</a:t>
+            </a:r>
+            <a:r>
+              <a:rPr lang="en-US" dirty="0" smtClean="0"/>
+              <a:t> (</a:t>
+            </a:r>
+            <a:r>
+              <a:rPr lang="en-US" dirty="0" err="1" smtClean="0"/>
+              <a:t>thisIndex</a:t>
+            </a:r>
+            <a:r>
+              <a:rPr lang="en-US" dirty="0" smtClean="0"/>
+              <a:t> == </a:t>
+            </a:r>
+            <a:r>
+              <a:rPr lang="en-US" dirty="0" err="1" smtClean="0"/>
+              <a:t>arraySize</a:t>
+            </a:r>
+            <a:r>
+              <a:rPr lang="en-US" dirty="0" smtClean="0"/>
+              <a:t> – 1) </a:t>
+            </a:r>
+            <a:r>
+              <a:rPr lang="en-US" dirty="0" err="1" smtClean="0"/>
+              <a:t>CkExit</a:t>
+            </a:r>
+            <a:r>
+              <a:rPr lang="en-US" dirty="0" smtClean="0"/>
               <a:t>();</a:t>
             </a:r>
           </a:p>
@@ -14499,6 +14885,51 @@
             </a:r>
             <a:r>
               <a:rPr lang="en-US" dirty="0" smtClean="0"/>
+              <a:t>     </a:t>
+            </a:r>
+            <a:r>
+              <a:rPr lang="en-US" b="1" dirty="0" smtClean="0"/>
+              <a:t>else</a:t>
+            </a:r>
+            <a:r>
+              <a:rPr lang="en-US" dirty="0" smtClean="0"/>
+              <a:t> </a:t>
+            </a:r>
+            <a:r>
+              <a:rPr lang="en-US" dirty="0" err="1" smtClean="0"/>
+              <a:t>thisProxy</a:t>
+            </a:r>
+            <a:r>
+              <a:rPr lang="en-US" dirty="0" smtClean="0"/>
+              <a:t>[</a:t>
+            </a:r>
+            <a:r>
+              <a:rPr lang="en-US" dirty="0" err="1" smtClean="0"/>
+              <a:t>thisIndex</a:t>
+            </a:r>
+            <a:r>
+              <a:rPr lang="en-US" dirty="0" smtClean="0"/>
+              <a:t> + 1].</a:t>
+            </a:r>
+            <a:r>
+              <a:rPr lang="en-US" dirty="0" err="1" smtClean="0"/>
+              <a:t>printHello</a:t>
+            </a:r>
+            <a:r>
+              <a:rPr lang="en-US" dirty="0" smtClean="0"/>
+              <a:t>();</a:t>
+            </a:r>
+          </a:p>
+          <a:p>
+            <a:pPr marL="0" indent="0">
+              <a:buNone/>
+            </a:pPr>
+            <a:r>
+              <a:rPr lang="en-US" dirty="0"/>
+              <a:t> </a:t>
+            </a:r>
+            <a:r>
+              <a:rPr lang="en-US" dirty="0" smtClean="0"/>
               <a:t>  }</a:t>
             </a:r>
           </a:p>
@@ -14507,52 +14938,33 @@
               <a:buNone/>
             </a:pPr>
             <a:r>
-              <a:rPr lang="en-US" dirty="0" smtClean="0"/>
-              <a:t>};</a:t>
-            </a:r>
-          </a:p>
-          <a:p>
-            <a:pPr marL="0" indent="0">
-              <a:buNone/>
-            </a:pPr>
-            <a:endParaRPr lang="en-US" dirty="0"/>
-          </a:p>
-          <a:p>
-            <a:pPr marL="0" indent="0">
-              <a:buNone/>
-            </a:pPr>
-            <a:r>
-              <a:rPr lang="en-US" b="1" dirty="0" err="1" smtClean="0"/>
-              <a:t>struct</a:t>
-            </a:r>
-            <a:r>
-              <a:rPr lang="en-US" dirty="0" smtClean="0"/>
-              <a:t> hello : </a:t>
-            </a:r>
-            <a:r>
-              <a:rPr lang="en-US" dirty="0" err="1" smtClean="0"/>
-              <a:t>CBase_hello</a:t>
-            </a:r>
-            <a:r>
-              <a:rPr lang="en-US" dirty="0" smtClean="0"/>
-              <a:t> {</a:t>
-            </a:r>
-          </a:p>
-          <a:p>
-            <a:pPr marL="0" indent="0">
-              <a:buNone/>
-            </a:pPr>
-            <a:r>
-              <a:rPr lang="en-US" b="1" dirty="0"/>
+              <a:rPr lang="en-US" dirty="0"/>
               <a:t> </a:t>
             </a:r>
             <a:r>
+              <a:rPr lang="en-US" dirty="0" smtClean="0"/>
+              <a:t>  </a:t>
+            </a:r>
+            <a:r>
               <a:rPr lang="en-US" b="1" dirty="0" smtClean="0"/>
+              <a:t>private</a:t>
+            </a:r>
+            <a:r>
+              <a:rPr lang="en-US" dirty="0" smtClean="0"/>
+              <a:t>:</a:t>
+            </a:r>
+          </a:p>
+          <a:p>
+            <a:pPr marL="0" indent="0">
+              <a:buNone/>
+            </a:pPr>
+            <a:r>
+              <a:rPr lang="en-US" dirty="0"/>
+              <a:t> </a:t>
+            </a:r>
+            <a:r>
+              <a:rPr lang="en-US" dirty="0" smtClean="0"/>
               <a:t>  </a:t>
-            </a:r>
-            <a:r>
-              <a:rPr lang="en-US" dirty="0" smtClean="0"/>
-              <a:t>hello(</a:t>
             </a:r>
             <a:r>
               <a:rPr lang="en-US" b="1" dirty="0" err="1" smtClean="0"/>
@@ -14560,7 +14972,7 @@
             </a:r>
             <a:r>
               <a:rPr lang="en-US" dirty="0" smtClean="0"/>
-              <a:t> n) : </a:t>
+              <a:t> </a:t>
             </a:r>
             <a:r>
               <a:rPr lang="en-US" dirty="0" err="1" smtClean="0"/>
@@ -14568,238 +14980,6 @@
             </a:r>
             <a:r>
               <a:rPr lang="en-US" dirty="0" smtClean="0"/>
-              <a:t>(n) { }</a:t>
-            </a:r>
-          </a:p>
-          <a:p>
-            <a:pPr marL="0" indent="0">
-              <a:buNone/>
-            </a:pPr>
-            <a:r>
-              <a:rPr lang="en-US" dirty="0"/>
-              <a:t> </a:t>
-            </a:r>
-            <a:r>
-              <a:rPr lang="en-US" dirty="0" smtClean="0"/>
-              <a:t>  hello(</a:t>
-            </a:r>
-            <a:r>
-              <a:rPr lang="en-US" dirty="0" err="1" smtClean="0"/>
-              <a:t>CkMigrateMessage</a:t>
-            </a:r>
-            <a:r>
-              <a:rPr lang="en-US" dirty="0" smtClean="0"/>
-              <a:t>*) { }</a:t>
-            </a:r>
-          </a:p>
-          <a:p>
-            <a:pPr marL="0" indent="0">
-              <a:buNone/>
-            </a:pPr>
-            <a:r>
-              <a:rPr lang="en-US" dirty="0"/>
-              <a:t> </a:t>
-            </a:r>
-            <a:r>
-              <a:rPr lang="en-US" dirty="0" smtClean="0"/>
-              <a:t>  </a:t>
-            </a:r>
-            <a:r>
-              <a:rPr lang="en-US" b="1" dirty="0" smtClean="0"/>
-              <a:t>void</a:t>
-            </a:r>
-            <a:r>
-              <a:rPr lang="en-US" dirty="0" smtClean="0"/>
-              <a:t> </a:t>
-            </a:r>
-            <a:r>
-              <a:rPr lang="en-US" dirty="0" err="1" smtClean="0"/>
-              <a:t>printHello</a:t>
-            </a:r>
-            <a:r>
-              <a:rPr lang="en-US" dirty="0" smtClean="0"/>
-              <a:t>() {</a:t>
-            </a:r>
-          </a:p>
-          <a:p>
-            <a:pPr marL="0" indent="0">
-              <a:buNone/>
-            </a:pPr>
-            <a:r>
-              <a:rPr lang="en-US" dirty="0"/>
-              <a:t> </a:t>
-            </a:r>
-            <a:r>
-              <a:rPr lang="en-US" dirty="0" smtClean="0"/>
-              <a:t>     </a:t>
-            </a:r>
-            <a:r>
-              <a:rPr lang="en-US" dirty="0" err="1" smtClean="0"/>
-              <a:t>CkPrintf</a:t>
-            </a:r>
-            <a:r>
-              <a:rPr lang="en-US" dirty="0" smtClean="0"/>
-              <a:t>(“PE[%d]: hello from p[%d]\n”, CkMyPe90, </a:t>
-            </a:r>
-            <a:r>
-              <a:rPr lang="en-US" dirty="0" err="1" smtClean="0"/>
-              <a:t>thisIndex</a:t>
-            </a:r>
-            <a:r>
-              <a:rPr lang="en-US" dirty="0" smtClean="0"/>
-              <a:t>);</a:t>
-            </a:r>
-          </a:p>
-          <a:p>
-            <a:pPr marL="0" indent="0">
-              <a:buNone/>
-            </a:pPr>
-            <a:r>
-              <a:rPr lang="en-US" dirty="0"/>
-              <a:t> </a:t>
-            </a:r>
-            <a:r>
-              <a:rPr lang="en-US" dirty="0" smtClean="0"/>
-              <a:t>     </a:t>
-            </a:r>
-            <a:r>
-              <a:rPr lang="en-US" b="1" dirty="0" smtClean="0"/>
-              <a:t>if</a:t>
-            </a:r>
-            <a:r>
-              <a:rPr lang="en-US" dirty="0" smtClean="0"/>
-              <a:t> (</a:t>
-            </a:r>
-            <a:r>
-              <a:rPr lang="en-US" dirty="0" err="1" smtClean="0"/>
-              <a:t>thisIndex</a:t>
-            </a:r>
-            <a:r>
-              <a:rPr lang="en-US" dirty="0" smtClean="0"/>
-              <a:t> == </a:t>
-            </a:r>
-            <a:r>
-              <a:rPr lang="en-US" dirty="0" err="1" smtClean="0"/>
-              <a:t>arraySize</a:t>
-            </a:r>
-            <a:r>
-              <a:rPr lang="en-US" dirty="0" smtClean="0"/>
-              <a:t> – 1) </a:t>
-            </a:r>
-            <a:r>
-              <a:rPr lang="en-US" dirty="0" err="1" smtClean="0"/>
-              <a:t>CkExit</a:t>
-            </a:r>
-            <a:r>
-              <a:rPr lang="en-US" dirty="0" smtClean="0"/>
-              <a:t>();</a:t>
-            </a:r>
-          </a:p>
-          <a:p>
-            <a:pPr marL="0" indent="0">
-              <a:buNone/>
-            </a:pPr>
-            <a:r>
-              <a:rPr lang="en-US" dirty="0"/>
-              <a:t> </a:t>
-            </a:r>
-            <a:r>
-              <a:rPr lang="en-US" dirty="0" smtClean="0"/>
-              <a:t>     </a:t>
-            </a:r>
-            <a:r>
-              <a:rPr lang="en-US" b="1" dirty="0" smtClean="0"/>
-              <a:t>else</a:t>
-            </a:r>
-            <a:r>
-              <a:rPr lang="en-US" dirty="0" smtClean="0"/>
-              <a:t> </a:t>
-            </a:r>
-            <a:r>
-              <a:rPr lang="en-US" dirty="0" err="1" smtClean="0"/>
-              <a:t>thisProxy</a:t>
-            </a:r>
-            <a:r>
-              <a:rPr lang="en-US" dirty="0" smtClean="0"/>
-              <a:t>[</a:t>
-            </a:r>
-            <a:r>
-              <a:rPr lang="en-US" dirty="0" err="1" smtClean="0"/>
-              <a:t>thisIndex</a:t>
-            </a:r>
-            <a:r>
-              <a:rPr lang="en-US" dirty="0" smtClean="0"/>
-              <a:t> + 1].</a:t>
-            </a:r>
-            <a:r>
-              <a:rPr lang="en-US" dirty="0" err="1" smtClean="0"/>
-              <a:t>printHello</a:t>
-            </a:r>
-            <a:r>
-              <a:rPr lang="en-US" dirty="0" smtClean="0"/>
-              <a:t>();</a:t>
-            </a:r>
-          </a:p>
-          <a:p>
-            <a:pPr marL="0" indent="0">
-              <a:buNone/>
-            </a:pPr>
-            <a:r>
-              <a:rPr lang="en-US" dirty="0"/>
-              <a:t> </a:t>
-            </a:r>
-            <a:r>
-              <a:rPr lang="en-US" dirty="0" smtClean="0"/>
-              <a:t>  }</a:t>
-            </a:r>
-          </a:p>
-          <a:p>
-            <a:pPr marL="0" indent="0">
-              <a:buNone/>
-            </a:pPr>
-            <a:r>
-              <a:rPr lang="en-US" dirty="0"/>
-              <a:t> </a:t>
-            </a:r>
-            <a:r>
-              <a:rPr lang="en-US" dirty="0" smtClean="0"/>
-              <a:t>  </a:t>
-            </a:r>
-            <a:r>
-              <a:rPr lang="en-US" b="1" dirty="0" smtClean="0"/>
-              <a:t>private</a:t>
-            </a:r>
-            <a:r>
-              <a:rPr lang="en-US" dirty="0" smtClean="0"/>
-              <a:t>:</a:t>
-            </a:r>
-          </a:p>
-          <a:p>
-            <a:pPr marL="0" indent="0">
-              <a:buNone/>
-            </a:pPr>
-            <a:r>
-              <a:rPr lang="en-US" dirty="0"/>
-              <a:t> </a:t>
-            </a:r>
-            <a:r>
-              <a:rPr lang="en-US" dirty="0" smtClean="0"/>
-              <a:t>  </a:t>
-            </a:r>
-            <a:r>
-              <a:rPr lang="en-US" b="1" dirty="0" err="1" smtClean="0"/>
-              <a:t>int</a:t>
-            </a:r>
-            <a:r>
-              <a:rPr lang="en-US" dirty="0" smtClean="0"/>
-              <a:t> </a:t>
-            </a:r>
-            <a:r>
-              <a:rPr lang="en-US" dirty="0" err="1" smtClean="0"/>
-              <a:t>arraySize</a:t>
-            </a:r>
-            <a:r>
-              <a:rPr lang="en-US" dirty="0" smtClean="0"/>
               <a:t>;</a:t>
             </a:r>
           </a:p>
@@ -14859,7 +15039,7 @@
           <a:p>
             <a:fld id="{34621E95-60A9-FF44-9869-513D9D7A859F}" type="datetime2">
               <a:rPr lang="en-US" smtClean="0"/>
-              <a:t>Monday, September 8, 14</a:t>
+              <a:t>Tuesday, September 9, 14</a:t>
             </a:fld>
             <a:endParaRPr lang="en-US"/>
           </a:p>
@@ -15060,19 +15240,36 @@
           </a:xfrm>
         </p:spPr>
         <p:txBody>
-          <a:bodyPr/>
-          <a:lstStyle/>
-          <a:p>
-            <a:r>
-              <a:rPr lang="en-US" dirty="0" err="1">
+          <a:bodyPr>
+            <a:normAutofit/>
+          </a:bodyPr>
+          <a:lstStyle/>
+          <a:p>
+            <a:r>
+              <a:rPr lang="en-US" sz="2200" dirty="0" err="1">
                 <a:latin typeface="Consolas"/>
                 <a:cs typeface="Consolas"/>
               </a:rPr>
               <a:t>arrayHello</a:t>
             </a:r>
             <a:r>
-              <a:rPr lang="en-US" dirty="0"/>
-              <a:t> on BG/Q 16 Nodes, mode c16, 1024 elements (4 per process)</a:t>
+              <a:rPr lang="en-US" sz="2200" dirty="0"/>
+              <a:t> on BG/Q 16 Nodes, mode c16, 1024 </a:t>
+            </a:r>
+            <a:r>
+              <a:rPr lang="en-US" sz="2200" dirty="0" smtClean="0"/>
+              <a:t>elements</a:t>
+            </a:r>
+            <a:br>
+              <a:rPr lang="en-US" sz="2200" dirty="0" smtClean="0"/>
+            </a:br>
+            <a:r>
+              <a:rPr lang="en-US" sz="2200" dirty="0" smtClean="0"/>
+              <a:t>(</a:t>
+            </a:r>
+            <a:r>
+              <a:rPr lang="en-US" sz="2200" dirty="0"/>
+              <a:t>4 per process)</a:t>
             </a:r>
           </a:p>
         </p:txBody>
@@ -15094,7 +15291,7 @@
           <a:p>
             <a:fld id="{DF9B12D0-D6C3-584A-99EB-13FA193C843F}" type="datetime2">
               <a:rPr lang="en-US" smtClean="0"/>
-              <a:t>Monday, September 8, 14</a:t>
+              <a:t>Tuesday, September 9, 14</a:t>
             </a:fld>
             <a:endParaRPr lang="en-US" dirty="0"/>
           </a:p>
@@ -15258,13 +15455,45 @@
           <a:p>
             <a:r>
               <a:rPr lang="en-US" dirty="0"/>
-              <a:t>Applications can specify a mapping, or use simple runtime-provided</a:t>
-            </a:r>
-          </a:p>
-          <a:p>
-            <a:r>
-              <a:rPr lang="en-US" dirty="0"/>
-              <a:t>options (e.g. blocked, round-robin) Distribution can be static, or dynamic!</a:t>
+              <a:t>Applications can specify a </a:t>
+            </a:r>
+            <a:r>
+              <a:rPr lang="en-US" dirty="0" smtClean="0"/>
+              <a:t>mapping </a:t>
+            </a:r>
+            <a:r>
+              <a:rPr lang="en-US" dirty="0"/>
+              <a:t>or use simple runtime-</a:t>
+            </a:r>
+            <a:r>
+              <a:rPr lang="en-US" dirty="0" smtClean="0"/>
+              <a:t>provided options </a:t>
+            </a:r>
+            <a:r>
+              <a:rPr lang="en-US" dirty="0"/>
+              <a:t>(e.g. blocked, round-robin</a:t>
+            </a:r>
+            <a:r>
+              <a:rPr lang="en-US" dirty="0" smtClean="0"/>
+              <a:t>)</a:t>
+            </a:r>
+          </a:p>
+          <a:p>
+            <a:r>
+              <a:rPr lang="en-US" dirty="0" smtClean="0"/>
+              <a:t>Distribution </a:t>
+            </a:r>
+            <a:r>
+              <a:rPr lang="en-US" dirty="0"/>
+              <a:t>can be </a:t>
+            </a:r>
+            <a:r>
+              <a:rPr lang="en-US" dirty="0" smtClean="0"/>
+              <a:t>static </a:t>
+            </a:r>
+            <a:r>
+              <a:rPr lang="en-US" dirty="0"/>
+              <a:t>or dynamic!</a:t>
             </a:r>
           </a:p>
           <a:p>
@@ -15293,7 +15522,7 @@
           <a:p>
             <a:fld id="{34621E95-60A9-FF44-9869-513D9D7A859F}" type="datetime2">
               <a:rPr lang="en-US" smtClean="0"/>
-              <a:t>Monday, September 8, 14</a:t>
+              <a:t>Tuesday, September 9, 14</a:t>
             </a:fld>
             <a:endParaRPr lang="en-US"/>
           </a:p>
@@ -15453,7 +15682,7 @@
               <a:t>The module that contains the </a:t>
             </a:r>
             <a:r>
-              <a:rPr lang="en-US" dirty="0" err="1"/>
+              <a:rPr lang="en-US" i="1" dirty="0" err="1"/>
               <a:t>mainchare</a:t>
             </a:r>
             <a:r>
@@ -15523,7 +15752,7 @@
             <a:endParaRPr lang="en-US" dirty="0" smtClean="0"/>
           </a:p>
           <a:p>
-            <a:pPr marL="0" indent="0" algn="ctr">
+            <a:pPr marL="0" indent="0">
               <a:buNone/>
             </a:pPr>
             <a:r>
@@ -15645,7 +15874,7 @@
           <a:p>
             <a:fld id="{F3B8C30A-50DC-C949-89DD-4F9B44C5753D}" type="datetime2">
               <a:rPr lang="en-US" smtClean="0"/>
-              <a:t>Monday, September 8, 14</a:t>
+              <a:t>Tuesday, September 9, 14</a:t>
             </a:fld>
             <a:endParaRPr lang="en-US" dirty="0"/>
           </a:p>
@@ -15777,7 +16006,21 @@
           <a:p>
             <a:r>
               <a:rPr lang="en-US" dirty="0"/>
-              <a:t>Can develop and test logic in objects separately from their distribution Separation in time: make it work, then make it fast</a:t>
+              <a:t>Can develop and test logic in objects separately from their </a:t>
+            </a:r>
+            <a:r>
+              <a:rPr lang="en-US" dirty="0" smtClean="0"/>
+              <a:t>distribution</a:t>
+            </a:r>
+          </a:p>
+          <a:p>
+            <a:r>
+              <a:rPr lang="en-US" dirty="0" smtClean="0"/>
+              <a:t>Separation </a:t>
+            </a:r>
+            <a:r>
+              <a:rPr lang="en-US" dirty="0"/>
+              <a:t>in time: make it work, then make it fast</a:t>
             </a:r>
           </a:p>
           <a:p>
@@ -15845,7 +16088,7 @@
           <a:p>
             <a:fld id="{34621E95-60A9-FF44-9869-513D9D7A859F}" type="datetime2">
               <a:rPr lang="en-US" smtClean="0"/>
-              <a:t>Monday, September 8, 14</a:t>
+              <a:t>Tuesday, September 9, 14</a:t>
             </a:fld>
             <a:endParaRPr lang="en-US"/>
           </a:p>
@@ -15953,9 +16196,80 @@
           </a:p>
         </p:txBody>
       </p:sp>
+      <p:sp>
+        <p:nvSpPr>
+          <p:cNvPr id="4" name="Date Placeholder 3"/>
+          <p:cNvSpPr>
+            <a:spLocks noGrp="1"/>
+          </p:cNvSpPr>
+          <p:nvPr>
+            <p:ph type="dt" sz="half" idx="10"/>
+          </p:nvPr>
+        </p:nvSpPr>
+        <p:spPr/>
+        <p:txBody>
+          <a:bodyPr/>
+          <a:lstStyle/>
+          <a:p>
+            <a:fld id="{34621E95-60A9-FF44-9869-513D9D7A859F}" type="datetime2">
+              <a:rPr lang="en-US" smtClean="0"/>
+              <a:t>Tuesday, September 9, 14</a:t>
+            </a:fld>
+            <a:endParaRPr lang="en-US"/>
+          </a:p>
+        </p:txBody>
+      </p:sp>
+      <p:sp>
+        <p:nvSpPr>
+          <p:cNvPr id="5" name="Footer Placeholder 4"/>
+          <p:cNvSpPr>
+            <a:spLocks noGrp="1"/>
+          </p:cNvSpPr>
+          <p:nvPr>
+            <p:ph type="ftr" sz="quarter" idx="11"/>
+          </p:nvPr>
+        </p:nvSpPr>
+        <p:spPr/>
+        <p:txBody>
+          <a:bodyPr/>
+          <a:lstStyle/>
+          <a:p>
+            <a:pPr algn="r"/>
+            <a:r>
+              <a:rPr lang="en-US" smtClean="0"/>
+              <a:t>Sanjay Kalé and PPL (UIUC) – Parallel Migratable Objects </a:t>
+            </a:r>
+            <a:endParaRPr lang="en-US" dirty="0"/>
+          </a:p>
+        </p:txBody>
+      </p:sp>
+      <p:sp>
+        <p:nvSpPr>
+          <p:cNvPr id="6" name="Slide Number Placeholder 5"/>
+          <p:cNvSpPr>
+            <a:spLocks noGrp="1"/>
+          </p:cNvSpPr>
+          <p:nvPr>
+            <p:ph type="sldNum" sz="quarter" idx="12"/>
+          </p:nvPr>
+        </p:nvSpPr>
+        <p:spPr/>
+        <p:txBody>
+          <a:bodyPr/>
+          <a:lstStyle/>
+          <a:p>
+            <a:fld id="{0CFEC368-1D7A-4F81-ABF6-AE0E36BAF64C}" type="slidenum">
+              <a:rPr lang="en-US" smtClean="0"/>
+              <a:pPr/>
+              <a:t>31</a:t>
+            </a:fld>
+            <a:endParaRPr lang="en-US"/>
+          </a:p>
+        </p:txBody>
+      </p:sp>
       <p:pic>
         <p:nvPicPr>
-          <p:cNvPr id="7" name="Content Placeholder 6" descr="elements2.pdf"/>
+          <p:cNvPr id="8" name="Content Placeholder 7" descr="elements2.pdf"/>
           <p:cNvPicPr>
             <a:picLocks noGrp="1" noChangeAspect="1"/>
           </p:cNvPicPr>
@@ -15978,77 +16292,6 @@
         </p:blipFill>
         <p:spPr/>
       </p:pic>
-      <p:sp>
-        <p:nvSpPr>
-          <p:cNvPr id="4" name="Date Placeholder 3"/>
-          <p:cNvSpPr>
-            <a:spLocks noGrp="1"/>
-          </p:cNvSpPr>
-          <p:nvPr>
-            <p:ph type="dt" sz="half" idx="10"/>
-          </p:nvPr>
-        </p:nvSpPr>
-        <p:spPr/>
-        <p:txBody>
-          <a:bodyPr/>
-          <a:lstStyle/>
-          <a:p>
-            <a:fld id="{34621E95-60A9-FF44-9869-513D9D7A859F}" type="datetime2">
-              <a:rPr lang="en-US" smtClean="0"/>
-              <a:t>Monday, September 8, 14</a:t>
-            </a:fld>
-            <a:endParaRPr lang="en-US"/>
-          </a:p>
-        </p:txBody>
-      </p:sp>
-      <p:sp>
-        <p:nvSpPr>
-          <p:cNvPr id="5" name="Footer Placeholder 4"/>
-          <p:cNvSpPr>
-            <a:spLocks noGrp="1"/>
-          </p:cNvSpPr>
-          <p:nvPr>
-            <p:ph type="ftr" sz="quarter" idx="11"/>
-          </p:nvPr>
-        </p:nvSpPr>
-        <p:spPr/>
-        <p:txBody>
-          <a:bodyPr/>
-          <a:lstStyle/>
-          <a:p>
-            <a:pPr algn="r"/>
-            <a:r>
-              <a:rPr lang="en-US" smtClean="0"/>
-              <a:t>Sanjay Kalé and PPL (UIUC) – Parallel Migratable Objects </a:t>
-            </a:r>
-            <a:endParaRPr lang="en-US" dirty="0"/>
-          </a:p>
-        </p:txBody>
-      </p:sp>
-      <p:sp>
-        <p:nvSpPr>
-          <p:cNvPr id="6" name="Slide Number Placeholder 5"/>
-          <p:cNvSpPr>
-            <a:spLocks noGrp="1"/>
-          </p:cNvSpPr>
-          <p:nvPr>
-            <p:ph type="sldNum" sz="quarter" idx="12"/>
-          </p:nvPr>
-        </p:nvSpPr>
-        <p:spPr/>
-        <p:txBody>
-          <a:bodyPr/>
-          <a:lstStyle/>
-          <a:p>
-            <a:fld id="{0CFEC368-1D7A-4F81-ABF6-AE0E36BAF64C}" type="slidenum">
-              <a:rPr lang="en-US" smtClean="0"/>
-              <a:pPr/>
-              <a:t>31</a:t>
-            </a:fld>
-            <a:endParaRPr lang="en-US"/>
-          </a:p>
-        </p:txBody>
-      </p:sp>
     </p:spTree>
     <p:extLst>
       <p:ext uri="{BB962C8B-B14F-4D97-AF65-F5344CB8AC3E}">
@@ -16120,7 +16363,7 @@
           <a:p>
             <a:fld id="{BD5AFB16-13FE-DF4A-8CB7-09756A57B2EA}" type="datetime2">
               <a:rPr lang="en-US" smtClean="0"/>
-              <a:t>Monday, September 8, 14</a:t>
+              <a:t>Tuesday, September 9, 14</a:t>
             </a:fld>
             <a:endParaRPr lang="en-US" dirty="0"/>
           </a:p>
@@ -16344,7 +16587,7 @@
           <a:p>
             <a:fld id="{BD5AFB16-13FE-DF4A-8CB7-09756A57B2EA}" type="datetime2">
               <a:rPr lang="en-US" smtClean="0"/>
-              <a:t>Monday, September 8, 14</a:t>
+              <a:t>Tuesday, September 9, 14</a:t>
             </a:fld>
             <a:endParaRPr lang="en-US" dirty="0"/>
           </a:p>
@@ -16491,19 +16734,29 @@
           </a:ln>
         </p:spPr>
         <p:txBody>
-          <a:bodyPr/>
-          <a:lstStyle/>
-          <a:p>
-            <a:pPr marL="0" indent="0">
-              <a:buNone/>
-            </a:pPr>
-            <a:r>
-              <a:rPr lang="en-US" dirty="0" err="1"/>
+          <a:bodyPr>
+            <a:normAutofit fontScale="92500"/>
+          </a:bodyPr>
+          <a:lstStyle/>
+          <a:p>
+            <a:pPr marL="0" indent="0">
+              <a:buNone/>
+            </a:pPr>
+            <a:r>
+              <a:rPr lang="en-US" dirty="0" err="1" smtClean="0"/>
               <a:t>CProxy</a:t>
             </a:r>
             <a:r>
-              <a:rPr lang="en-US" dirty="0"/>
-              <a:t> Hello </a:t>
+              <a:rPr lang="en-US" dirty="0" err="1" smtClean="0"/>
+              <a:t>_</a:t>
+            </a:r>
+            <a:r>
+              <a:rPr lang="en-US" dirty="0" err="1" smtClean="0"/>
+              <a:t>Hello</a:t>
+            </a:r>
+            <a:r>
+              <a:rPr lang="en-US" dirty="0" smtClean="0"/>
+              <a:t> </a:t>
             </a:r>
             <a:r>
               <a:rPr lang="en-US" dirty="0" err="1"/>
@@ -16514,31 +16767,49 @@
               <a:t> = </a:t>
             </a:r>
             <a:r>
-              <a:rPr lang="en-US" dirty="0" err="1"/>
+              <a:rPr lang="en-US" dirty="0" err="1" smtClean="0"/>
               <a:t>CProxy</a:t>
             </a:r>
             <a:r>
-              <a:rPr lang="en-US" dirty="0"/>
-              <a:t> Hello::</a:t>
+              <a:rPr lang="en-US" dirty="0" err="1" smtClean="0"/>
+              <a:t>_</a:t>
+            </a:r>
+            <a:r>
+              <a:rPr lang="en-US" dirty="0" err="1" smtClean="0"/>
+              <a:t>Hello</a:t>
+            </a:r>
+            <a:r>
+              <a:rPr lang="en-US" dirty="0" smtClean="0"/>
+              <a:t>:</a:t>
+            </a:r>
+            <a:r>
+              <a:rPr lang="en-US" dirty="0"/>
+              <a:t>:</a:t>
             </a:r>
             <a:r>
               <a:rPr lang="en-US" dirty="0" err="1"/>
               <a:t>ckNew</a:t>
             </a:r>
             <a:r>
-              <a:rPr lang="en-US" dirty="0"/>
+              <a:rPr lang="en-US" dirty="0" smtClean="0"/>
               <a:t>(</a:t>
             </a:r>
             <a:r>
-              <a:rPr lang="en-US" dirty="0" err="1"/>
+              <a:rPr lang="en-US" dirty="0" err="1" smtClean="0"/>
               <a:t>helloArraySize</a:t>
             </a:r>
             <a:r>
               <a:rPr lang="en-US" dirty="0"/>
               <a:t>); </a:t>
             </a:r>
-            <a:r>
-              <a:rPr lang="en-US" dirty="0" err="1"/>
+            <a:endParaRPr lang="en-US" dirty="0" smtClean="0"/>
+          </a:p>
+          <a:p>
+            <a:pPr marL="0" indent="0">
+              <a:buNone/>
+            </a:pPr>
+            <a:r>
+              <a:rPr lang="en-US" dirty="0" err="1" smtClean="0"/>
               <a:t>helloArray.foo</a:t>
             </a:r>
             <a:r>
@@ -16608,18 +16879,20 @@
           </a:ln>
         </p:spPr>
         <p:txBody>
-          <a:bodyPr/>
-          <a:lstStyle/>
-          <a:p>
-            <a:pPr marL="0" indent="0">
-              <a:buNone/>
-            </a:pPr>
-            <a:r>
-              <a:rPr lang="en-US" dirty="0" err="1"/>
+          <a:bodyPr>
+            <a:normAutofit/>
+          </a:bodyPr>
+          <a:lstStyle/>
+          <a:p>
+            <a:pPr marL="0" indent="0">
+              <a:buNone/>
+            </a:pPr>
+            <a:r>
+              <a:rPr lang="en-US" sz="2200" dirty="0" err="1"/>
               <a:t>thisProxy.foo</a:t>
             </a:r>
             <a:r>
-              <a:rPr lang="en-US" dirty="0"/>
+              <a:rPr lang="en-US" sz="2200" dirty="0"/>
               <a:t>()</a:t>
             </a:r>
           </a:p>
@@ -17041,14 +17314,14 @@
               <a:buNone/>
             </a:pPr>
             <a:r>
-              <a:rPr lang="en-US" dirty="0" err="1" smtClean="0"/>
+              <a:rPr lang="en-US" sz="2200" dirty="0" err="1" smtClean="0"/>
               <a:t>p.foo</a:t>
             </a:r>
             <a:r>
-              <a:rPr lang="en-US" dirty="0" smtClean="0"/>
+              <a:rPr lang="en-US" sz="2200" dirty="0" smtClean="0"/>
               <a:t>()</a:t>
             </a:r>
-            <a:endParaRPr lang="en-US" dirty="0"/>
+            <a:endParaRPr lang="en-US" sz="2200" dirty="0"/>
           </a:p>
         </p:txBody>
       </p:sp>
@@ -17228,7 +17501,7 @@
           <a:p>
             <a:fld id="{34621E95-60A9-FF44-9869-513D9D7A859F}" type="datetime2">
               <a:rPr lang="en-US" smtClean="0"/>
-              <a:t>Monday, September 8, 14</a:t>
+              <a:t>Tuesday, September 9, 14</a:t>
             </a:fld>
             <a:endParaRPr lang="en-US"/>
           </a:p>
@@ -17595,7 +17868,7 @@
           <a:p>
             <a:fld id="{34621E95-60A9-FF44-9869-513D9D7A859F}" type="datetime2">
               <a:rPr lang="en-US" smtClean="0"/>
-              <a:t>Monday, September 8, 14</a:t>
+              <a:t>Tuesday, September 9, 14</a:t>
             </a:fld>
             <a:endParaRPr lang="en-US"/>
           </a:p>
@@ -17659,6 +17932,13 @@
   <p:clrMapOvr>
     <a:masterClrMapping/>
   </p:clrMapOvr>
+  <p:timing>
+    <p:tnLst>
+      <p:par>
+        <p:cTn xmlns:p14="http://schemas.microsoft.com/office/powerpoint/2010/main" id="1" dur="indefinite" restart="never" nodeType="tmRoot"/>
+      </p:par>
+    </p:tnLst>
+  </p:timing>
 </p:sld>
 </file>
 
@@ -17721,7 +18001,7 @@
           <a:p>
             <a:fld id="{BD5AFB16-13FE-DF4A-8CB7-09756A57B2EA}" type="datetime2">
               <a:rPr lang="en-US" smtClean="0"/>
-              <a:t>Monday, September 8, 14</a:t>
+              <a:t>Tuesday, September 9, 14</a:t>
             </a:fld>
             <a:endParaRPr lang="en-US" dirty="0"/>
           </a:p>
@@ -17809,570 +18089,605 @@
               <a:buNone/>
             </a:pPr>
             <a:r>
-              <a:rPr lang="en-US" sz="1050" b="1" dirty="0"/>
+              <a:rPr lang="en-US" sz="1100" b="1" dirty="0"/>
               <a:t>#include </a:t>
             </a:r>
             <a:r>
-              <a:rPr lang="en-US" sz="1050" dirty="0"/>
+              <a:rPr lang="en-US" sz="1100" dirty="0" smtClean="0"/>
+              <a:t>“</a:t>
+            </a:r>
+            <a:r>
+              <a:rPr lang="en-US" sz="1100" dirty="0" err="1" smtClean="0"/>
+              <a:t>reduction.decl.h</a:t>
+            </a:r>
+            <a:r>
+              <a:rPr lang="en-US" sz="1100" dirty="0"/>
+              <a:t>” </a:t>
+            </a:r>
+            <a:r>
+              <a:rPr lang="en-US" sz="1100" dirty="0"/>
+              <a:t/>
+            </a:r>
+            <a:br>
+              <a:rPr lang="en-US" sz="1100" dirty="0"/>
+            </a:br>
+            <a:endParaRPr lang="en-US" sz="1100" dirty="0"/>
+          </a:p>
+          <a:p>
+            <a:pPr marL="0" indent="0">
+              <a:buNone/>
+            </a:pPr>
+            <a:r>
+              <a:rPr lang="en-US" sz="1100" b="1" dirty="0" err="1" smtClean="0"/>
+              <a:t>const</a:t>
+            </a:r>
+            <a:r>
+              <a:rPr lang="en-US" sz="1100" b="1" dirty="0" smtClean="0"/>
+              <a:t> </a:t>
+            </a:r>
+            <a:r>
+              <a:rPr lang="en-US" sz="1100" b="1" dirty="0" err="1"/>
+              <a:t>int</a:t>
+            </a:r>
+            <a:r>
+              <a:rPr lang="en-US" sz="1100" b="1" dirty="0"/>
+              <a:t> </a:t>
+            </a:r>
+            <a:r>
+              <a:rPr lang="en-US" sz="1100" dirty="0" err="1"/>
+              <a:t>numElements</a:t>
+            </a:r>
+            <a:r>
+              <a:rPr lang="en-US" sz="1100" dirty="0"/>
+              <a:t> = 49; </a:t>
+            </a:r>
+            <a:r>
+              <a:rPr lang="en-US" sz="1100" dirty="0" smtClean="0"/>
+              <a:t/>
+            </a:r>
+            <a:br>
+              <a:rPr lang="en-US" sz="1100" dirty="0" smtClean="0"/>
+            </a:br>
+            <a:endParaRPr lang="en-US" sz="1100" dirty="0" smtClean="0"/>
+          </a:p>
+          <a:p>
+            <a:pPr marL="0" indent="0">
+              <a:buNone/>
+            </a:pPr>
+            <a:r>
+              <a:rPr lang="en-US" sz="1100" b="1" dirty="0" smtClean="0"/>
+              <a:t>class </a:t>
+            </a:r>
+            <a:r>
+              <a:rPr lang="en-US" sz="1100" dirty="0"/>
+              <a:t>Main : </a:t>
+            </a:r>
+            <a:r>
+              <a:rPr lang="en-US" sz="1100" b="1" dirty="0"/>
+              <a:t>public </a:t>
+            </a:r>
+            <a:r>
+              <a:rPr lang="en-US" sz="1100" dirty="0" err="1" smtClean="0"/>
+              <a:t>CBase</a:t>
+            </a:r>
+            <a:r>
+              <a:rPr lang="en-US" sz="1100" dirty="0" err="1" smtClean="0"/>
+              <a:t>_</a:t>
+            </a:r>
+            <a:r>
+              <a:rPr lang="en-US" sz="1100" dirty="0" err="1" smtClean="0"/>
+              <a:t>Main</a:t>
+            </a:r>
+            <a:r>
+              <a:rPr lang="en-US" sz="1100" dirty="0" smtClean="0"/>
+              <a:t> </a:t>
+            </a:r>
+            <a:r>
+              <a:rPr lang="en-US" sz="1100" dirty="0"/>
+              <a:t>{ </a:t>
+            </a:r>
+            <a:endParaRPr lang="en-US" sz="1100" dirty="0" smtClean="0"/>
+          </a:p>
+          <a:p>
+            <a:pPr marL="0" indent="0">
+              <a:buNone/>
+            </a:pPr>
+            <a:r>
+              <a:rPr lang="en-US" sz="1100" b="1" dirty="0" smtClean="0"/>
+              <a:t>public</a:t>
+            </a:r>
+            <a:r>
+              <a:rPr lang="en-US" sz="1100" dirty="0"/>
+              <a:t>: </a:t>
+            </a:r>
+          </a:p>
+          <a:p>
+            <a:pPr marL="0" indent="0">
+              <a:buNone/>
+            </a:pPr>
+            <a:r>
+              <a:rPr lang="en-US" sz="1100" dirty="0" smtClean="0"/>
+              <a:t>   Main</a:t>
+            </a:r>
+            <a:r>
+              <a:rPr lang="en-US" sz="1100" dirty="0"/>
+              <a:t>(</a:t>
+            </a:r>
+            <a:r>
+              <a:rPr lang="en-US" sz="1100" dirty="0" err="1"/>
+              <a:t>CkArgMsg</a:t>
+            </a:r>
+            <a:r>
+              <a:rPr lang="en-US" sz="1100" dirty="0"/>
+              <a:t>∗ </a:t>
+            </a:r>
+            <a:r>
+              <a:rPr lang="en-US" sz="1100" dirty="0" err="1"/>
+              <a:t>msg</a:t>
+            </a:r>
+            <a:r>
+              <a:rPr lang="en-US" sz="1100" dirty="0"/>
+              <a:t>) { </a:t>
+            </a:r>
+            <a:r>
+              <a:rPr lang="en-US" sz="1100" dirty="0" err="1" smtClean="0"/>
+              <a:t>CProxy</a:t>
+            </a:r>
+            <a:r>
+              <a:rPr lang="en-US" sz="1100" dirty="0" err="1" smtClean="0"/>
+              <a:t>_</a:t>
+            </a:r>
+            <a:r>
+              <a:rPr lang="en-US" sz="1100" dirty="0" err="1" smtClean="0"/>
+              <a:t>Elem</a:t>
+            </a:r>
+            <a:r>
+              <a:rPr lang="en-US" sz="1100" dirty="0"/>
+              <a:t>::</a:t>
+            </a:r>
+            <a:r>
+              <a:rPr lang="en-US" sz="1100" dirty="0" err="1"/>
+              <a:t>ckNew</a:t>
+            </a:r>
+            <a:r>
+              <a:rPr lang="en-US" sz="1100" dirty="0"/>
+              <a:t>(</a:t>
+            </a:r>
+            <a:r>
+              <a:rPr lang="en-US" sz="1100" dirty="0" err="1"/>
+              <a:t>thisProxy</a:t>
+            </a:r>
+            <a:r>
+              <a:rPr lang="en-US" sz="1100" dirty="0"/>
+              <a:t>, </a:t>
+            </a:r>
+            <a:r>
+              <a:rPr lang="en-US" sz="1100" dirty="0" err="1"/>
+              <a:t>numElements</a:t>
+            </a:r>
+            <a:r>
+              <a:rPr lang="en-US" sz="1100" dirty="0"/>
+              <a:t>); } </a:t>
+            </a:r>
+            <a:endParaRPr lang="en-US" sz="1100" dirty="0" smtClean="0"/>
+          </a:p>
+          <a:p>
+            <a:pPr marL="0" indent="0">
+              <a:buNone/>
+            </a:pPr>
+            <a:r>
+              <a:rPr lang="en-US" sz="1100" dirty="0"/>
+              <a:t> </a:t>
+            </a:r>
+            <a:r>
+              <a:rPr lang="en-US" sz="1100" dirty="0" smtClean="0"/>
+              <a:t>  </a:t>
+            </a:r>
+            <a:r>
+              <a:rPr lang="en-US" sz="1100" b="1" dirty="0" smtClean="0"/>
+              <a:t>void </a:t>
+            </a:r>
+            <a:r>
+              <a:rPr lang="en-US" sz="1100" dirty="0"/>
+              <a:t>done(</a:t>
+            </a:r>
+            <a:r>
+              <a:rPr lang="en-US" sz="1100" b="1" dirty="0" err="1"/>
+              <a:t>int</a:t>
+            </a:r>
+            <a:r>
+              <a:rPr lang="en-US" sz="1100" b="1" dirty="0"/>
+              <a:t> </a:t>
+            </a:r>
+            <a:r>
+              <a:rPr lang="en-US" sz="1100" dirty="0"/>
+              <a:t>value) { </a:t>
+            </a:r>
+            <a:endParaRPr lang="en-US" sz="1100" dirty="0" smtClean="0"/>
+          </a:p>
+          <a:p>
+            <a:pPr marL="0" indent="0">
+              <a:buNone/>
+            </a:pPr>
+            <a:r>
+              <a:rPr lang="en-US" sz="1100" dirty="0" smtClean="0"/>
+              <a:t>      </a:t>
+            </a:r>
+            <a:r>
+              <a:rPr lang="en-US" sz="1100" dirty="0" err="1" smtClean="0"/>
+              <a:t>CkAssert</a:t>
+            </a:r>
+            <a:r>
+              <a:rPr lang="en-US" sz="1100" dirty="0" smtClean="0"/>
+              <a:t>(value == </a:t>
+            </a:r>
+            <a:r>
+              <a:rPr lang="en-US" sz="1100" dirty="0" err="1" smtClean="0"/>
+              <a:t>numElements</a:t>
+            </a:r>
+            <a:r>
+              <a:rPr lang="en-US" sz="1100" dirty="0" smtClean="0"/>
+              <a:t> ∗ (</a:t>
+            </a:r>
+            <a:r>
+              <a:rPr lang="en-US" sz="1100" dirty="0" err="1" smtClean="0"/>
+              <a:t>numElements</a:t>
+            </a:r>
+            <a:r>
+              <a:rPr lang="en-US" sz="1100" dirty="0" smtClean="0"/>
+              <a:t> – 1) / 2); </a:t>
+            </a:r>
+          </a:p>
+          <a:p>
+            <a:pPr marL="0" indent="0">
+              <a:buNone/>
+            </a:pPr>
+            <a:r>
+              <a:rPr lang="en-US" sz="1100" dirty="0" smtClean="0"/>
+              <a:t>      </a:t>
+            </a:r>
+            <a:r>
+              <a:rPr lang="en-US" sz="1100" dirty="0" err="1" smtClean="0"/>
+              <a:t>CkPrintf</a:t>
+            </a:r>
+            <a:r>
+              <a:rPr lang="en-US" sz="1100" dirty="0"/>
+              <a:t>(”value: %d\n”, value);</a:t>
+            </a:r>
+            <a:br>
+              <a:rPr lang="en-US" sz="1100" dirty="0"/>
+            </a:br>
+            <a:r>
+              <a:rPr lang="en-US" sz="1100" dirty="0" smtClean="0"/>
+              <a:t>      </a:t>
+            </a:r>
+            <a:r>
+              <a:rPr lang="en-US" sz="1100" dirty="0" err="1" smtClean="0"/>
+              <a:t>CkExit</a:t>
+            </a:r>
+            <a:r>
+              <a:rPr lang="en-US" sz="1100" dirty="0"/>
+              <a:t>(); </a:t>
+            </a:r>
+            <a:endParaRPr lang="en-US" sz="1100" dirty="0" smtClean="0"/>
+          </a:p>
+          <a:p>
+            <a:pPr marL="0" indent="0">
+              <a:buNone/>
+            </a:pPr>
+            <a:r>
+              <a:rPr lang="en-US" sz="1100" dirty="0" smtClean="0"/>
+              <a:t>   }</a:t>
+            </a:r>
+          </a:p>
+          <a:p>
+            <a:pPr marL="0" indent="0">
+              <a:buNone/>
+            </a:pPr>
+            <a:r>
+              <a:rPr lang="en-US" sz="1100" dirty="0" smtClean="0"/>
+              <a:t>};</a:t>
+            </a:r>
+            <a:br>
+              <a:rPr lang="en-US" sz="1100" dirty="0" smtClean="0"/>
+            </a:br>
+            <a:r>
+              <a:rPr lang="en-US" sz="1100" dirty="0" smtClean="0"/>
+              <a:t> </a:t>
+            </a:r>
+            <a:endParaRPr lang="en-US" sz="1100" dirty="0"/>
+          </a:p>
+          <a:p>
+            <a:pPr marL="0" indent="0">
+              <a:buNone/>
+            </a:pPr>
+            <a:r>
+              <a:rPr lang="en-US" sz="1100" b="1" dirty="0"/>
+              <a:t>class </a:t>
+            </a:r>
+            <a:r>
+              <a:rPr lang="en-US" sz="1100" dirty="0"/>
+              <a:t>Elem : </a:t>
+            </a:r>
+            <a:r>
+              <a:rPr lang="en-US" sz="1100" b="1" dirty="0"/>
+              <a:t>public </a:t>
+            </a:r>
+            <a:r>
+              <a:rPr lang="en-US" sz="1100" dirty="0" err="1"/>
+              <a:t>CBase</a:t>
+            </a:r>
+            <a:r>
+              <a:rPr lang="en-US" sz="1100" dirty="0"/>
+              <a:t> Elem { </a:t>
+            </a:r>
+            <a:endParaRPr lang="en-US" sz="1100" dirty="0" smtClean="0"/>
+          </a:p>
+          <a:p>
+            <a:pPr marL="0" indent="0">
+              <a:buNone/>
+            </a:pPr>
+            <a:r>
+              <a:rPr lang="en-US" sz="1100" b="1" dirty="0" smtClean="0"/>
+              <a:t>public</a:t>
+            </a:r>
+            <a:r>
+              <a:rPr lang="en-US" sz="1100" dirty="0"/>
+              <a:t>: </a:t>
+            </a:r>
+          </a:p>
+          <a:p>
+            <a:pPr marL="0" indent="0">
+              <a:buNone/>
+            </a:pPr>
+            <a:r>
+              <a:rPr lang="en-US" sz="1100" dirty="0" smtClean="0"/>
+              <a:t>   Elem</a:t>
+            </a:r>
+            <a:r>
+              <a:rPr lang="en-US" sz="1100" dirty="0" smtClean="0"/>
+              <a:t>(</a:t>
+            </a:r>
+            <a:r>
+              <a:rPr lang="en-US" sz="1100" dirty="0" err="1" smtClean="0"/>
+              <a:t>CProxy</a:t>
+            </a:r>
+            <a:r>
+              <a:rPr lang="en-US" sz="1100" dirty="0" err="1" smtClean="0"/>
+              <a:t>_</a:t>
+            </a:r>
+            <a:r>
+              <a:rPr lang="en-US" sz="1100" dirty="0" err="1" smtClean="0"/>
+              <a:t>Main</a:t>
+            </a:r>
+            <a:r>
+              <a:rPr lang="en-US" sz="1100" dirty="0" smtClean="0"/>
+              <a:t> </a:t>
+            </a:r>
+            <a:r>
+              <a:rPr lang="en-US" sz="1100" dirty="0" err="1"/>
+              <a:t>mProxy</a:t>
+            </a:r>
+            <a:r>
+              <a:rPr lang="en-US" sz="1100" dirty="0"/>
+              <a:t>) </a:t>
+            </a:r>
+            <a:r>
+              <a:rPr lang="en-US" sz="1100" dirty="0" smtClean="0"/>
+              <a:t>{</a:t>
+            </a:r>
+            <a:br>
+              <a:rPr lang="en-US" sz="1100" dirty="0" smtClean="0"/>
+            </a:br>
+            <a:r>
+              <a:rPr lang="en-US" sz="1100" dirty="0" smtClean="0"/>
+              <a:t>      </a:t>
+            </a:r>
+            <a:r>
+              <a:rPr lang="en-US" sz="1100" b="1" dirty="0" err="1" smtClean="0"/>
+              <a:t>int</a:t>
+            </a:r>
+            <a:r>
+              <a:rPr lang="en-US" sz="1100" b="1" dirty="0" smtClean="0"/>
+              <a:t> </a:t>
+            </a:r>
+            <a:r>
+              <a:rPr lang="en-US" sz="1100" dirty="0" err="1"/>
+              <a:t>val</a:t>
+            </a:r>
+            <a:r>
+              <a:rPr lang="en-US" sz="1100" dirty="0"/>
+              <a:t> = </a:t>
+            </a:r>
+            <a:r>
+              <a:rPr lang="en-US" sz="1100" dirty="0" err="1"/>
+              <a:t>thisIndex</a:t>
+            </a:r>
+            <a:r>
+              <a:rPr lang="en-US" sz="1100" dirty="0"/>
+              <a:t>;</a:t>
+            </a:r>
+            <a:br>
+              <a:rPr lang="en-US" sz="1100" dirty="0"/>
+            </a:br>
+            <a:r>
+              <a:rPr lang="en-US" sz="1100" dirty="0" smtClean="0"/>
+              <a:t>      </a:t>
+            </a:r>
+            <a:r>
+              <a:rPr lang="en-US" sz="1100" dirty="0" err="1" smtClean="0"/>
+              <a:t>CkCallback</a:t>
+            </a:r>
+            <a:r>
+              <a:rPr lang="en-US" sz="1100" dirty="0" smtClean="0"/>
+              <a:t> </a:t>
+            </a:r>
+            <a:r>
+              <a:rPr lang="en-US" sz="1100" dirty="0" err="1"/>
+              <a:t>cb</a:t>
+            </a:r>
+            <a:r>
+              <a:rPr lang="en-US" sz="1100" dirty="0"/>
+              <a:t>(</a:t>
+            </a:r>
+            <a:r>
+              <a:rPr lang="en-US" sz="1100" dirty="0" err="1"/>
+              <a:t>CkReductionTarget</a:t>
+            </a:r>
+            <a:r>
+              <a:rPr lang="en-US" sz="1100" dirty="0"/>
+              <a:t>(Main, done), </a:t>
+            </a:r>
+            <a:r>
+              <a:rPr lang="en-US" sz="1100" dirty="0" err="1"/>
+              <a:t>mProxy</a:t>
+            </a:r>
+            <a:r>
+              <a:rPr lang="en-US" sz="1100" dirty="0"/>
+              <a:t>); </a:t>
+            </a:r>
+            <a:endParaRPr lang="en-US" sz="1100" dirty="0" smtClean="0"/>
+          </a:p>
+          <a:p>
+            <a:pPr marL="0" indent="0">
+              <a:buNone/>
+            </a:pPr>
+            <a:r>
+              <a:rPr lang="en-US" sz="1100" dirty="0"/>
+              <a:t> </a:t>
+            </a:r>
+            <a:r>
+              <a:rPr lang="en-US" sz="1100" dirty="0" smtClean="0"/>
+              <a:t>     contribute</a:t>
+            </a:r>
+            <a:r>
+              <a:rPr lang="en-US" sz="1100" dirty="0"/>
+              <a:t>(</a:t>
+            </a:r>
+            <a:r>
+              <a:rPr lang="en-US" sz="1100" dirty="0" err="1"/>
+              <a:t>sizeof</a:t>
+            </a:r>
+            <a:r>
+              <a:rPr lang="en-US" sz="1100" dirty="0"/>
+              <a:t>(</a:t>
+            </a:r>
+            <a:r>
+              <a:rPr lang="en-US" sz="1100" dirty="0" err="1"/>
+              <a:t>int</a:t>
+            </a:r>
+            <a:r>
+              <a:rPr lang="en-US" sz="1100" dirty="0"/>
+              <a:t>), &amp;</a:t>
+            </a:r>
+            <a:r>
+              <a:rPr lang="en-US" sz="1100" dirty="0" err="1"/>
+              <a:t>val</a:t>
+            </a:r>
+            <a:r>
+              <a:rPr lang="en-US" sz="1100" dirty="0"/>
+              <a:t>, </a:t>
+            </a:r>
+            <a:r>
+              <a:rPr lang="en-US" sz="1100" dirty="0" err="1"/>
+              <a:t>CkReduction</a:t>
+            </a:r>
+            <a:r>
+              <a:rPr lang="en-US" sz="1100" dirty="0"/>
+              <a:t>::</a:t>
+            </a:r>
+            <a:r>
+              <a:rPr lang="en-US" sz="1100" dirty="0" err="1" smtClean="0"/>
+              <a:t>sum_int</a:t>
+            </a:r>
+            <a:r>
+              <a:rPr lang="en-US" sz="1100" dirty="0"/>
+              <a:t>, </a:t>
+            </a:r>
+            <a:r>
+              <a:rPr lang="en-US" sz="1100" dirty="0" err="1"/>
+              <a:t>cb</a:t>
+            </a:r>
+            <a:r>
+              <a:rPr lang="en-US" sz="1100" dirty="0"/>
+              <a:t>); </a:t>
+            </a:r>
+            <a:endParaRPr lang="en-US" sz="1100" dirty="0" smtClean="0"/>
+          </a:p>
+          <a:p>
+            <a:pPr marL="0" indent="0">
+              <a:buNone/>
+            </a:pPr>
+            <a:r>
+              <a:rPr lang="en-US" sz="1100" dirty="0" smtClean="0"/>
+              <a:t>   } </a:t>
+            </a:r>
+          </a:p>
+          <a:p>
+            <a:pPr marL="0" indent="0">
+              <a:buNone/>
+            </a:pPr>
+            <a:r>
+              <a:rPr lang="en-US" sz="1100" dirty="0" smtClean="0"/>
+              <a:t>   </a:t>
+            </a:r>
+            <a:r>
+              <a:rPr lang="en-US" sz="1100" dirty="0" smtClean="0"/>
+              <a:t>Elem</a:t>
+            </a:r>
+            <a:r>
+              <a:rPr lang="en-US" sz="1100" dirty="0"/>
+              <a:t>(</a:t>
+            </a:r>
+            <a:r>
+              <a:rPr lang="en-US" sz="1100" dirty="0" err="1"/>
+              <a:t>CkMigrateMessage</a:t>
+            </a:r>
+            <a:r>
+              <a:rPr lang="en-US" sz="1100" dirty="0"/>
+              <a:t>∗) { } </a:t>
+            </a:r>
+            <a:endParaRPr lang="en-US" sz="1100" dirty="0" smtClean="0"/>
+          </a:p>
+          <a:p>
+            <a:pPr marL="0" indent="0">
+              <a:buNone/>
+            </a:pPr>
+            <a:r>
+              <a:rPr lang="en-US" sz="1100" dirty="0" smtClean="0"/>
+              <a:t>}</a:t>
+            </a:r>
+            <a:r>
+              <a:rPr lang="en-US" sz="1100" dirty="0"/>
+              <a:t>; </a:t>
+            </a:r>
+            <a:r>
+              <a:rPr lang="en-US" sz="1100" dirty="0"/>
+              <a:t/>
+            </a:r>
+            <a:br>
+              <a:rPr lang="en-US" sz="1100" dirty="0"/>
+            </a:br>
+            <a:endParaRPr lang="en-US" sz="1100" dirty="0"/>
+          </a:p>
+          <a:p>
+            <a:pPr marL="0" indent="0">
+              <a:buNone/>
+            </a:pPr>
+            <a:r>
+              <a:rPr lang="en-US" sz="1100" b="1" dirty="0"/>
+              <a:t>#include </a:t>
+            </a:r>
+            <a:r>
+              <a:rPr lang="en-US" sz="1100" dirty="0"/>
               <a:t>”</a:t>
             </a:r>
             <a:r>
-              <a:rPr lang="en-US" sz="1050" dirty="0" err="1"/>
-              <a:t>reduction.decl.h</a:t>
-            </a:r>
-            <a:r>
-              <a:rPr lang="en-US" sz="1050" dirty="0"/>
-              <a:t>” </a:t>
-            </a:r>
-            <a:endParaRPr lang="en-US" sz="1050" dirty="0" smtClean="0"/>
-          </a:p>
-          <a:p>
-            <a:pPr marL="0" indent="0">
-              <a:buNone/>
-            </a:pPr>
-            <a:endParaRPr lang="en-US" sz="1050" dirty="0"/>
-          </a:p>
-          <a:p>
-            <a:pPr marL="0" indent="0">
-              <a:buNone/>
-            </a:pPr>
-            <a:r>
-              <a:rPr lang="en-US" sz="1050" b="1" dirty="0" err="1" smtClean="0"/>
-              <a:t>const</a:t>
-            </a:r>
-            <a:r>
-              <a:rPr lang="en-US" sz="1050" b="1" dirty="0" smtClean="0"/>
-              <a:t> </a:t>
-            </a:r>
-            <a:r>
-              <a:rPr lang="en-US" sz="1050" b="1" dirty="0" err="1"/>
-              <a:t>int</a:t>
-            </a:r>
-            <a:r>
-              <a:rPr lang="en-US" sz="1050" b="1" dirty="0"/>
-              <a:t> </a:t>
-            </a:r>
-            <a:r>
-              <a:rPr lang="en-US" sz="1050" dirty="0" err="1"/>
-              <a:t>numElements</a:t>
-            </a:r>
-            <a:r>
-              <a:rPr lang="en-US" sz="1050" dirty="0"/>
-              <a:t> = 49; </a:t>
-            </a:r>
-          </a:p>
-          <a:p>
-            <a:pPr marL="0" indent="0">
-              <a:buNone/>
-            </a:pPr>
-            <a:endParaRPr lang="en-US" sz="1050" dirty="0" smtClean="0"/>
-          </a:p>
-          <a:p>
-            <a:pPr marL="0" indent="0">
-              <a:buNone/>
-            </a:pPr>
-            <a:r>
-              <a:rPr lang="en-US" sz="1050" b="1" dirty="0" smtClean="0"/>
-              <a:t>class </a:t>
-            </a:r>
-            <a:r>
-              <a:rPr lang="en-US" sz="1050" dirty="0"/>
-              <a:t>Main : </a:t>
-            </a:r>
-            <a:r>
-              <a:rPr lang="en-US" sz="1050" b="1" dirty="0"/>
-              <a:t>public </a:t>
-            </a:r>
-            <a:r>
-              <a:rPr lang="en-US" sz="1050" dirty="0" err="1"/>
-              <a:t>CBase</a:t>
-            </a:r>
-            <a:r>
-              <a:rPr lang="en-US" sz="1050" dirty="0"/>
-              <a:t> Main { </a:t>
-            </a:r>
-            <a:endParaRPr lang="en-US" sz="1050" dirty="0" smtClean="0"/>
-          </a:p>
-          <a:p>
-            <a:pPr marL="0" indent="0">
-              <a:buNone/>
-            </a:pPr>
-            <a:r>
-              <a:rPr lang="en-US" sz="1050" b="1" dirty="0" smtClean="0"/>
-              <a:t>public</a:t>
-            </a:r>
-            <a:r>
-              <a:rPr lang="en-US" sz="1050" dirty="0"/>
-              <a:t>: </a:t>
-            </a:r>
-          </a:p>
-          <a:p>
-            <a:pPr marL="0" indent="0">
-              <a:buNone/>
-            </a:pPr>
-            <a:r>
-              <a:rPr lang="en-US" sz="1050" dirty="0" smtClean="0"/>
-              <a:t>   Main</a:t>
-            </a:r>
-            <a:r>
-              <a:rPr lang="en-US" sz="1050" dirty="0"/>
-              <a:t>(</a:t>
-            </a:r>
-            <a:r>
-              <a:rPr lang="en-US" sz="1050" dirty="0" err="1"/>
-              <a:t>CkArgMsg</a:t>
-            </a:r>
-            <a:r>
-              <a:rPr lang="en-US" sz="1050" dirty="0"/>
-              <a:t>∗ </a:t>
-            </a:r>
-            <a:r>
-              <a:rPr lang="en-US" sz="1050" dirty="0" err="1"/>
-              <a:t>msg</a:t>
-            </a:r>
-            <a:r>
-              <a:rPr lang="en-US" sz="1050" dirty="0"/>
-              <a:t>) { </a:t>
-            </a:r>
-            <a:r>
-              <a:rPr lang="en-US" sz="1050" dirty="0" err="1"/>
-              <a:t>CProxy</a:t>
-            </a:r>
-            <a:r>
-              <a:rPr lang="en-US" sz="1050" dirty="0"/>
-              <a:t> Elem::</a:t>
-            </a:r>
-            <a:r>
-              <a:rPr lang="en-US" sz="1050" dirty="0" err="1"/>
-              <a:t>ckNew</a:t>
-            </a:r>
-            <a:r>
-              <a:rPr lang="en-US" sz="1050" dirty="0"/>
-              <a:t>(</a:t>
-            </a:r>
-            <a:r>
-              <a:rPr lang="en-US" sz="1050" dirty="0" err="1"/>
-              <a:t>thisProxy</a:t>
-            </a:r>
-            <a:r>
-              <a:rPr lang="en-US" sz="1050" dirty="0"/>
-              <a:t>, </a:t>
-            </a:r>
-            <a:r>
-              <a:rPr lang="en-US" sz="1050" dirty="0" err="1"/>
-              <a:t>numElements</a:t>
-            </a:r>
-            <a:r>
-              <a:rPr lang="en-US" sz="1050" dirty="0"/>
-              <a:t>); } </a:t>
-            </a:r>
-            <a:endParaRPr lang="en-US" sz="1050" dirty="0" smtClean="0"/>
-          </a:p>
-          <a:p>
-            <a:pPr marL="0" indent="0">
-              <a:buNone/>
-            </a:pPr>
-            <a:r>
-              <a:rPr lang="en-US" sz="1050" dirty="0"/>
-              <a:t> </a:t>
-            </a:r>
-            <a:r>
-              <a:rPr lang="en-US" sz="1050" dirty="0" smtClean="0"/>
-              <a:t>  </a:t>
-            </a:r>
-            <a:r>
-              <a:rPr lang="en-US" sz="1050" b="1" dirty="0" smtClean="0"/>
-              <a:t>void </a:t>
-            </a:r>
-            <a:r>
-              <a:rPr lang="en-US" sz="1050" dirty="0"/>
-              <a:t>done(</a:t>
-            </a:r>
-            <a:r>
-              <a:rPr lang="en-US" sz="1050" b="1" dirty="0" err="1"/>
-              <a:t>int</a:t>
-            </a:r>
-            <a:r>
-              <a:rPr lang="en-US" sz="1050" b="1" dirty="0"/>
-              <a:t> </a:t>
-            </a:r>
-            <a:r>
-              <a:rPr lang="en-US" sz="1050" dirty="0"/>
-              <a:t>value) { </a:t>
-            </a:r>
-          </a:p>
-          <a:p>
-            <a:pPr marL="0" indent="0">
-              <a:buNone/>
-            </a:pPr>
-            <a:r>
-              <a:rPr lang="en-US" sz="1050" dirty="0" smtClean="0"/>
-              <a:t>      </a:t>
-            </a:r>
-            <a:r>
-              <a:rPr lang="en-US" sz="1050" dirty="0" err="1" smtClean="0"/>
-              <a:t>CkAssert</a:t>
-            </a:r>
-            <a:r>
-              <a:rPr lang="en-US" sz="1050" dirty="0"/>
-              <a:t>(value == </a:t>
-            </a:r>
-            <a:r>
-              <a:rPr lang="en-US" sz="1050" dirty="0" err="1"/>
-              <a:t>numElements</a:t>
-            </a:r>
-            <a:r>
-              <a:rPr lang="en-US" sz="1050" dirty="0"/>
-              <a:t> ∗ (</a:t>
-            </a:r>
-            <a:r>
-              <a:rPr lang="en-US" sz="1050" dirty="0" err="1"/>
-              <a:t>numElements</a:t>
-            </a:r>
-            <a:r>
-              <a:rPr lang="en-US" sz="1050" dirty="0"/>
-              <a:t> 1) / 2); </a:t>
-            </a:r>
-            <a:endParaRPr lang="en-US" sz="1050" dirty="0" smtClean="0"/>
-          </a:p>
-          <a:p>
-            <a:pPr marL="0" indent="0">
-              <a:buNone/>
-            </a:pPr>
-            <a:r>
-              <a:rPr lang="en-US" sz="1050" dirty="0"/>
-              <a:t> </a:t>
-            </a:r>
-            <a:r>
-              <a:rPr lang="en-US" sz="1050" dirty="0" smtClean="0"/>
-              <a:t>     </a:t>
-            </a:r>
-            <a:r>
-              <a:rPr lang="en-US" sz="1050" dirty="0" err="1" smtClean="0"/>
-              <a:t>CkPrintf</a:t>
-            </a:r>
-            <a:r>
-              <a:rPr lang="en-US" sz="1050" dirty="0"/>
-              <a:t>(”value: %d\n”, value);</a:t>
-            </a:r>
-            <a:br>
-              <a:rPr lang="en-US" sz="1050" dirty="0"/>
-            </a:br>
-            <a:r>
-              <a:rPr lang="en-US" sz="1050" dirty="0" smtClean="0"/>
-              <a:t>      </a:t>
-            </a:r>
-            <a:r>
-              <a:rPr lang="en-US" sz="1050" dirty="0" err="1" smtClean="0"/>
-              <a:t>CkExit</a:t>
-            </a:r>
-            <a:r>
-              <a:rPr lang="en-US" sz="1050" dirty="0"/>
-              <a:t>(); </a:t>
-            </a:r>
-          </a:p>
-          <a:p>
-            <a:pPr marL="0" indent="0">
-              <a:buNone/>
-            </a:pPr>
-            <a:r>
-              <a:rPr lang="en-US" sz="1050" dirty="0" smtClean="0"/>
-              <a:t>   };</a:t>
-            </a:r>
-          </a:p>
-          <a:p>
-            <a:pPr marL="0" indent="0">
-              <a:buNone/>
-            </a:pPr>
-            <a:r>
-              <a:rPr lang="en-US" sz="1050" dirty="0" smtClean="0"/>
-              <a:t>};</a:t>
-            </a:r>
-          </a:p>
-          <a:p>
-            <a:pPr marL="0" indent="0">
-              <a:buNone/>
-            </a:pPr>
-            <a:r>
-              <a:rPr lang="en-US" sz="1050" dirty="0" smtClean="0"/>
-              <a:t> </a:t>
-            </a:r>
-            <a:endParaRPr lang="en-US" sz="1050" dirty="0"/>
-          </a:p>
-          <a:p>
-            <a:pPr marL="0" indent="0">
-              <a:buNone/>
-            </a:pPr>
-            <a:r>
-              <a:rPr lang="en-US" sz="1050" b="1" dirty="0"/>
-              <a:t>class </a:t>
-            </a:r>
-            <a:r>
-              <a:rPr lang="en-US" sz="1050" dirty="0"/>
-              <a:t>Elem : </a:t>
-            </a:r>
-            <a:r>
-              <a:rPr lang="en-US" sz="1050" b="1" dirty="0"/>
-              <a:t>public </a:t>
-            </a:r>
-            <a:r>
-              <a:rPr lang="en-US" sz="1050" dirty="0" err="1"/>
-              <a:t>CBase</a:t>
-            </a:r>
-            <a:r>
-              <a:rPr lang="en-US" sz="1050" dirty="0"/>
-              <a:t> Elem { </a:t>
-            </a:r>
-            <a:endParaRPr lang="en-US" sz="1050" dirty="0" smtClean="0"/>
-          </a:p>
-          <a:p>
-            <a:pPr marL="0" indent="0">
-              <a:buNone/>
-            </a:pPr>
-            <a:r>
-              <a:rPr lang="en-US" sz="1050" b="1" dirty="0" smtClean="0"/>
-              <a:t>public</a:t>
-            </a:r>
-            <a:r>
-              <a:rPr lang="en-US" sz="1050" dirty="0"/>
-              <a:t>: </a:t>
-            </a:r>
-          </a:p>
-          <a:p>
-            <a:pPr marL="0" indent="0">
-              <a:buNone/>
-            </a:pPr>
-            <a:r>
-              <a:rPr lang="en-US" sz="1050" dirty="0" smtClean="0"/>
-              <a:t>   Elem</a:t>
-            </a:r>
-            <a:r>
-              <a:rPr lang="en-US" sz="1050" dirty="0"/>
-              <a:t>(</a:t>
-            </a:r>
-            <a:r>
-              <a:rPr lang="en-US" sz="1050" dirty="0" err="1"/>
-              <a:t>CProxy</a:t>
-            </a:r>
-            <a:r>
-              <a:rPr lang="en-US" sz="1050" dirty="0"/>
-              <a:t> Main </a:t>
-            </a:r>
-            <a:r>
-              <a:rPr lang="en-US" sz="1050" dirty="0" err="1"/>
-              <a:t>mProxy</a:t>
-            </a:r>
-            <a:r>
-              <a:rPr lang="en-US" sz="1050" dirty="0"/>
-              <a:t>) {</a:t>
-            </a:r>
-            <a:br>
-              <a:rPr lang="en-US" sz="1050" dirty="0"/>
-            </a:br>
-            <a:r>
-              <a:rPr lang="en-US" sz="1050" dirty="0" smtClean="0"/>
-              <a:t>      </a:t>
-            </a:r>
-            <a:r>
-              <a:rPr lang="en-US" sz="1050" b="1" dirty="0" err="1" smtClean="0"/>
-              <a:t>int</a:t>
-            </a:r>
-            <a:r>
-              <a:rPr lang="en-US" sz="1050" b="1" dirty="0" smtClean="0"/>
-              <a:t> </a:t>
-            </a:r>
-            <a:r>
-              <a:rPr lang="en-US" sz="1050" dirty="0" err="1"/>
-              <a:t>val</a:t>
-            </a:r>
-            <a:r>
-              <a:rPr lang="en-US" sz="1050" dirty="0"/>
-              <a:t> = </a:t>
-            </a:r>
-            <a:r>
-              <a:rPr lang="en-US" sz="1050" dirty="0" err="1"/>
-              <a:t>thisIndex</a:t>
-            </a:r>
-            <a:r>
-              <a:rPr lang="en-US" sz="1050" dirty="0"/>
-              <a:t>;</a:t>
-            </a:r>
-            <a:br>
-              <a:rPr lang="en-US" sz="1050" dirty="0"/>
-            </a:br>
-            <a:r>
-              <a:rPr lang="en-US" sz="1050" dirty="0" smtClean="0"/>
-              <a:t>      </a:t>
-            </a:r>
-            <a:r>
-              <a:rPr lang="en-US" sz="1050" dirty="0" err="1" smtClean="0"/>
-              <a:t>CkCallback</a:t>
-            </a:r>
-            <a:r>
-              <a:rPr lang="en-US" sz="1050" dirty="0" smtClean="0"/>
-              <a:t> </a:t>
-            </a:r>
-            <a:r>
-              <a:rPr lang="en-US" sz="1050" dirty="0" err="1"/>
-              <a:t>cb</a:t>
-            </a:r>
-            <a:r>
-              <a:rPr lang="en-US" sz="1050" dirty="0"/>
-              <a:t>(</a:t>
-            </a:r>
-            <a:r>
-              <a:rPr lang="en-US" sz="1050" dirty="0" err="1"/>
-              <a:t>CkReductionTarget</a:t>
-            </a:r>
-            <a:r>
-              <a:rPr lang="en-US" sz="1050" dirty="0"/>
-              <a:t>(Main, done), </a:t>
-            </a:r>
-            <a:r>
-              <a:rPr lang="en-US" sz="1050" dirty="0" err="1"/>
-              <a:t>mProxy</a:t>
-            </a:r>
-            <a:r>
-              <a:rPr lang="en-US" sz="1050" dirty="0"/>
-              <a:t>); </a:t>
-            </a:r>
-            <a:endParaRPr lang="en-US" sz="1050" dirty="0" smtClean="0"/>
-          </a:p>
-          <a:p>
-            <a:pPr marL="0" indent="0">
-              <a:buNone/>
-            </a:pPr>
-            <a:r>
-              <a:rPr lang="en-US" sz="1050" dirty="0"/>
-              <a:t> </a:t>
-            </a:r>
-            <a:r>
-              <a:rPr lang="en-US" sz="1050" dirty="0" smtClean="0"/>
-              <a:t>     contribute</a:t>
-            </a:r>
-            <a:r>
-              <a:rPr lang="en-US" sz="1050" dirty="0"/>
-              <a:t>(</a:t>
-            </a:r>
-            <a:r>
-              <a:rPr lang="en-US" sz="1050" dirty="0" err="1"/>
-              <a:t>sizeof</a:t>
-            </a:r>
-            <a:r>
-              <a:rPr lang="en-US" sz="1050" dirty="0"/>
-              <a:t>(</a:t>
-            </a:r>
-            <a:r>
-              <a:rPr lang="en-US" sz="1050" dirty="0" err="1"/>
-              <a:t>int</a:t>
-            </a:r>
-            <a:r>
-              <a:rPr lang="en-US" sz="1050" dirty="0"/>
-              <a:t>), &amp;</a:t>
-            </a:r>
-            <a:r>
-              <a:rPr lang="en-US" sz="1050" dirty="0" err="1"/>
-              <a:t>val</a:t>
-            </a:r>
-            <a:r>
-              <a:rPr lang="en-US" sz="1050" dirty="0"/>
-              <a:t>, </a:t>
-            </a:r>
-            <a:r>
-              <a:rPr lang="en-US" sz="1050" dirty="0" err="1"/>
-              <a:t>CkReduction</a:t>
-            </a:r>
-            <a:r>
-              <a:rPr lang="en-US" sz="1050" dirty="0"/>
-              <a:t>::sum </a:t>
-            </a:r>
-            <a:r>
-              <a:rPr lang="en-US" sz="1050" dirty="0" err="1"/>
-              <a:t>int</a:t>
-            </a:r>
-            <a:r>
-              <a:rPr lang="en-US" sz="1050" dirty="0"/>
-              <a:t>, </a:t>
-            </a:r>
-            <a:r>
-              <a:rPr lang="en-US" sz="1050" dirty="0" err="1"/>
-              <a:t>cb</a:t>
-            </a:r>
-            <a:r>
-              <a:rPr lang="en-US" sz="1050" dirty="0"/>
-              <a:t>); </a:t>
-            </a:r>
-          </a:p>
-          <a:p>
-            <a:pPr marL="0" indent="0">
-              <a:buNone/>
-            </a:pPr>
-            <a:r>
-              <a:rPr lang="en-US" sz="1050" dirty="0" smtClean="0"/>
-              <a:t>   } </a:t>
-            </a:r>
-            <a:endParaRPr lang="en-US" sz="1050" dirty="0"/>
-          </a:p>
-          <a:p>
-            <a:pPr marL="0" indent="0">
-              <a:buNone/>
-            </a:pPr>
-            <a:r>
-              <a:rPr lang="en-US" sz="1050" dirty="0" smtClean="0"/>
-              <a:t>   Elem</a:t>
-            </a:r>
-            <a:r>
-              <a:rPr lang="en-US" sz="1050" dirty="0"/>
-              <a:t>(</a:t>
-            </a:r>
-            <a:r>
-              <a:rPr lang="en-US" sz="1050" dirty="0" err="1"/>
-              <a:t>CkMigrateMessage</a:t>
-            </a:r>
-            <a:r>
-              <a:rPr lang="en-US" sz="1050" dirty="0"/>
-              <a:t>∗) { } </a:t>
-            </a:r>
-            <a:endParaRPr lang="en-US" sz="1050" dirty="0" smtClean="0"/>
-          </a:p>
-          <a:p>
-            <a:pPr marL="0" indent="0">
-              <a:buNone/>
-            </a:pPr>
-            <a:r>
-              <a:rPr lang="en-US" sz="1050" dirty="0" smtClean="0"/>
-              <a:t>}</a:t>
-            </a:r>
-            <a:r>
-              <a:rPr lang="en-US" sz="1050" dirty="0"/>
-              <a:t>; </a:t>
-            </a:r>
-            <a:endParaRPr lang="en-US" sz="1050" dirty="0" smtClean="0"/>
-          </a:p>
-          <a:p>
-            <a:pPr marL="0" indent="0">
-              <a:buNone/>
-            </a:pPr>
-            <a:endParaRPr lang="en-US" sz="1050" dirty="0"/>
-          </a:p>
-          <a:p>
-            <a:pPr marL="0" indent="0">
-              <a:buNone/>
-            </a:pPr>
-            <a:r>
-              <a:rPr lang="en-US" sz="1050" b="1" dirty="0"/>
-              <a:t>#include </a:t>
-            </a:r>
-            <a:r>
-              <a:rPr lang="en-US" sz="1050" dirty="0"/>
-              <a:t>”</a:t>
-            </a:r>
-            <a:r>
-              <a:rPr lang="en-US" sz="1050" dirty="0" err="1"/>
+              <a:rPr lang="en-US" sz="1100" dirty="0" err="1"/>
               <a:t>reduction.def.h</a:t>
             </a:r>
             <a:r>
-              <a:rPr lang="en-US" sz="1050" dirty="0"/>
+              <a:rPr lang="en-US" sz="1100" dirty="0"/>
               <a:t>” </a:t>
             </a:r>
           </a:p>
@@ -18549,7 +18864,7 @@
         <p:spPr>
           <a:xfrm>
             <a:off x="457200" y="909978"/>
-            <a:ext cx="8229600" cy="2302918"/>
+            <a:ext cx="8229600" cy="2134988"/>
           </a:xfrm>
         </p:spPr>
         <p:txBody>
@@ -18586,7 +18901,15 @@
             </a:r>
             <a:r>
               <a:rPr lang="en-US" dirty="0"/>
-              <a:t> methods, which are asynchronous methods that may be invoked remotely</a:t>
+              <a:t> </a:t>
+            </a:r>
+            <a:r>
+              <a:rPr lang="en-US" i="1" dirty="0"/>
+              <a:t>methods</a:t>
+            </a:r>
+            <a:r>
+              <a:rPr lang="en-US" dirty="0"/>
+              <a:t>, which are asynchronous methods that may be invoked remotely</a:t>
             </a:r>
           </a:p>
           <a:p>
@@ -18637,7 +18960,7 @@
         </p:nvSpPr>
         <p:spPr>
           <a:xfrm>
-            <a:off x="457200" y="3212896"/>
+            <a:off x="457200" y="3062696"/>
             <a:ext cx="8229600" cy="493867"/>
           </a:xfrm>
         </p:spPr>
@@ -18668,7 +18991,7 @@
         </p:nvSpPr>
         <p:spPr>
           <a:xfrm>
-            <a:off x="457200" y="3706763"/>
+            <a:off x="457200" y="3556563"/>
             <a:ext cx="8229600" cy="1136650"/>
           </a:xfrm>
           <a:solidFill>
@@ -18746,7 +19069,7 @@
         </p:nvSpPr>
         <p:spPr>
           <a:xfrm>
-            <a:off x="457200" y="4868788"/>
+            <a:off x="457200" y="4718588"/>
             <a:ext cx="8229600" cy="556151"/>
           </a:xfrm>
         </p:spPr>
@@ -18775,7 +19098,7 @@
         </p:nvSpPr>
         <p:spPr>
           <a:xfrm>
-            <a:off x="457200" y="5367289"/>
+            <a:off x="457200" y="5217089"/>
             <a:ext cx="8229600" cy="1136650"/>
           </a:xfrm>
           <a:prstGeom prst="rect">
@@ -19049,7 +19372,7 @@
           <a:p>
             <a:fld id="{0022DBA2-41C4-FC42-AF15-6ACF50B9A47F}" type="datetime2">
               <a:rPr lang="en-US" smtClean="0"/>
-              <a:t>Monday, September 8, 14</a:t>
+              <a:t>Tuesday, September 9, 14</a:t>
             </a:fld>
             <a:endParaRPr lang="en-US" dirty="0"/>
           </a:p>
@@ -19374,7 +19697,7 @@
         </p:nvSpPr>
         <p:spPr>
           <a:xfrm>
-            <a:off x="457200" y="4790043"/>
+            <a:off x="457200" y="4548527"/>
             <a:ext cx="8229600" cy="1453380"/>
           </a:xfrm>
           <a:prstGeom prst="rect">
@@ -19668,7 +19991,7 @@
           <a:p>
             <a:fld id="{8EB608FE-6B5C-0942-BB2E-F88C771A47EB}" type="datetime2">
               <a:rPr lang="en-US" smtClean="0"/>
-              <a:t>Monday, September 8, 14</a:t>
+              <a:t>Tuesday, September 9, 14</a:t>
             </a:fld>
             <a:endParaRPr lang="en-US" dirty="0"/>
           </a:p>
@@ -19916,7 +20239,7 @@
           <a:p>
             <a:fld id="{6406B148-C837-5A4A-9177-E769F997E00D}" type="datetime2">
               <a:rPr lang="en-US" smtClean="0"/>
-              <a:t>Monday, September 8, 14</a:t>
+              <a:t>Tuesday, September 9, 14</a:t>
             </a:fld>
             <a:endParaRPr lang="en-US"/>
           </a:p>
@@ -20128,15 +20451,15 @@
               <a:buNone/>
             </a:pPr>
             <a:r>
-              <a:rPr lang="en-US" dirty="0" err="1"/>
+              <a:rPr lang="en-US" dirty="0" err="1" smtClean="0"/>
               <a:t>CProxy</a:t>
             </a:r>
             <a:r>
-              <a:rPr lang="en-US" dirty="0"/>
-              <a:t> </a:t>
-            </a:r>
-            <a:r>
-              <a:rPr lang="en-US" dirty="0" err="1"/>
+              <a:rPr lang="en-US" dirty="0" err="1" smtClean="0"/>
+              <a:t>_</a:t>
+            </a:r>
+            <a:r>
+              <a:rPr lang="en-US" dirty="0" err="1" smtClean="0"/>
               <a:t>MyChare</a:t>
             </a:r>
             <a:r>
@@ -20148,8 +20471,12 @@
               <a:t>ckNew</a:t>
             </a:r>
             <a:r>
-              <a:rPr lang="en-US" dirty="0"/>
-              <a:t>(... constructor arguments ...);</a:t>
+              <a:rPr lang="en-US" dirty="0" smtClean="0"/>
+              <a:t>(... constructor </a:t>
+            </a:r>
+            <a:r>
+              <a:rPr lang="en-US" dirty="0"/>
+              <a:t>arguments ...);</a:t>
             </a:r>
           </a:p>
         </p:txBody>
@@ -20176,7 +20503,15 @@
           <a:p>
             <a:r>
               <a:rPr lang="en-US" dirty="0"/>
-              <a:t>To communicate with this class in the future, a proxy to it must be </a:t>
+              <a:t>To communicate with this class in the future, a </a:t>
+            </a:r>
+            <a:r>
+              <a:rPr lang="en-US" i="1" dirty="0"/>
+              <a:t>proxy</a:t>
+            </a:r>
+            <a:r>
+              <a:rPr lang="en-US" dirty="0"/>
+              <a:t> to it must be </a:t>
             </a:r>
             <a:r>
               <a:rPr lang="en-US" dirty="0" smtClean="0"/>
@@ -20218,40 +20553,44 @@
               <a:buNone/>
             </a:pPr>
             <a:r>
-              <a:rPr lang="en-US" dirty="0" err="1"/>
-              <a:t>CProxy</a:t>
-            </a:r>
-            <a:r>
-              <a:rPr lang="en-US" dirty="0"/>
-              <a:t> </a:t>
-            </a:r>
-            <a:r>
-              <a:rPr lang="en-US" dirty="0" err="1"/>
-              <a:t>MyChare</a:t>
-            </a:r>
-            <a:r>
-              <a:rPr lang="en-US" dirty="0"/>
-              <a:t> proxy =</a:t>
-            </a:r>
-          </a:p>
-          <a:p>
-            <a:pPr marL="0" indent="0">
-              <a:buNone/>
-            </a:pPr>
-            <a:r>
-              <a:rPr lang="en-US" dirty="0" smtClean="0"/>
-              <a:t>   </a:t>
-            </a:r>
-            <a:r>
               <a:rPr lang="en-US" dirty="0" err="1" smtClean="0"/>
               <a:t>CProxy</a:t>
             </a:r>
             <a:r>
+              <a:rPr lang="en-US" dirty="0" err="1" smtClean="0"/>
+              <a:t>_</a:t>
+            </a:r>
+            <a:r>
+              <a:rPr lang="en-US" dirty="0" err="1" smtClean="0"/>
+              <a:t>MyChare</a:t>
+            </a:r>
+            <a:r>
               <a:rPr lang="en-US" dirty="0" smtClean="0"/>
               <a:t> </a:t>
             </a:r>
             <a:r>
-              <a:rPr lang="en-US" dirty="0" err="1"/>
+              <a:rPr lang="en-US" dirty="0"/>
+              <a:t>proxy =</a:t>
+            </a:r>
+          </a:p>
+          <a:p>
+            <a:pPr marL="0" indent="0">
+              <a:buNone/>
+            </a:pPr>
+            <a:r>
+              <a:rPr lang="en-US" dirty="0" smtClean="0"/>
+              <a:t>   </a:t>
+            </a:r>
+            <a:r>
+              <a:rPr lang="en-US" dirty="0" err="1" smtClean="0"/>
+              <a:t>CProxy</a:t>
+            </a:r>
+            <a:r>
+              <a:rPr lang="en-US" dirty="0" err="1" smtClean="0"/>
+              <a:t>_</a:t>
+            </a:r>
+            <a:r>
+              <a:rPr lang="en-US" dirty="0" err="1" smtClean="0"/>
               <a:t>MyChare</a:t>
             </a:r>
             <a:r>
@@ -20286,7 +20625,7 @@
           <a:p>
             <a:fld id="{06EAF201-C85D-6C40-92AB-9574263DA8D2}" type="datetime2">
               <a:rPr lang="en-US" smtClean="0"/>
-              <a:t>Monday, September 8, 14</a:t>
+              <a:t>Tuesday, September 9, 14</a:t>
             </a:fld>
             <a:endParaRPr lang="en-US" dirty="0"/>
           </a:p>
@@ -20587,15 +20926,31 @@
             </a:r>
             <a:r>
               <a:rPr lang="en-US" dirty="0"/>
-              <a:t>foobar2(</a:t>
-            </a:r>
-            <a:r>
-              <a:rPr lang="en-US" dirty="0" err="1"/>
+              <a:t>foobar2</a:t>
+            </a:r>
+            <a:r>
+              <a:rPr lang="en-US" dirty="0" smtClean="0"/>
+              <a:t>(</a:t>
+            </a:r>
+            <a:r>
+              <a:rPr lang="en-US" dirty="0" err="1" smtClean="0"/>
               <a:t>CProxy</a:t>
             </a:r>
             <a:r>
-              <a:rPr lang="en-US" dirty="0"/>
-              <a:t> Main main);</a:t>
+              <a:rPr lang="en-US" dirty="0" err="1" smtClean="0"/>
+              <a:t>_</a:t>
+            </a:r>
+            <a:r>
+              <a:rPr lang="en-US" dirty="0" err="1" smtClean="0"/>
+              <a:t>Main</a:t>
+            </a:r>
+            <a:r>
+              <a:rPr lang="en-US" dirty="0" smtClean="0"/>
+              <a:t> </a:t>
+            </a:r>
+            <a:r>
+              <a:rPr lang="en-US" dirty="0"/>
+              <a:t>main);</a:t>
             </a:r>
           </a:p>
         </p:txBody>
@@ -20838,15 +21193,31 @@
             </a:r>
             <a:r>
               <a:rPr lang="en-US" dirty="0"/>
-              <a:t>::foobar2(</a:t>
-            </a:r>
-            <a:r>
-              <a:rPr lang="en-US" dirty="0" err="1"/>
+              <a:t>::foobar2</a:t>
+            </a:r>
+            <a:r>
+              <a:rPr lang="en-US" dirty="0" smtClean="0"/>
+              <a:t>(</a:t>
+            </a:r>
+            <a:r>
+              <a:rPr lang="en-US" dirty="0" err="1" smtClean="0"/>
               <a:t>CProxy</a:t>
             </a:r>
             <a:r>
-              <a:rPr lang="en-US" dirty="0"/>
-              <a:t> Main main) { </a:t>
+              <a:rPr lang="en-US" dirty="0" err="1" smtClean="0"/>
+              <a:t>_</a:t>
+            </a:r>
+            <a:r>
+              <a:rPr lang="en-US" dirty="0" err="1" smtClean="0"/>
+              <a:t>Main</a:t>
+            </a:r>
+            <a:r>
+              <a:rPr lang="en-US" dirty="0" smtClean="0"/>
+              <a:t> </a:t>
+            </a:r>
+            <a:r>
+              <a:rPr lang="en-US" dirty="0"/>
+              <a:t>main) { </a:t>
             </a:r>
             <a:endParaRPr lang="en-US" dirty="0" smtClean="0"/>
           </a:p>
@@ -20904,7 +21275,7 @@
           <a:p>
             <a:fld id="{516CF2ED-A209-8241-96E4-43915ACF07C6}" type="datetime2">
               <a:rPr lang="en-US" smtClean="0"/>
-              <a:t>Monday, September 8, 14</a:t>
+              <a:t>Tuesday, September 9, 14</a:t>
             </a:fld>
             <a:endParaRPr lang="en-US" dirty="0"/>
           </a:p>
@@ -21118,7 +21489,7 @@
           <a:p>
             <a:fld id="{7888C7C0-37F0-2A45-A738-E90CF9448176}" type="datetime2">
               <a:rPr lang="en-US" smtClean="0"/>
-              <a:t>Monday, September 8, 14</a:t>
+              <a:t>Tuesday, September 9, 14</a:t>
             </a:fld>
             <a:endParaRPr lang="en-US"/>
           </a:p>

</xml_diff>

<commit_message>
tut 4: Cleanup spacing and quotes in code
</commit_message>
<xml_diff>
--- a/tutorial-04-charm_basics.pptx
+++ b/tutorial-04-charm_basics.pptx
@@ -7724,14 +7724,118 @@
                 <a:latin typeface="Consolas"/>
                 <a:cs typeface="Consolas"/>
               </a:rPr>
+              <a:t> pi  = 3.1415;</a:t>
+            </a:r>
+          </a:p>
+          <a:p>
+            <a:pPr marL="0" indent="0">
+              <a:buNone/>
+            </a:pPr>
+            <a:r>
+              <a:rPr lang="en-US" dirty="0" smtClean="0">
+                <a:latin typeface="Consolas"/>
+                <a:cs typeface="Consolas"/>
+              </a:rPr>
+              <a:t>   </a:t>
+            </a:r>
+            <a:r>
+              <a:rPr lang="en-US" dirty="0" err="1" smtClean="0">
+                <a:latin typeface="Consolas"/>
+                <a:cs typeface="Consolas"/>
+              </a:rPr>
+              <a:t>CProxy_Simple</a:t>
+            </a:r>
+            <a:r>
+              <a:rPr lang="en-US" dirty="0" smtClean="0">
+                <a:latin typeface="Consolas"/>
+                <a:cs typeface="Consolas"/>
+              </a:rPr>
+              <a:t>::</a:t>
+            </a:r>
+            <a:r>
+              <a:rPr lang="en-US" dirty="0" err="1" smtClean="0">
+                <a:latin typeface="Consolas"/>
+                <a:cs typeface="Consolas"/>
+              </a:rPr>
+              <a:t>ckNew</a:t>
+            </a:r>
+            <a:r>
+              <a:rPr lang="en-US" dirty="0" smtClean="0">
+                <a:latin typeface="Consolas"/>
+                <a:cs typeface="Consolas"/>
+              </a:rPr>
+              <a:t>(12, pi);</a:t>
+            </a:r>
+          </a:p>
+          <a:p>
+            <a:pPr marL="0" indent="0">
+              <a:buNone/>
+            </a:pPr>
+            <a:r>
+              <a:rPr lang="en-US" dirty="0" smtClean="0">
+                <a:latin typeface="Consolas"/>
+                <a:cs typeface="Consolas"/>
+              </a:rPr>
+              <a:t> };</a:t>
+            </a:r>
+          </a:p>
+          <a:p>
+            <a:pPr marL="0" indent="0">
+              <a:buNone/>
+            </a:pPr>
+            <a:r>
+              <a:rPr lang="en-US" dirty="0" smtClean="0">
+                <a:latin typeface="Consolas"/>
+                <a:cs typeface="Consolas"/>
+              </a:rPr>
+              <a:t>};</a:t>
+            </a:r>
+          </a:p>
+          <a:p>
+            <a:pPr marL="0" indent="0">
+              <a:buNone/>
+            </a:pPr>
+            <a:r>
+              <a:rPr lang="en-US" b="1" dirty="0" smtClean="0">
+                <a:latin typeface="Consolas"/>
+                <a:cs typeface="Consolas"/>
+              </a:rPr>
+              <a:t>class</a:t>
+            </a:r>
+            <a:r>
+              <a:rPr lang="en-US" dirty="0" smtClean="0">
+                <a:latin typeface="Consolas"/>
+                <a:cs typeface="Consolas"/>
+              </a:rPr>
+              <a:t> Simple : </a:t>
+            </a:r>
+            <a:r>
+              <a:rPr lang="en-US" b="1" dirty="0" smtClean="0">
+                <a:latin typeface="Consolas"/>
+                <a:cs typeface="Consolas"/>
+              </a:rPr>
+              <a:t>public</a:t>
+            </a:r>
+            <a:r>
+              <a:rPr lang="en-US" dirty="0" smtClean="0">
+                <a:latin typeface="Consolas"/>
+                <a:cs typeface="Consolas"/>
+              </a:rPr>
               <a:t> </a:t>
             </a:r>
             <a:r>
+              <a:rPr lang="en-US" dirty="0" err="1" smtClean="0">
+                <a:latin typeface="Consolas"/>
+                <a:cs typeface="Consolas"/>
+              </a:rPr>
+              <a:t>CBase_Simple</a:t>
+            </a:r>
+            <a:r>
               <a:rPr lang="en-US" dirty="0" smtClean="0">
                 <a:latin typeface="Consolas"/>
                 <a:cs typeface="Consolas"/>
               </a:rPr>
-              <a:t>pi  = 3.1415;</a:t>
+              <a:t> {</a:t>
             </a:r>
           </a:p>
           <a:p>
@@ -7739,10 +7843,57 @@
               <a:buNone/>
             </a:pPr>
             <a:r>
+              <a:rPr lang="en-US" b="1" dirty="0" smtClean="0">
+                <a:latin typeface="Consolas"/>
+                <a:cs typeface="Consolas"/>
+              </a:rPr>
+              <a:t>public</a:t>
+            </a:r>
+            <a:r>
               <a:rPr lang="en-US" dirty="0" smtClean="0">
                 <a:latin typeface="Consolas"/>
                 <a:cs typeface="Consolas"/>
               </a:rPr>
+              <a:t>: Simple(</a:t>
+            </a:r>
+            <a:r>
+              <a:rPr lang="en-US" b="1" dirty="0" err="1" smtClean="0">
+                <a:latin typeface="Consolas"/>
+                <a:cs typeface="Consolas"/>
+              </a:rPr>
+              <a:t>int</a:t>
+            </a:r>
+            <a:r>
+              <a:rPr lang="en-US" dirty="0" smtClean="0">
+                <a:latin typeface="Consolas"/>
+                <a:cs typeface="Consolas"/>
+              </a:rPr>
+              <a:t> x, </a:t>
+            </a:r>
+            <a:r>
+              <a:rPr lang="en-US" b="1" dirty="0" smtClean="0">
+                <a:latin typeface="Consolas"/>
+                <a:cs typeface="Consolas"/>
+              </a:rPr>
+              <a:t>double</a:t>
+            </a:r>
+            <a:r>
+              <a:rPr lang="en-US" dirty="0" smtClean="0">
+                <a:latin typeface="Consolas"/>
+                <a:cs typeface="Consolas"/>
+              </a:rPr>
+              <a:t> y) {</a:t>
+            </a:r>
+          </a:p>
+          <a:p>
+            <a:pPr marL="0" indent="0">
+              <a:buNone/>
+            </a:pPr>
+            <a:r>
+              <a:rPr lang="en-US" dirty="0" smtClean="0">
+                <a:latin typeface="Consolas"/>
+                <a:cs typeface="Consolas"/>
+              </a:rPr>
               <a:t>   </a:t>
             </a:r>
             <a:r>
@@ -7750,34 +7901,97 @@
                 <a:latin typeface="Consolas"/>
                 <a:cs typeface="Consolas"/>
               </a:rPr>
-              <a:t>CProxy_Simple</a:t>
+              <a:t>ckout</a:t>
             </a:r>
             <a:r>
               <a:rPr lang="en-US" dirty="0" smtClean="0">
                 <a:latin typeface="Consolas"/>
                 <a:cs typeface="Consolas"/>
               </a:rPr>
-              <a:t>::</a:t>
+              <a:t> &lt;&lt; “From </a:t>
             </a:r>
             <a:r>
               <a:rPr lang="en-US" dirty="0" err="1" smtClean="0">
                 <a:latin typeface="Consolas"/>
                 <a:cs typeface="Consolas"/>
               </a:rPr>
-              <a:t>ckNew</a:t>
+              <a:t>chare</a:t>
             </a:r>
             <a:r>
               <a:rPr lang="en-US" dirty="0" smtClean="0">
                 <a:latin typeface="Consolas"/>
                 <a:cs typeface="Consolas"/>
               </a:rPr>
-              <a:t>(12, pi)</a:t>
+              <a:t> running on ”</a:t>
+            </a:r>
+            <a:r>
+              <a:rPr lang="en-US" dirty="0">
+                <a:latin typeface="Consolas"/>
+                <a:cs typeface="Consolas"/>
+              </a:rPr>
+              <a:t> </a:t>
             </a:r>
             <a:r>
               <a:rPr lang="en-US" dirty="0" smtClean="0">
                 <a:latin typeface="Consolas"/>
                 <a:cs typeface="Consolas"/>
               </a:rPr>
+              <a:t>&lt;</a:t>
+            </a:r>
+            <a:r>
+              <a:rPr lang="en-US" dirty="0">
+                <a:latin typeface="Consolas"/>
+                <a:cs typeface="Consolas"/>
+              </a:rPr>
+              <a:t>&lt; </a:t>
+            </a:r>
+            <a:r>
+              <a:rPr lang="en-US" dirty="0" err="1">
+                <a:latin typeface="Consolas"/>
+                <a:cs typeface="Consolas"/>
+              </a:rPr>
+              <a:t>CkMyPe</a:t>
+            </a:r>
+            <a:r>
+              <a:rPr lang="en-US" dirty="0">
+                <a:latin typeface="Consolas"/>
+                <a:cs typeface="Consolas"/>
+              </a:rPr>
+              <a:t>() &lt;</a:t>
+            </a:r>
+            <a:r>
+              <a:rPr lang="en-US" dirty="0" smtClean="0">
+                <a:latin typeface="Consolas"/>
+                <a:cs typeface="Consolas"/>
+              </a:rPr>
+              <a:t>&lt; </a:t>
+            </a:r>
+            <a:r>
+              <a:rPr lang="en-US" dirty="0" smtClean="0">
+                <a:latin typeface="Consolas"/>
+                <a:cs typeface="Consolas"/>
+              </a:rPr>
+              <a:t>“ </a:t>
+            </a:r>
+            <a:r>
+              <a:rPr lang="en-US" dirty="0" smtClean="0">
+                <a:latin typeface="Consolas"/>
+                <a:cs typeface="Consolas"/>
+              </a:rPr>
+              <a:t>Area of a circle of radius ” &lt;&lt; x &lt;&lt; “ is ” &lt;&lt; y*x*x &lt;&lt; </a:t>
+            </a:r>
+            <a:r>
+              <a:rPr lang="en-US" dirty="0" err="1" smtClean="0">
+                <a:latin typeface="Consolas"/>
+                <a:cs typeface="Consolas"/>
+              </a:rPr>
+              <a:t>endl</a:t>
+            </a:r>
+            <a:r>
+              <a:rPr lang="en-US" dirty="0" smtClean="0">
+                <a:latin typeface="Consolas"/>
+                <a:cs typeface="Consolas"/>
+              </a:rPr>
               <a:t>;</a:t>
             </a:r>
           </a:p>
@@ -7786,18 +8000,32 @@
               <a:buNone/>
             </a:pPr>
             <a:r>
+              <a:rPr lang="en-US" dirty="0">
+                <a:latin typeface="Consolas"/>
+                <a:cs typeface="Consolas"/>
+              </a:rPr>
+              <a:t> </a:t>
+            </a:r>
+            <a:r>
               <a:rPr lang="en-US" dirty="0" smtClean="0">
                 <a:latin typeface="Consolas"/>
                 <a:cs typeface="Consolas"/>
               </a:rPr>
-              <a:t> }</a:t>
+              <a:t>  </a:t>
+            </a:r>
+            <a:r>
+              <a:rPr lang="en-US" dirty="0" err="1" smtClean="0">
+                <a:latin typeface="Consolas"/>
+                <a:cs typeface="Consolas"/>
+              </a:rPr>
+              <a:t>CkExit</a:t>
             </a:r>
             <a:r>
               <a:rPr lang="en-US" dirty="0" smtClean="0">
                 <a:latin typeface="Consolas"/>
                 <a:cs typeface="Consolas"/>
               </a:rPr>
-              <a:t>;</a:t>
+              <a:t>();</a:t>
             </a:r>
           </a:p>
           <a:p>
@@ -7805,10 +8033,29 @@
               <a:buNone/>
             </a:pPr>
             <a:r>
+              <a:rPr lang="en-US" dirty="0">
+                <a:latin typeface="Consolas"/>
+                <a:cs typeface="Consolas"/>
+              </a:rPr>
+              <a:t> </a:t>
+            </a:r>
+            <a:r>
               <a:rPr lang="en-US" dirty="0" smtClean="0">
                 <a:latin typeface="Consolas"/>
                 <a:cs typeface="Consolas"/>
               </a:rPr>
+              <a:t>  };</a:t>
+            </a:r>
+          </a:p>
+          <a:p>
+            <a:pPr marL="0" indent="0">
+              <a:buNone/>
+            </a:pPr>
+            <a:r>
+              <a:rPr lang="en-US" dirty="0" smtClean="0">
+                <a:latin typeface="Consolas"/>
+                <a:cs typeface="Consolas"/>
+              </a:rPr>
               <a:t>};</a:t>
             </a:r>
           </a:p>
@@ -7821,319 +8068,29 @@
                 <a:latin typeface="Consolas"/>
                 <a:cs typeface="Consolas"/>
               </a:rPr>
-              <a:t>class</a:t>
+              <a:t>#include </a:t>
             </a:r>
             <a:r>
               <a:rPr lang="en-US" dirty="0" smtClean="0">
                 <a:latin typeface="Consolas"/>
                 <a:cs typeface="Consolas"/>
               </a:rPr>
-              <a:t> Simple : </a:t>
-            </a:r>
-            <a:r>
-              <a:rPr lang="en-US" b="1" dirty="0" smtClean="0">
-                <a:latin typeface="Consolas"/>
-                <a:cs typeface="Consolas"/>
-              </a:rPr>
-              <a:t>public</a:t>
+              <a:t>“</a:t>
+            </a:r>
+            <a:r>
+              <a:rPr lang="en-US" dirty="0" err="1" smtClean="0">
+                <a:latin typeface="Consolas"/>
+                <a:cs typeface="Consolas"/>
+              </a:rPr>
+              <a:t>MyModule.def.h</a:t>
             </a:r>
             <a:r>
               <a:rPr lang="en-US" dirty="0" smtClean="0">
                 <a:latin typeface="Consolas"/>
                 <a:cs typeface="Consolas"/>
               </a:rPr>
-              <a:t> </a:t>
-            </a:r>
-            <a:r>
-              <a:rPr lang="en-US" dirty="0" err="1" smtClean="0">
-                <a:latin typeface="Consolas"/>
-                <a:cs typeface="Consolas"/>
-              </a:rPr>
-              <a:t>CBase_Simple</a:t>
-            </a:r>
-            <a:r>
-              <a:rPr lang="en-US" dirty="0" smtClean="0">
-                <a:latin typeface="Consolas"/>
-                <a:cs typeface="Consolas"/>
-              </a:rPr>
-              <a:t> {</a:t>
-            </a:r>
-          </a:p>
-          <a:p>
-            <a:pPr marL="0" indent="0">
-              <a:buNone/>
-            </a:pPr>
-            <a:r>
-              <a:rPr lang="en-US" b="1" dirty="0" smtClean="0">
-                <a:latin typeface="Consolas"/>
-                <a:cs typeface="Consolas"/>
-              </a:rPr>
-              <a:t>public</a:t>
-            </a:r>
-            <a:r>
-              <a:rPr lang="en-US" dirty="0" smtClean="0">
-                <a:latin typeface="Consolas"/>
-                <a:cs typeface="Consolas"/>
-              </a:rPr>
-              <a:t>: Simple(</a:t>
-            </a:r>
-            <a:r>
-              <a:rPr lang="en-US" b="1" dirty="0" err="1" smtClean="0">
-                <a:latin typeface="Consolas"/>
-                <a:cs typeface="Consolas"/>
-              </a:rPr>
-              <a:t>int</a:t>
-            </a:r>
-            <a:r>
-              <a:rPr lang="en-US" dirty="0" smtClean="0">
-                <a:latin typeface="Consolas"/>
-                <a:cs typeface="Consolas"/>
-              </a:rPr>
-              <a:t> x, </a:t>
-            </a:r>
-            <a:r>
-              <a:rPr lang="en-US" b="1" dirty="0" smtClean="0">
-                <a:latin typeface="Consolas"/>
-                <a:cs typeface="Consolas"/>
-              </a:rPr>
-              <a:t>double</a:t>
-            </a:r>
-            <a:r>
-              <a:rPr lang="en-US" dirty="0" smtClean="0">
-                <a:latin typeface="Consolas"/>
-                <a:cs typeface="Consolas"/>
-              </a:rPr>
-              <a:t> y) {</a:t>
-            </a:r>
-          </a:p>
-          <a:p>
-            <a:pPr marL="0" indent="0">
-              <a:buNone/>
-            </a:pPr>
-            <a:r>
-              <a:rPr lang="en-US" dirty="0" smtClean="0">
-                <a:latin typeface="Consolas"/>
-                <a:cs typeface="Consolas"/>
-              </a:rPr>
-              <a:t>   </a:t>
-            </a:r>
-            <a:r>
-              <a:rPr lang="en-US" dirty="0" err="1" smtClean="0">
-                <a:latin typeface="Consolas"/>
-                <a:cs typeface="Consolas"/>
-              </a:rPr>
-              <a:t>ckout</a:t>
-            </a:r>
-            <a:r>
-              <a:rPr lang="en-US" dirty="0" smtClean="0">
-                <a:latin typeface="Consolas"/>
-                <a:cs typeface="Consolas"/>
-              </a:rPr>
-              <a:t> &lt;</a:t>
-            </a:r>
-            <a:r>
-              <a:rPr lang="en-US" dirty="0" smtClean="0">
-                <a:latin typeface="Consolas"/>
-                <a:cs typeface="Consolas"/>
-              </a:rPr>
-              <a:t>&lt; </a:t>
-            </a:r>
-            <a:r>
-              <a:rPr lang="en-US" dirty="0" smtClean="0">
-                <a:latin typeface="Consolas"/>
-                <a:cs typeface="Consolas"/>
-              </a:rPr>
-              <a:t>“From </a:t>
-            </a:r>
-            <a:r>
-              <a:rPr lang="en-US" dirty="0" err="1" smtClean="0">
-                <a:latin typeface="Consolas"/>
-                <a:cs typeface="Consolas"/>
-              </a:rPr>
-              <a:t>chare</a:t>
-            </a:r>
-            <a:r>
-              <a:rPr lang="en-US" dirty="0" smtClean="0">
-                <a:latin typeface="Consolas"/>
-                <a:cs typeface="Consolas"/>
-              </a:rPr>
-              <a:t> running on ”</a:t>
-            </a:r>
-            <a:r>
-              <a:rPr lang="en-US" dirty="0">
-                <a:latin typeface="Consolas"/>
-                <a:cs typeface="Consolas"/>
-              </a:rPr>
-              <a:t> </a:t>
-            </a:r>
-            <a:r>
-              <a:rPr lang="en-US" dirty="0" smtClean="0">
-                <a:latin typeface="Consolas"/>
-                <a:cs typeface="Consolas"/>
-              </a:rPr>
-              <a:t>&lt;</a:t>
-            </a:r>
-            <a:r>
-              <a:rPr lang="en-US" dirty="0">
-                <a:latin typeface="Consolas"/>
-                <a:cs typeface="Consolas"/>
-              </a:rPr>
-              <a:t>&lt; </a:t>
-            </a:r>
-            <a:r>
-              <a:rPr lang="en-US" dirty="0" err="1">
-                <a:latin typeface="Consolas"/>
-                <a:cs typeface="Consolas"/>
-              </a:rPr>
-              <a:t>CkMyPe</a:t>
-            </a:r>
-            <a:r>
-              <a:rPr lang="en-US" dirty="0">
-                <a:latin typeface="Consolas"/>
-                <a:cs typeface="Consolas"/>
-              </a:rPr>
-              <a:t>() &lt;</a:t>
-            </a:r>
-            <a:r>
-              <a:rPr lang="en-US" dirty="0" smtClean="0">
-                <a:latin typeface="Consolas"/>
-                <a:cs typeface="Consolas"/>
-              </a:rPr>
-              <a:t>&lt; “ Area </a:t>
-            </a:r>
-            <a:r>
-              <a:rPr lang="en-US" dirty="0" smtClean="0">
-                <a:latin typeface="Consolas"/>
-                <a:cs typeface="Consolas"/>
-              </a:rPr>
-              <a:t>of a circle of radius ” &lt;&lt; x &lt;&lt; “ is ” &lt;&lt; y*x*x &lt;&lt; </a:t>
-            </a:r>
-            <a:r>
-              <a:rPr lang="en-US" dirty="0" err="1" smtClean="0">
-                <a:latin typeface="Consolas"/>
-                <a:cs typeface="Consolas"/>
-              </a:rPr>
-              <a:t>endl</a:t>
-            </a:r>
-            <a:r>
-              <a:rPr lang="en-US" dirty="0" smtClean="0">
-                <a:latin typeface="Consolas"/>
-                <a:cs typeface="Consolas"/>
-              </a:rPr>
-              <a:t>;</a:t>
-            </a:r>
-          </a:p>
-          <a:p>
-            <a:pPr marL="0" indent="0">
-              <a:buNone/>
-            </a:pPr>
-            <a:r>
-              <a:rPr lang="en-US" dirty="0">
-                <a:latin typeface="Consolas"/>
-                <a:cs typeface="Consolas"/>
-              </a:rPr>
-              <a:t> </a:t>
-            </a:r>
-            <a:r>
-              <a:rPr lang="en-US" dirty="0" smtClean="0">
-                <a:latin typeface="Consolas"/>
-                <a:cs typeface="Consolas"/>
-              </a:rPr>
-              <a:t>  </a:t>
-            </a:r>
-            <a:r>
-              <a:rPr lang="en-US" dirty="0" err="1" smtClean="0">
-                <a:latin typeface="Consolas"/>
-                <a:cs typeface="Consolas"/>
-              </a:rPr>
-              <a:t>CkExit</a:t>
-            </a:r>
-            <a:r>
-              <a:rPr lang="en-US" dirty="0" smtClean="0">
-                <a:latin typeface="Consolas"/>
-                <a:cs typeface="Consolas"/>
-              </a:rPr>
-              <a:t>();</a:t>
-            </a:r>
-          </a:p>
-          <a:p>
-            <a:pPr marL="0" indent="0">
-              <a:buNone/>
-            </a:pPr>
-            <a:r>
-              <a:rPr lang="en-US" dirty="0">
-                <a:latin typeface="Consolas"/>
-                <a:cs typeface="Consolas"/>
-              </a:rPr>
-              <a:t> </a:t>
-            </a:r>
-            <a:r>
-              <a:rPr lang="en-US" dirty="0" smtClean="0">
-                <a:latin typeface="Consolas"/>
-                <a:cs typeface="Consolas"/>
-              </a:rPr>
-              <a:t>  };</a:t>
-            </a:r>
-          </a:p>
-          <a:p>
-            <a:pPr marL="0" indent="0">
-              <a:buNone/>
-            </a:pPr>
-            <a:r>
-              <a:rPr lang="en-US" dirty="0" smtClean="0">
-                <a:latin typeface="Consolas"/>
-                <a:cs typeface="Consolas"/>
-              </a:rPr>
-              <a:t>}</a:t>
-            </a:r>
-            <a:r>
-              <a:rPr lang="en-US" dirty="0" smtClean="0">
-                <a:latin typeface="Consolas"/>
-                <a:cs typeface="Consolas"/>
-              </a:rPr>
-              <a:t>;</a:t>
-            </a:r>
-            <a:endParaRPr lang="en-US" dirty="0" smtClean="0">
-              <a:latin typeface="Consolas"/>
-              <a:cs typeface="Consolas"/>
-            </a:endParaRPr>
-          </a:p>
-          <a:p>
-            <a:pPr marL="0" indent="0">
-              <a:buNone/>
-            </a:pPr>
-            <a:r>
-              <a:rPr lang="en-US" b="1" dirty="0" smtClean="0">
-                <a:latin typeface="Consolas"/>
-                <a:cs typeface="Consolas"/>
-              </a:rPr>
-              <a:t>#include </a:t>
-            </a:r>
-            <a:r>
-              <a:rPr lang="en-US" dirty="0" smtClean="0">
-                <a:latin typeface="Consolas"/>
-                <a:cs typeface="Consolas"/>
-              </a:rPr>
-              <a:t>“</a:t>
-            </a:r>
-            <a:r>
-              <a:rPr lang="en-US" dirty="0" err="1" smtClean="0">
-                <a:latin typeface="Consolas"/>
-                <a:cs typeface="Consolas"/>
-              </a:rPr>
-              <a:t>MyModule.def.h</a:t>
-            </a:r>
-            <a:r>
-              <a:rPr lang="en-US" dirty="0" smtClean="0">
-                <a:latin typeface="Consolas"/>
-                <a:cs typeface="Consolas"/>
-              </a:rPr>
               <a:t>”</a:t>
             </a:r>
-            <a:endParaRPr lang="en-US" dirty="0" smtClean="0">
-              <a:latin typeface="Consolas"/>
-              <a:cs typeface="Consolas"/>
-            </a:endParaRPr>
           </a:p>
         </p:txBody>
       </p:sp>
@@ -11627,7 +11584,6 @@
               <a:rPr lang="en-US" dirty="0"/>
               <a:t>Does this program execute correctly?</a:t>
             </a:r>
-            <a:endParaRPr lang="en-US" dirty="0"/>
           </a:p>
         </p:txBody>
       </p:sp>
@@ -11895,14 +11851,7 @@
                 <a:latin typeface="Consolas"/>
                 <a:cs typeface="Consolas"/>
               </a:rPr>
-              <a:t>(3.1415)</a:t>
-            </a:r>
-            <a:r>
-              <a:rPr lang="en-US" sz="2000" dirty="0">
-                <a:latin typeface="Consolas"/>
-                <a:cs typeface="Consolas"/>
-              </a:rPr>
-              <a:t>; </a:t>
+              <a:t>(3.1415); </a:t>
             </a:r>
             <a:endParaRPr lang="en-US" sz="2000" dirty="0" smtClean="0">
               <a:latin typeface="Consolas"/>
@@ -12105,19 +12054,8 @@
                 <a:latin typeface="Consolas"/>
                 <a:cs typeface="Consolas"/>
               </a:rPr>
-              <a:t>}</a:t>
-            </a:r>
-            <a:r>
-              <a:rPr lang="en-US" sz="2000" dirty="0" smtClean="0">
-                <a:latin typeface="Consolas"/>
-                <a:cs typeface="Consolas"/>
-              </a:rPr>
-              <a:t>;</a:t>
-            </a:r>
-            <a:endParaRPr lang="en-US" sz="2000" dirty="0" smtClean="0">
-              <a:latin typeface="Consolas"/>
-              <a:cs typeface="Consolas"/>
-            </a:endParaRPr>
+              <a:t>};</a:t>
+            </a:r>
           </a:p>
           <a:p>
             <a:pPr marL="0" indent="0">
@@ -13759,7 +13697,6 @@
               <a:rPr lang="en-US" dirty="0" smtClean="0"/>
               <a:t> </a:t>
             </a:r>
-            <a:endParaRPr lang="en-US" dirty="0" smtClean="0"/>
           </a:p>
           <a:p>
             <a:r>
@@ -17293,19 +17230,8 @@
                 <a:latin typeface="Consolas"/>
                 <a:cs typeface="Consolas"/>
               </a:rPr>
-              <a:t>   </a:t>
-            </a:r>
-            <a:r>
-              <a:rPr lang="en-US" sz="3000" dirty="0" smtClean="0">
-                <a:latin typeface="Consolas"/>
-                <a:cs typeface="Consolas"/>
-              </a:rPr>
-              <a:t>}</a:t>
-            </a:r>
-            <a:endParaRPr lang="en-US" sz="3000" dirty="0" smtClean="0">
-              <a:latin typeface="Consolas"/>
-              <a:cs typeface="Consolas"/>
-            </a:endParaRPr>
+              <a:t>   }</a:t>
+            </a:r>
           </a:p>
           <a:p>
             <a:pPr marL="0" indent="0">
@@ -17981,14 +17907,7 @@
                 <a:latin typeface="Consolas"/>
                 <a:cs typeface="Consolas"/>
               </a:rPr>
-              <a:t>}</a:t>
-            </a:r>
-            <a:r>
-              <a:rPr lang="en-US" sz="1700" dirty="0" smtClean="0">
-                <a:latin typeface="Consolas"/>
-                <a:cs typeface="Consolas"/>
-              </a:rPr>
-              <a:t>;</a:t>
+              <a:t>};</a:t>
             </a:r>
             <a:endParaRPr lang="en-US" sz="1700" dirty="0">
               <a:latin typeface="Consolas"/>
@@ -18394,14 +18313,7 @@
                 <a:latin typeface="Consolas"/>
                 <a:cs typeface="Consolas"/>
               </a:rPr>
-              <a:t>}</a:t>
-            </a:r>
-            <a:r>
-              <a:rPr lang="en-US" sz="1700" dirty="0" smtClean="0">
-                <a:latin typeface="Consolas"/>
-                <a:cs typeface="Consolas"/>
-              </a:rPr>
-              <a:t>;</a:t>
+              <a:t>};</a:t>
             </a:r>
             <a:endParaRPr lang="en-US" sz="1700" dirty="0">
               <a:latin typeface="Consolas"/>
@@ -21966,11 +21878,7 @@
             </a:pPr>
             <a:r>
               <a:rPr lang="en-US" dirty="0" smtClean="0"/>
-              <a:t>.</a:t>
-            </a:r>
-            <a:r>
-              <a:rPr lang="en-US" dirty="0" smtClean="0"/>
-              <a:t>ci file</a:t>
+              <a:t>.ci file</a:t>
             </a:r>
             <a:endParaRPr lang="en-US" dirty="0"/>
           </a:p>
@@ -23109,7 +23017,7 @@
                 <a:latin typeface="Consolas"/>
                 <a:cs typeface="Consolas"/>
               </a:rPr>
-              <a:t>  </a:t>
+              <a:t> </a:t>
             </a:r>
             <a:r>
               <a:rPr lang="en-US" b="1" dirty="0" err="1" smtClean="0">
@@ -23142,7 +23050,7 @@
                 <a:latin typeface="Consolas"/>
                 <a:cs typeface="Consolas"/>
               </a:rPr>
-              <a:t>      </a:t>
+              <a:t>    </a:t>
             </a:r>
             <a:r>
               <a:rPr lang="en-US" b="1" dirty="0" smtClean="0">
@@ -23203,7 +23111,7 @@
                 <a:latin typeface="Consolas"/>
                 <a:cs typeface="Consolas"/>
               </a:rPr>
-              <a:t>      </a:t>
+              <a:t>    </a:t>
             </a:r>
             <a:r>
               <a:rPr lang="en-US" b="1" dirty="0" smtClean="0">
@@ -23289,7 +23197,14 @@
                 <a:latin typeface="Consolas"/>
                 <a:cs typeface="Consolas"/>
               </a:rPr>
-              <a:t>  }</a:t>
+              <a:t> </a:t>
+            </a:r>
+            <a:r>
+              <a:rPr lang="en-US" dirty="0" smtClean="0">
+                <a:latin typeface="Consolas"/>
+                <a:cs typeface="Consolas"/>
+              </a:rPr>
+              <a:t>}</a:t>
             </a:r>
             <a:r>
               <a:rPr lang="en-US" dirty="0">
@@ -23308,7 +23223,7 @@
                 <a:latin typeface="Consolas"/>
                 <a:cs typeface="Consolas"/>
               </a:rPr>
-              <a:t>   </a:t>
+              <a:t>  </a:t>
             </a:r>
             <a:r>
               <a:rPr lang="en-US" b="1" dirty="0" smtClean="0">
@@ -23341,7 +23256,7 @@
                 <a:latin typeface="Consolas"/>
                 <a:cs typeface="Consolas"/>
               </a:rPr>
-              <a:t>      </a:t>
+              <a:t>    </a:t>
             </a:r>
             <a:r>
               <a:rPr lang="en-US" b="1" dirty="0" smtClean="0">
@@ -23388,7 +23303,21 @@
                 <a:latin typeface="Consolas"/>
                 <a:cs typeface="Consolas"/>
               </a:rPr>
-              <a:t>   };</a:t>
+              <a:t>  </a:t>
+            </a:r>
+            <a:r>
+              <a:rPr lang="en-US" dirty="0" smtClean="0">
+                <a:latin typeface="Consolas"/>
+                <a:cs typeface="Consolas"/>
+              </a:rPr>
+              <a:t>}</a:t>
+            </a:r>
+            <a:r>
+              <a:rPr lang="en-US" dirty="0" smtClean="0">
+                <a:latin typeface="Consolas"/>
+                <a:cs typeface="Consolas"/>
+              </a:rPr>
+              <a:t>;</a:t>
             </a:r>
           </a:p>
           <a:p>
@@ -23659,7 +23588,6 @@
               <a:rPr lang="en-US" sz="1700" dirty="0" smtClean="0"/>
               <a:t> </a:t>
             </a:r>
-            <a:endParaRPr lang="en-US" sz="1700" dirty="0" smtClean="0"/>
           </a:p>
           <a:p>
             <a:pPr marL="0" indent="0">
@@ -23735,8 +23663,12 @@
               <a:t>   </a:t>
             </a:r>
             <a:r>
-              <a:rPr lang="en-US" sz="1700" dirty="0" err="1" smtClean="0"/>
-              <a:t>CkPrintf</a:t>
+              <a:rPr lang="en-US" sz="1700" dirty="0" smtClean="0"/>
+              <a:t> </a:t>
+            </a:r>
+            <a:r>
+              <a:rPr lang="en-US" sz="1700" smtClean="0"/>
+              <a:t>  CkPrintf</a:t>
             </a:r>
             <a:r>
               <a:rPr lang="en-US" sz="1700" dirty="0" smtClean="0"/>
@@ -23751,7 +23683,15 @@
             </a:br>
             <a:r>
               <a:rPr lang="en-US" sz="1700" dirty="0" smtClean="0"/>
-              <a:t>      CkExit</a:t>
+              <a:t>     </a:t>
+            </a:r>
+            <a:r>
+              <a:rPr lang="en-US" sz="1700" dirty="0" smtClean="0"/>
+              <a:t> </a:t>
+            </a:r>
+            <a:r>
+              <a:rPr lang="en-US" sz="1700" dirty="0" err="1" smtClean="0"/>
+              <a:t>CkExit</a:t>
             </a:r>
             <a:r>
               <a:rPr lang="en-US" sz="1700" dirty="0"/>
@@ -23774,11 +23714,7 @@
             </a:pPr>
             <a:r>
               <a:rPr lang="en-US" sz="1700" dirty="0" smtClean="0"/>
-              <a:t>}</a:t>
-            </a:r>
-            <a:r>
-              <a:rPr lang="en-US" sz="1700" dirty="0" smtClean="0"/>
-              <a:t>;</a:t>
+              <a:t>};</a:t>
             </a:r>
             <a:endParaRPr lang="en-US" sz="1700" dirty="0"/>
           </a:p>
@@ -24328,7 +24264,11 @@
             </a:r>
             <a:r>
               <a:rPr lang="en-US" dirty="0"/>
-              <a:t> has a set </a:t>
+              <a:t> has a </a:t>
+            </a:r>
+            <a:r>
+              <a:rPr lang="en-US" dirty="0" smtClean="0"/>
+              <a:t>set of </a:t>
             </a:r>
             <a:r>
               <a:rPr lang="en-US" i="1" dirty="0"/>

</xml_diff>

<commit_message>
tut 4: more cleanup
</commit_message>
<xml_diff>
--- a/tutorial-04-charm_basics.pptx
+++ b/tutorial-04-charm_basics.pptx
@@ -23664,11 +23664,11 @@
             </a:r>
             <a:r>
               <a:rPr lang="en-US" sz="1700" dirty="0" smtClean="0"/>
-              <a:t> </a:t>
-            </a:r>
-            <a:r>
-              <a:rPr lang="en-US" sz="1700" smtClean="0"/>
-              <a:t>  CkPrintf</a:t>
+              <a:t>   </a:t>
+            </a:r>
+            <a:r>
+              <a:rPr lang="en-US" sz="1700" dirty="0" err="1" smtClean="0"/>
+              <a:t>CkPrintf</a:t>
             </a:r>
             <a:r>
               <a:rPr lang="en-US" sz="1700" dirty="0" smtClean="0"/>

</xml_diff>

<commit_message>
tut 4: More quote in code cleanup
</commit_message>
<xml_diff>
--- a/tutorial-04-charm_basics.pptx
+++ b/tutorial-04-charm_basics.pptx
@@ -12346,7 +12346,21 @@
                 <a:latin typeface="Consolas"/>
                 <a:cs typeface="Consolas"/>
               </a:rPr>
-              <a:t>&lt;&lt; r &lt;&lt; ” is ” &lt;&lt; </a:t>
+              <a:t>&lt;&lt; r &lt;&lt; </a:t>
+            </a:r>
+            <a:r>
+              <a:rPr lang="en-US" sz="2000" dirty="0" smtClean="0">
+                <a:latin typeface="Consolas"/>
+                <a:cs typeface="Consolas"/>
+              </a:rPr>
+              <a:t>“ </a:t>
+            </a:r>
+            <a:r>
+              <a:rPr lang="en-US" sz="2000" dirty="0">
+                <a:latin typeface="Consolas"/>
+                <a:cs typeface="Consolas"/>
+              </a:rPr>
+              <a:t>is ” &lt;&lt; </a:t>
             </a:r>
             <a:r>
               <a:rPr lang="en-US" sz="2000" dirty="0" err="1">

</xml_diff>

<commit_message>
tut 4: fix spacing
</commit_message>
<xml_diff>
--- a/tutorial-04-charm_basics.pptx
+++ b/tutorial-04-charm_basics.pptx
@@ -7964,21 +7964,7 @@
                 <a:latin typeface="Consolas"/>
                 <a:cs typeface="Consolas"/>
               </a:rPr>
-              <a:t>&lt; </a:t>
-            </a:r>
-            <a:r>
-              <a:rPr lang="en-US" dirty="0" smtClean="0">
-                <a:latin typeface="Consolas"/>
-                <a:cs typeface="Consolas"/>
-              </a:rPr>
-              <a:t>“ </a:t>
-            </a:r>
-            <a:r>
-              <a:rPr lang="en-US" dirty="0" smtClean="0">
-                <a:latin typeface="Consolas"/>
-                <a:cs typeface="Consolas"/>
-              </a:rPr>
-              <a:t>Area of a circle of radius ” &lt;&lt; x &lt;&lt; “ is ” &lt;&lt; y*x*x &lt;&lt; </a:t>
+              <a:t>&lt; “ Area of a circle of radius ” &lt;&lt; x &lt;&lt; “ is ” &lt;&lt; y*x*x &lt;&lt; </a:t>
             </a:r>
             <a:r>
               <a:rPr lang="en-US" dirty="0" err="1" smtClean="0">
@@ -23211,21 +23197,94 @@
                 <a:latin typeface="Consolas"/>
                 <a:cs typeface="Consolas"/>
               </a:rPr>
+              <a:t> }</a:t>
+            </a:r>
+            <a:r>
+              <a:rPr lang="en-US" dirty="0">
+                <a:latin typeface="Consolas"/>
+                <a:cs typeface="Consolas"/>
+              </a:rPr>
+              <a:t>;</a:t>
+            </a:r>
+          </a:p>
+          <a:p>
+            <a:pPr marL="0" indent="0">
+              <a:buNone/>
+            </a:pPr>
+            <a:r>
+              <a:rPr lang="en-US" dirty="0" smtClean="0">
+                <a:latin typeface="Consolas"/>
+                <a:cs typeface="Consolas"/>
+              </a:rPr>
+              <a:t>  </a:t>
+            </a:r>
+            <a:r>
+              <a:rPr lang="en-US" b="1" dirty="0" smtClean="0">
+                <a:latin typeface="Consolas"/>
+                <a:cs typeface="Consolas"/>
+              </a:rPr>
+              <a:t>array</a:t>
+            </a:r>
+            <a:r>
+              <a:rPr lang="en-US" dirty="0" smtClean="0">
+                <a:latin typeface="Consolas"/>
+                <a:cs typeface="Consolas"/>
+              </a:rPr>
               <a:t> </a:t>
             </a:r>
             <a:r>
+              <a:rPr lang="en-US" dirty="0">
+                <a:latin typeface="Consolas"/>
+                <a:cs typeface="Consolas"/>
+              </a:rPr>
+              <a:t>[1D] Elem {</a:t>
+            </a:r>
+          </a:p>
+          <a:p>
+            <a:pPr marL="0" indent="0">
+              <a:buNone/>
+            </a:pPr>
+            <a:r>
               <a:rPr lang="en-US" dirty="0" smtClean="0">
                 <a:latin typeface="Consolas"/>
                 <a:cs typeface="Consolas"/>
               </a:rPr>
-              <a:t>}</a:t>
+              <a:t>    </a:t>
+            </a:r>
+            <a:r>
+              <a:rPr lang="en-US" b="1" dirty="0" smtClean="0">
+                <a:latin typeface="Consolas"/>
+                <a:cs typeface="Consolas"/>
+              </a:rPr>
+              <a:t>entry</a:t>
+            </a:r>
+            <a:r>
+              <a:rPr lang="en-US" dirty="0" smtClean="0">
+                <a:latin typeface="Consolas"/>
+                <a:cs typeface="Consolas"/>
+              </a:rPr>
+              <a:t> </a:t>
             </a:r>
             <a:r>
               <a:rPr lang="en-US" dirty="0">
                 <a:latin typeface="Consolas"/>
                 <a:cs typeface="Consolas"/>
               </a:rPr>
-              <a:t>;</a:t>
+              <a:t>Elem(</a:t>
+            </a:r>
+            <a:r>
+              <a:rPr lang="en-US" dirty="0" smtClean="0">
+                <a:latin typeface="Consolas"/>
+                <a:cs typeface="Consolas"/>
+              </a:rPr>
+              <a:t>CProxy_Main </a:t>
+            </a:r>
+            <a:r>
+              <a:rPr lang="en-US" dirty="0">
+                <a:latin typeface="Consolas"/>
+                <a:cs typeface="Consolas"/>
+              </a:rPr>
+              <a:t>mProxy);</a:t>
             </a:r>
           </a:p>
           <a:p>
@@ -23237,101 +23296,7 @@
                 <a:latin typeface="Consolas"/>
                 <a:cs typeface="Consolas"/>
               </a:rPr>
-              <a:t>  </a:t>
-            </a:r>
-            <a:r>
-              <a:rPr lang="en-US" b="1" dirty="0" smtClean="0">
-                <a:latin typeface="Consolas"/>
-                <a:cs typeface="Consolas"/>
-              </a:rPr>
-              <a:t>array</a:t>
-            </a:r>
-            <a:r>
-              <a:rPr lang="en-US" dirty="0" smtClean="0">
-                <a:latin typeface="Consolas"/>
-                <a:cs typeface="Consolas"/>
-              </a:rPr>
-              <a:t> </a:t>
-            </a:r>
-            <a:r>
-              <a:rPr lang="en-US" dirty="0">
-                <a:latin typeface="Consolas"/>
-                <a:cs typeface="Consolas"/>
-              </a:rPr>
-              <a:t>[1D] Elem {</a:t>
-            </a:r>
-          </a:p>
-          <a:p>
-            <a:pPr marL="0" indent="0">
-              <a:buNone/>
-            </a:pPr>
-            <a:r>
-              <a:rPr lang="en-US" dirty="0" smtClean="0">
-                <a:latin typeface="Consolas"/>
-                <a:cs typeface="Consolas"/>
-              </a:rPr>
-              <a:t>    </a:t>
-            </a:r>
-            <a:r>
-              <a:rPr lang="en-US" b="1" dirty="0" smtClean="0">
-                <a:latin typeface="Consolas"/>
-                <a:cs typeface="Consolas"/>
-              </a:rPr>
-              <a:t>entry</a:t>
-            </a:r>
-            <a:r>
-              <a:rPr lang="en-US" dirty="0" smtClean="0">
-                <a:latin typeface="Consolas"/>
-                <a:cs typeface="Consolas"/>
-              </a:rPr>
-              <a:t> </a:t>
-            </a:r>
-            <a:r>
-              <a:rPr lang="en-US" dirty="0">
-                <a:latin typeface="Consolas"/>
-                <a:cs typeface="Consolas"/>
-              </a:rPr>
-              <a:t>Elem(</a:t>
-            </a:r>
-            <a:r>
-              <a:rPr lang="en-US" dirty="0" smtClean="0">
-                <a:latin typeface="Consolas"/>
-                <a:cs typeface="Consolas"/>
-              </a:rPr>
-              <a:t>CProxy_Main </a:t>
-            </a:r>
-            <a:r>
-              <a:rPr lang="en-US" dirty="0">
-                <a:latin typeface="Consolas"/>
-                <a:cs typeface="Consolas"/>
-              </a:rPr>
-              <a:t>mProxy);</a:t>
-            </a:r>
-          </a:p>
-          <a:p>
-            <a:pPr marL="0" indent="0">
-              <a:buNone/>
-            </a:pPr>
-            <a:r>
-              <a:rPr lang="en-US" dirty="0" smtClean="0">
-                <a:latin typeface="Consolas"/>
-                <a:cs typeface="Consolas"/>
-              </a:rPr>
-              <a:t>  </a:t>
-            </a:r>
-            <a:r>
-              <a:rPr lang="en-US" dirty="0" smtClean="0">
-                <a:latin typeface="Consolas"/>
-                <a:cs typeface="Consolas"/>
-              </a:rPr>
-              <a:t>}</a:t>
-            </a:r>
-            <a:r>
-              <a:rPr lang="en-US" dirty="0" smtClean="0">
-                <a:latin typeface="Consolas"/>
-                <a:cs typeface="Consolas"/>
-              </a:rPr>
-              <a:t>;</a:t>
+              <a:t>  };</a:t>
             </a:r>
           </a:p>
           <a:p>
@@ -23674,11 +23639,7 @@
             </a:pPr>
             <a:r>
               <a:rPr lang="en-US" sz="1700" dirty="0" smtClean="0"/>
-              <a:t>   </a:t>
-            </a:r>
-            <a:r>
-              <a:rPr lang="en-US" sz="1700" dirty="0" smtClean="0"/>
-              <a:t>   </a:t>
+              <a:t>      </a:t>
             </a:r>
             <a:r>
               <a:rPr lang="en-US" sz="1700" dirty="0" err="1" smtClean="0"/>
@@ -23697,11 +23658,7 @@
             </a:br>
             <a:r>
               <a:rPr lang="en-US" sz="1700" dirty="0" smtClean="0"/>
-              <a:t>     </a:t>
-            </a:r>
-            <a:r>
-              <a:rPr lang="en-US" sz="1700" dirty="0" smtClean="0"/>
-              <a:t> </a:t>
+              <a:t>      </a:t>
             </a:r>
             <a:r>
               <a:rPr lang="en-US" sz="1700" dirty="0" err="1" smtClean="0"/>
@@ -26436,14 +26393,41 @@
                 <a:latin typeface="Consolas"/>
                 <a:cs typeface="Consolas"/>
               </a:rPr>
-              <a:t>(... constructor </a:t>
+              <a:t>(... </a:t>
+            </a:r>
+            <a:r>
+              <a:rPr lang="en-US" sz="3000" dirty="0" smtClean="0">
+                <a:latin typeface="Consolas"/>
+                <a:cs typeface="Consolas"/>
+              </a:rPr>
+              <a:t>constructor </a:t>
+            </a:r>
+            <a:br>
+              <a:rPr lang="en-US" sz="3000" dirty="0" smtClean="0">
+                <a:latin typeface="Consolas"/>
+                <a:cs typeface="Consolas"/>
+              </a:rPr>
+            </a:br>
+            <a:r>
+              <a:rPr lang="en-US" sz="3000" dirty="0" smtClean="0">
+                <a:latin typeface="Consolas"/>
+                <a:cs typeface="Consolas"/>
+              </a:rPr>
+              <a:t>					  </a:t>
+            </a:r>
+            <a:r>
+              <a:rPr lang="en-US" sz="3000" smtClean="0">
+                <a:latin typeface="Consolas"/>
+                <a:cs typeface="Consolas"/>
+              </a:rPr>
+              <a:t> arguments </a:t>
             </a:r>
             <a:r>
               <a:rPr lang="en-US" sz="3000" dirty="0">
                 <a:latin typeface="Consolas"/>
                 <a:cs typeface="Consolas"/>
               </a:rPr>
-              <a:t>arguments ...);</a:t>
+              <a:t>...);</a:t>
             </a:r>
           </a:p>
         </p:txBody>

</xml_diff>